<commit_message>
Updating torch install command
</commit_message>
<xml_diff>
--- a/tyler/meena/cs320/s23/lec/27-ml/slides.pptx
+++ b/tyler/meena/cs320/s23/lec/27-ml/slides.pptx
@@ -13603,8 +13603,8 @@
         </p:nvSpPr>
         <p:spPr>
           <a:xfrm>
-            <a:off x="658688" y="8470899"/>
-            <a:ext cx="11687424" cy="711201"/>
+            <a:off x="658688" y="8452038"/>
+            <a:ext cx="11687424" cy="748923"/>
           </a:xfrm>
           <a:prstGeom prst="rect">
             <a:avLst/>
@@ -13633,7 +13633,16 @@
               </a:defRPr>
             </a:pPr>
             <a:r>
-              <a:t>pip3 install numpy scikit-learn</a:t>
+              <a:rPr dirty="0"/>
+              <a:t>pip3 install </a:t>
+            </a:r>
+            <a:r>
+              <a:rPr dirty="0" err="1"/>
+              <a:t>numpy</a:t>
+            </a:r>
+            <a:r>
+              <a:rPr dirty="0"/>
+              <a:t> scikit-learn</a:t>
             </a:r>
           </a:p>
           <a:p>
@@ -13645,7 +13654,7 @@
                 <a:sym typeface="Courier New"/>
               </a:defRPr>
             </a:pPr>
-            <a:endParaRPr/>
+            <a:endParaRPr dirty="0"/>
           </a:p>
           <a:p>
             <a:pPr algn="l">
@@ -13657,8 +13666,14 @@
               </a:defRPr>
             </a:pPr>
             <a:r>
-              <a:t>pip3 install torch==1.4.0+cpu torchvision==0.5.0+cpu -f https://download.pytorch.org/whl/torch_stable.html</a:t>
+              <a:rPr lang="en-US" dirty="0"/>
+              <a:t>pip3 install torch </a:t>
             </a:r>
+            <a:r>
+              <a:rPr lang="en-US" dirty="0" err="1"/>
+              <a:t>torchvision</a:t>
+            </a:r>
+            <a:endParaRPr lang="en-US" dirty="0"/>
           </a:p>
         </p:txBody>
       </p:sp>

</xml_diff>

<commit_message>
ml overview slide change
</commit_message>
<xml_diff>
--- a/tyler/meena/cs320/s23/lec/27-ml/slides.pptx
+++ b/tyler/meena/cs320/s23/lec/27-ml/slides.pptx
@@ -349,6 +349,11 @@
       </a:defRPr>
     </a:lvl9pPr>
   </p:defaultTextStyle>
+  <p:extLst>
+    <p:ext uri="{EFAFB233-063F-42B5-8137-9DF3F51BA10A}">
+      <p15:sldGuideLst xmlns:p15="http://schemas.microsoft.com/office/powerpoint/2012/main"/>
+    </p:ext>
+  </p:extLst>
 </p:presentation>
 </file>
 
@@ -2482,7 +2487,7 @@
           </a:ln>
           <a:extLst>
             <a:ext uri="{C572A759-6A51-4108-AA02-DFA0A04FC94B}">
-              <ma14:wrappingTextBoxFlag xmlns:ma14="http://schemas.microsoft.com/office/mac/drawingml/2011/main" xmlns:a14="http://schemas.microsoft.com/office/drawing/2010/main" xmlns:m="http://schemas.openxmlformats.org/officeDocument/2006/math" xmlns="" val="1"/>
+              <ma14:wrappingTextBoxFlag xmlns="" xmlns:m="http://schemas.openxmlformats.org/officeDocument/2006/math" xmlns:a14="http://schemas.microsoft.com/office/drawing/2010/main" xmlns:ma14="http://schemas.microsoft.com/office/mac/drawingml/2011/main" val="1"/>
             </a:ext>
           </a:extLst>
         </p:spPr>
@@ -2521,7 +2526,7 @@
           </a:ln>
           <a:extLst>
             <a:ext uri="{C572A759-6A51-4108-AA02-DFA0A04FC94B}">
-              <ma14:wrappingTextBoxFlag xmlns:ma14="http://schemas.microsoft.com/office/mac/drawingml/2011/main" xmlns:a14="http://schemas.microsoft.com/office/drawing/2010/main" xmlns:m="http://schemas.openxmlformats.org/officeDocument/2006/math" xmlns="" val="1"/>
+              <ma14:wrappingTextBoxFlag xmlns="" xmlns:m="http://schemas.openxmlformats.org/officeDocument/2006/math" xmlns:a14="http://schemas.microsoft.com/office/drawing/2010/main" xmlns:ma14="http://schemas.microsoft.com/office/mac/drawingml/2011/main" val="1"/>
             </a:ext>
           </a:extLst>
         </p:spPr>
@@ -3531,7 +3536,7 @@
             <a:effectLst/>
             <a:extLst>
               <a:ext uri="{C572A759-6A51-4108-AA02-DFA0A04FC94B}">
-                <ma14:wrappingTextBoxFlag xmlns:ma14="http://schemas.microsoft.com/office/mac/drawingml/2011/main" xmlns:a14="http://schemas.microsoft.com/office/drawing/2010/main" xmlns:m="http://schemas.openxmlformats.org/officeDocument/2006/math" xmlns="" val="1"/>
+                <ma14:wrappingTextBoxFlag xmlns="" xmlns:m="http://schemas.openxmlformats.org/officeDocument/2006/math" xmlns:a14="http://schemas.microsoft.com/office/drawing/2010/main" xmlns:ma14="http://schemas.microsoft.com/office/mac/drawingml/2011/main" val="1"/>
               </a:ext>
             </a:extLst>
           </p:spPr>
@@ -3588,7 +3593,7 @@
             <a:effectLst/>
             <a:extLst>
               <a:ext uri="{C572A759-6A51-4108-AA02-DFA0A04FC94B}">
-                <ma14:wrappingTextBoxFlag xmlns:ma14="http://schemas.microsoft.com/office/mac/drawingml/2011/main" xmlns:a14="http://schemas.microsoft.com/office/drawing/2010/main" xmlns:m="http://schemas.openxmlformats.org/officeDocument/2006/math" xmlns="" val="1"/>
+                <ma14:wrappingTextBoxFlag xmlns="" xmlns:m="http://schemas.openxmlformats.org/officeDocument/2006/math" xmlns:a14="http://schemas.microsoft.com/office/drawing/2010/main" xmlns:ma14="http://schemas.microsoft.com/office/mac/drawingml/2011/main" val="1"/>
               </a:ext>
             </a:extLst>
           </p:spPr>
@@ -3638,7 +3643,7 @@
             <a:effectLst/>
             <a:extLst>
               <a:ext uri="{C572A759-6A51-4108-AA02-DFA0A04FC94B}">
-                <ma14:wrappingTextBoxFlag xmlns:ma14="http://schemas.microsoft.com/office/mac/drawingml/2011/main" xmlns:a14="http://schemas.microsoft.com/office/drawing/2010/main" xmlns:m="http://schemas.openxmlformats.org/officeDocument/2006/math" xmlns="" val="1"/>
+                <ma14:wrappingTextBoxFlag xmlns="" xmlns:m="http://schemas.openxmlformats.org/officeDocument/2006/math" xmlns:a14="http://schemas.microsoft.com/office/drawing/2010/main" xmlns:ma14="http://schemas.microsoft.com/office/mac/drawingml/2011/main" val="1"/>
               </a:ext>
             </a:extLst>
           </p:spPr>
@@ -3683,7 +3688,7 @@
           </a:ln>
           <a:extLst>
             <a:ext uri="{C572A759-6A51-4108-AA02-DFA0A04FC94B}">
-              <ma14:wrappingTextBoxFlag xmlns:ma14="http://schemas.microsoft.com/office/mac/drawingml/2011/main" xmlns:a14="http://schemas.microsoft.com/office/drawing/2010/main" xmlns:m="http://schemas.openxmlformats.org/officeDocument/2006/math" xmlns="" val="1"/>
+              <ma14:wrappingTextBoxFlag xmlns="" xmlns:m="http://schemas.openxmlformats.org/officeDocument/2006/math" xmlns:a14="http://schemas.microsoft.com/office/drawing/2010/main" xmlns:ma14="http://schemas.microsoft.com/office/mac/drawingml/2011/main" val="1"/>
             </a:ext>
           </a:extLst>
         </p:spPr>
@@ -3730,7 +3735,7 @@
           </a:ln>
           <a:extLst>
             <a:ext uri="{C572A759-6A51-4108-AA02-DFA0A04FC94B}">
-              <ma14:wrappingTextBoxFlag xmlns:ma14="http://schemas.microsoft.com/office/mac/drawingml/2011/main" xmlns:a14="http://schemas.microsoft.com/office/drawing/2010/main" xmlns:m="http://schemas.openxmlformats.org/officeDocument/2006/math" xmlns="" val="1"/>
+              <ma14:wrappingTextBoxFlag xmlns="" xmlns:m="http://schemas.openxmlformats.org/officeDocument/2006/math" xmlns:a14="http://schemas.microsoft.com/office/drawing/2010/main" xmlns:ma14="http://schemas.microsoft.com/office/mac/drawingml/2011/main" val="1"/>
             </a:ext>
           </a:extLst>
         </p:spPr>
@@ -3777,7 +3782,7 @@
           </a:ln>
           <a:extLst>
             <a:ext uri="{C572A759-6A51-4108-AA02-DFA0A04FC94B}">
-              <ma14:wrappingTextBoxFlag xmlns:ma14="http://schemas.microsoft.com/office/mac/drawingml/2011/main" xmlns:a14="http://schemas.microsoft.com/office/drawing/2010/main" xmlns:m="http://schemas.openxmlformats.org/officeDocument/2006/math" xmlns="" val="1"/>
+              <ma14:wrappingTextBoxFlag xmlns="" xmlns:m="http://schemas.openxmlformats.org/officeDocument/2006/math" xmlns:a14="http://schemas.microsoft.com/office/drawing/2010/main" xmlns:ma14="http://schemas.microsoft.com/office/mac/drawingml/2011/main" val="1"/>
             </a:ext>
           </a:extLst>
         </p:spPr>
@@ -3824,7 +3829,7 @@
           </a:ln>
           <a:extLst>
             <a:ext uri="{C572A759-6A51-4108-AA02-DFA0A04FC94B}">
-              <ma14:wrappingTextBoxFlag xmlns:ma14="http://schemas.microsoft.com/office/mac/drawingml/2011/main" xmlns:a14="http://schemas.microsoft.com/office/drawing/2010/main" xmlns:m="http://schemas.openxmlformats.org/officeDocument/2006/math" xmlns="" val="1"/>
+              <ma14:wrappingTextBoxFlag xmlns="" xmlns:m="http://schemas.openxmlformats.org/officeDocument/2006/math" xmlns:a14="http://schemas.microsoft.com/office/drawing/2010/main" xmlns:ma14="http://schemas.microsoft.com/office/mac/drawingml/2011/main" val="1"/>
             </a:ext>
           </a:extLst>
         </p:spPr>
@@ -3867,7 +3872,7 @@
           </a:ln>
           <a:extLst>
             <a:ext uri="{C572A759-6A51-4108-AA02-DFA0A04FC94B}">
-              <ma14:wrappingTextBoxFlag xmlns:ma14="http://schemas.microsoft.com/office/mac/drawingml/2011/main" xmlns:a14="http://schemas.microsoft.com/office/drawing/2010/main" xmlns:m="http://schemas.openxmlformats.org/officeDocument/2006/math" xmlns="" val="1"/>
+              <ma14:wrappingTextBoxFlag xmlns="" xmlns:m="http://schemas.openxmlformats.org/officeDocument/2006/math" xmlns:a14="http://schemas.microsoft.com/office/drawing/2010/main" xmlns:ma14="http://schemas.microsoft.com/office/mac/drawingml/2011/main" val="1"/>
             </a:ext>
           </a:extLst>
         </p:spPr>
@@ -4087,7 +4092,7 @@
           </a:ln>
           <a:extLst>
             <a:ext uri="{C572A759-6A51-4108-AA02-DFA0A04FC94B}">
-              <ma14:wrappingTextBoxFlag xmlns:ma14="http://schemas.microsoft.com/office/mac/drawingml/2011/main" xmlns:a14="http://schemas.microsoft.com/office/drawing/2010/main" xmlns:m="http://schemas.openxmlformats.org/officeDocument/2006/math" xmlns="" val="1"/>
+              <ma14:wrappingTextBoxFlag xmlns="" xmlns:m="http://schemas.openxmlformats.org/officeDocument/2006/math" xmlns:a14="http://schemas.microsoft.com/office/drawing/2010/main" xmlns:ma14="http://schemas.microsoft.com/office/mac/drawingml/2011/main" val="1"/>
             </a:ext>
           </a:extLst>
         </p:spPr>
@@ -4134,7 +4139,7 @@
           </a:ln>
           <a:extLst>
             <a:ext uri="{C572A759-6A51-4108-AA02-DFA0A04FC94B}">
-              <ma14:wrappingTextBoxFlag xmlns:ma14="http://schemas.microsoft.com/office/mac/drawingml/2011/main" xmlns:a14="http://schemas.microsoft.com/office/drawing/2010/main" xmlns:m="http://schemas.openxmlformats.org/officeDocument/2006/math" xmlns="" val="1"/>
+              <ma14:wrappingTextBoxFlag xmlns="" xmlns:m="http://schemas.openxmlformats.org/officeDocument/2006/math" xmlns:a14="http://schemas.microsoft.com/office/drawing/2010/main" xmlns:ma14="http://schemas.microsoft.com/office/mac/drawingml/2011/main" val="1"/>
             </a:ext>
           </a:extLst>
         </p:spPr>
@@ -4178,7 +4183,7 @@
           </a:ln>
           <a:extLst>
             <a:ext uri="{C572A759-6A51-4108-AA02-DFA0A04FC94B}">
-              <ma14:wrappingTextBoxFlag xmlns:ma14="http://schemas.microsoft.com/office/mac/drawingml/2011/main" xmlns:a14="http://schemas.microsoft.com/office/drawing/2010/main" xmlns:m="http://schemas.openxmlformats.org/officeDocument/2006/math" xmlns="" val="1"/>
+              <ma14:wrappingTextBoxFlag xmlns="" xmlns:m="http://schemas.openxmlformats.org/officeDocument/2006/math" xmlns:a14="http://schemas.microsoft.com/office/drawing/2010/main" xmlns:ma14="http://schemas.microsoft.com/office/mac/drawingml/2011/main" val="1"/>
             </a:ext>
           </a:extLst>
         </p:spPr>
@@ -4225,7 +4230,7 @@
           </a:ln>
           <a:extLst>
             <a:ext uri="{C572A759-6A51-4108-AA02-DFA0A04FC94B}">
-              <ma14:wrappingTextBoxFlag xmlns:ma14="http://schemas.microsoft.com/office/mac/drawingml/2011/main" xmlns:a14="http://schemas.microsoft.com/office/drawing/2010/main" xmlns:m="http://schemas.openxmlformats.org/officeDocument/2006/math" xmlns="" val="1"/>
+              <ma14:wrappingTextBoxFlag xmlns="" xmlns:m="http://schemas.openxmlformats.org/officeDocument/2006/math" xmlns:a14="http://schemas.microsoft.com/office/drawing/2010/main" xmlns:ma14="http://schemas.microsoft.com/office/mac/drawingml/2011/main" val="1"/>
             </a:ext>
           </a:extLst>
         </p:spPr>
@@ -4269,7 +4274,7 @@
           </a:ln>
           <a:extLst>
             <a:ext uri="{C572A759-6A51-4108-AA02-DFA0A04FC94B}">
-              <ma14:wrappingTextBoxFlag xmlns:ma14="http://schemas.microsoft.com/office/mac/drawingml/2011/main" xmlns:a14="http://schemas.microsoft.com/office/drawing/2010/main" xmlns:m="http://schemas.openxmlformats.org/officeDocument/2006/math" xmlns="" val="1"/>
+              <ma14:wrappingTextBoxFlag xmlns="" xmlns:m="http://schemas.openxmlformats.org/officeDocument/2006/math" xmlns:a14="http://schemas.microsoft.com/office/drawing/2010/main" xmlns:ma14="http://schemas.microsoft.com/office/mac/drawingml/2011/main" val="1"/>
             </a:ext>
           </a:extLst>
         </p:spPr>
@@ -4316,7 +4321,7 @@
           </a:ln>
           <a:extLst>
             <a:ext uri="{C572A759-6A51-4108-AA02-DFA0A04FC94B}">
-              <ma14:wrappingTextBoxFlag xmlns:ma14="http://schemas.microsoft.com/office/mac/drawingml/2011/main" xmlns:a14="http://schemas.microsoft.com/office/drawing/2010/main" xmlns:m="http://schemas.openxmlformats.org/officeDocument/2006/math" xmlns="" val="1"/>
+              <ma14:wrappingTextBoxFlag xmlns="" xmlns:m="http://schemas.openxmlformats.org/officeDocument/2006/math" xmlns:a14="http://schemas.microsoft.com/office/drawing/2010/main" xmlns:ma14="http://schemas.microsoft.com/office/mac/drawingml/2011/main" val="1"/>
             </a:ext>
           </a:extLst>
         </p:spPr>
@@ -4360,7 +4365,7 @@
           </a:ln>
           <a:extLst>
             <a:ext uri="{C572A759-6A51-4108-AA02-DFA0A04FC94B}">
-              <ma14:wrappingTextBoxFlag xmlns:ma14="http://schemas.microsoft.com/office/mac/drawingml/2011/main" xmlns:a14="http://schemas.microsoft.com/office/drawing/2010/main" xmlns:m="http://schemas.openxmlformats.org/officeDocument/2006/math" xmlns="" val="1"/>
+              <ma14:wrappingTextBoxFlag xmlns="" xmlns:m="http://schemas.openxmlformats.org/officeDocument/2006/math" xmlns:a14="http://schemas.microsoft.com/office/drawing/2010/main" xmlns:ma14="http://schemas.microsoft.com/office/mac/drawingml/2011/main" val="1"/>
             </a:ext>
           </a:extLst>
         </p:spPr>
@@ -4407,7 +4412,7 @@
           </a:ln>
           <a:extLst>
             <a:ext uri="{C572A759-6A51-4108-AA02-DFA0A04FC94B}">
-              <ma14:wrappingTextBoxFlag xmlns:ma14="http://schemas.microsoft.com/office/mac/drawingml/2011/main" xmlns:a14="http://schemas.microsoft.com/office/drawing/2010/main" xmlns:m="http://schemas.openxmlformats.org/officeDocument/2006/math" xmlns="" val="1"/>
+              <ma14:wrappingTextBoxFlag xmlns="" xmlns:m="http://schemas.openxmlformats.org/officeDocument/2006/math" xmlns:a14="http://schemas.microsoft.com/office/drawing/2010/main" xmlns:ma14="http://schemas.microsoft.com/office/mac/drawingml/2011/main" val="1"/>
             </a:ext>
           </a:extLst>
         </p:spPr>
@@ -4683,7 +4688,7 @@
           </a:ln>
           <a:extLst>
             <a:ext uri="{C572A759-6A51-4108-AA02-DFA0A04FC94B}">
-              <ma14:wrappingTextBoxFlag xmlns:ma14="http://schemas.microsoft.com/office/mac/drawingml/2011/main" xmlns:a14="http://schemas.microsoft.com/office/drawing/2010/main" xmlns:m="http://schemas.openxmlformats.org/officeDocument/2006/math" xmlns="" val="1"/>
+              <ma14:wrappingTextBoxFlag xmlns="" xmlns:m="http://schemas.openxmlformats.org/officeDocument/2006/math" xmlns:a14="http://schemas.microsoft.com/office/drawing/2010/main" xmlns:ma14="http://schemas.microsoft.com/office/mac/drawingml/2011/main" val="1"/>
             </a:ext>
           </a:extLst>
         </p:spPr>
@@ -4799,7 +4804,7 @@
           </a:ln>
           <a:extLst>
             <a:ext uri="{C572A759-6A51-4108-AA02-DFA0A04FC94B}">
-              <ma14:wrappingTextBoxFlag xmlns:ma14="http://schemas.microsoft.com/office/mac/drawingml/2011/main" xmlns:a14="http://schemas.microsoft.com/office/drawing/2010/main" xmlns:m="http://schemas.openxmlformats.org/officeDocument/2006/math" xmlns="" val="1"/>
+              <ma14:wrappingTextBoxFlag xmlns="" xmlns:m="http://schemas.openxmlformats.org/officeDocument/2006/math" xmlns:a14="http://schemas.microsoft.com/office/drawing/2010/main" xmlns:ma14="http://schemas.microsoft.com/office/mac/drawingml/2011/main" val="1"/>
             </a:ext>
           </a:extLst>
         </p:spPr>
@@ -4869,7 +4874,7 @@
           </a:ln>
           <a:extLst>
             <a:ext uri="{C572A759-6A51-4108-AA02-DFA0A04FC94B}">
-              <ma14:wrappingTextBoxFlag xmlns:ma14="http://schemas.microsoft.com/office/mac/drawingml/2011/main" xmlns:a14="http://schemas.microsoft.com/office/drawing/2010/main" xmlns:m="http://schemas.openxmlformats.org/officeDocument/2006/math" xmlns="" val="1"/>
+              <ma14:wrappingTextBoxFlag xmlns="" xmlns:m="http://schemas.openxmlformats.org/officeDocument/2006/math" xmlns:a14="http://schemas.microsoft.com/office/drawing/2010/main" xmlns:ma14="http://schemas.microsoft.com/office/mac/drawingml/2011/main" val="1"/>
             </a:ext>
           </a:extLst>
         </p:spPr>
@@ -4984,7 +4989,7 @@
           </a:ln>
           <a:extLst>
             <a:ext uri="{C572A759-6A51-4108-AA02-DFA0A04FC94B}">
-              <ma14:wrappingTextBoxFlag xmlns:ma14="http://schemas.microsoft.com/office/mac/drawingml/2011/main" xmlns:a14="http://schemas.microsoft.com/office/drawing/2010/main" xmlns:m="http://schemas.openxmlformats.org/officeDocument/2006/math" xmlns="" val="1"/>
+              <ma14:wrappingTextBoxFlag xmlns="" xmlns:m="http://schemas.openxmlformats.org/officeDocument/2006/math" xmlns:a14="http://schemas.microsoft.com/office/drawing/2010/main" xmlns:ma14="http://schemas.microsoft.com/office/mac/drawingml/2011/main" val="1"/>
             </a:ext>
           </a:extLst>
         </p:spPr>
@@ -5148,7 +5153,7 @@
           </a:ln>
           <a:extLst>
             <a:ext uri="{C572A759-6A51-4108-AA02-DFA0A04FC94B}">
-              <ma14:wrappingTextBoxFlag xmlns:ma14="http://schemas.microsoft.com/office/mac/drawingml/2011/main" xmlns:a14="http://schemas.microsoft.com/office/drawing/2010/main" xmlns:m="http://schemas.openxmlformats.org/officeDocument/2006/math" xmlns="" val="1"/>
+              <ma14:wrappingTextBoxFlag xmlns="" xmlns:m="http://schemas.openxmlformats.org/officeDocument/2006/math" xmlns:a14="http://schemas.microsoft.com/office/drawing/2010/main" xmlns:ma14="http://schemas.microsoft.com/office/mac/drawingml/2011/main" val="1"/>
             </a:ext>
           </a:extLst>
         </p:spPr>
@@ -5193,7 +5198,7 @@
           </a:ln>
           <a:extLst>
             <a:ext uri="{C572A759-6A51-4108-AA02-DFA0A04FC94B}">
-              <ma14:wrappingTextBoxFlag xmlns:ma14="http://schemas.microsoft.com/office/mac/drawingml/2011/main" xmlns:a14="http://schemas.microsoft.com/office/drawing/2010/main" xmlns:m="http://schemas.openxmlformats.org/officeDocument/2006/math" xmlns="" val="1"/>
+              <ma14:wrappingTextBoxFlag xmlns="" xmlns:m="http://schemas.openxmlformats.org/officeDocument/2006/math" xmlns:a14="http://schemas.microsoft.com/office/drawing/2010/main" xmlns:ma14="http://schemas.microsoft.com/office/mac/drawingml/2011/main" val="1"/>
             </a:ext>
           </a:extLst>
         </p:spPr>
@@ -5274,7 +5279,7 @@
           </a:ln>
           <a:extLst>
             <a:ext uri="{C572A759-6A51-4108-AA02-DFA0A04FC94B}">
-              <ma14:wrappingTextBoxFlag xmlns:ma14="http://schemas.microsoft.com/office/mac/drawingml/2011/main" xmlns:a14="http://schemas.microsoft.com/office/drawing/2010/main" xmlns:m="http://schemas.openxmlformats.org/officeDocument/2006/math" xmlns="" val="1"/>
+              <ma14:wrappingTextBoxFlag xmlns="" xmlns:m="http://schemas.openxmlformats.org/officeDocument/2006/math" xmlns:a14="http://schemas.microsoft.com/office/drawing/2010/main" xmlns:ma14="http://schemas.microsoft.com/office/mac/drawingml/2011/main" val="1"/>
             </a:ext>
           </a:extLst>
         </p:spPr>
@@ -5438,7 +5443,7 @@
           </a:ln>
           <a:extLst>
             <a:ext uri="{C572A759-6A51-4108-AA02-DFA0A04FC94B}">
-              <ma14:wrappingTextBoxFlag xmlns:ma14="http://schemas.microsoft.com/office/mac/drawingml/2011/main" xmlns:a14="http://schemas.microsoft.com/office/drawing/2010/main" xmlns:m="http://schemas.openxmlformats.org/officeDocument/2006/math" xmlns="" val="1"/>
+              <ma14:wrappingTextBoxFlag xmlns="" xmlns:m="http://schemas.openxmlformats.org/officeDocument/2006/math" xmlns:a14="http://schemas.microsoft.com/office/drawing/2010/main" xmlns:ma14="http://schemas.microsoft.com/office/mac/drawingml/2011/main" val="1"/>
             </a:ext>
           </a:extLst>
         </p:spPr>
@@ -5483,7 +5488,7 @@
           </a:ln>
           <a:extLst>
             <a:ext uri="{C572A759-6A51-4108-AA02-DFA0A04FC94B}">
-              <ma14:wrappingTextBoxFlag xmlns:ma14="http://schemas.microsoft.com/office/mac/drawingml/2011/main" xmlns:a14="http://schemas.microsoft.com/office/drawing/2010/main" xmlns:m="http://schemas.openxmlformats.org/officeDocument/2006/math" xmlns="" val="1"/>
+              <ma14:wrappingTextBoxFlag xmlns="" xmlns:m="http://schemas.openxmlformats.org/officeDocument/2006/math" xmlns:a14="http://schemas.microsoft.com/office/drawing/2010/main" xmlns:ma14="http://schemas.microsoft.com/office/mac/drawingml/2011/main" val="1"/>
             </a:ext>
           </a:extLst>
         </p:spPr>
@@ -5567,7 +5572,7 @@
           </a:ln>
           <a:extLst>
             <a:ext uri="{C572A759-6A51-4108-AA02-DFA0A04FC94B}">
-              <ma14:wrappingTextBoxFlag xmlns:ma14="http://schemas.microsoft.com/office/mac/drawingml/2011/main" xmlns:a14="http://schemas.microsoft.com/office/drawing/2010/main" xmlns:m="http://schemas.openxmlformats.org/officeDocument/2006/math" xmlns="" val="1"/>
+              <ma14:wrappingTextBoxFlag xmlns="" xmlns:m="http://schemas.openxmlformats.org/officeDocument/2006/math" xmlns:a14="http://schemas.microsoft.com/office/drawing/2010/main" xmlns:ma14="http://schemas.microsoft.com/office/mac/drawingml/2011/main" val="1"/>
             </a:ext>
           </a:extLst>
         </p:spPr>
@@ -5602,7 +5607,7 @@
           </a:ln>
           <a:extLst>
             <a:ext uri="{C572A759-6A51-4108-AA02-DFA0A04FC94B}">
-              <ma14:wrappingTextBoxFlag xmlns:ma14="http://schemas.microsoft.com/office/mac/drawingml/2011/main" xmlns:a14="http://schemas.microsoft.com/office/drawing/2010/main" xmlns:m="http://schemas.openxmlformats.org/officeDocument/2006/math" xmlns="" val="1"/>
+              <ma14:wrappingTextBoxFlag xmlns="" xmlns:m="http://schemas.openxmlformats.org/officeDocument/2006/math" xmlns:a14="http://schemas.microsoft.com/office/drawing/2010/main" xmlns:ma14="http://schemas.microsoft.com/office/mac/drawingml/2011/main" val="1"/>
             </a:ext>
           </a:extLst>
         </p:spPr>
@@ -5663,7 +5668,7 @@
           </a:ln>
           <a:extLst>
             <a:ext uri="{C572A759-6A51-4108-AA02-DFA0A04FC94B}">
-              <ma14:wrappingTextBoxFlag xmlns:ma14="http://schemas.microsoft.com/office/mac/drawingml/2011/main" xmlns:a14="http://schemas.microsoft.com/office/drawing/2010/main" xmlns:m="http://schemas.openxmlformats.org/officeDocument/2006/math" xmlns="" val="1"/>
+              <ma14:wrappingTextBoxFlag xmlns="" xmlns:m="http://schemas.openxmlformats.org/officeDocument/2006/math" xmlns:a14="http://schemas.microsoft.com/office/drawing/2010/main" xmlns:ma14="http://schemas.microsoft.com/office/mac/drawingml/2011/main" val="1"/>
             </a:ext>
           </a:extLst>
         </p:spPr>
@@ -5827,7 +5832,7 @@
           </a:ln>
           <a:extLst>
             <a:ext uri="{C572A759-6A51-4108-AA02-DFA0A04FC94B}">
-              <ma14:wrappingTextBoxFlag xmlns:ma14="http://schemas.microsoft.com/office/mac/drawingml/2011/main" xmlns:a14="http://schemas.microsoft.com/office/drawing/2010/main" xmlns:m="http://schemas.openxmlformats.org/officeDocument/2006/math" xmlns="" val="1"/>
+              <ma14:wrappingTextBoxFlag xmlns="" xmlns:m="http://schemas.openxmlformats.org/officeDocument/2006/math" xmlns:a14="http://schemas.microsoft.com/office/drawing/2010/main" xmlns:ma14="http://schemas.microsoft.com/office/mac/drawingml/2011/main" val="1"/>
             </a:ext>
           </a:extLst>
         </p:spPr>
@@ -5872,7 +5877,7 @@
           </a:ln>
           <a:extLst>
             <a:ext uri="{C572A759-6A51-4108-AA02-DFA0A04FC94B}">
-              <ma14:wrappingTextBoxFlag xmlns:ma14="http://schemas.microsoft.com/office/mac/drawingml/2011/main" xmlns:a14="http://schemas.microsoft.com/office/drawing/2010/main" xmlns:m="http://schemas.openxmlformats.org/officeDocument/2006/math" xmlns="" val="1"/>
+              <ma14:wrappingTextBoxFlag xmlns="" xmlns:m="http://schemas.openxmlformats.org/officeDocument/2006/math" xmlns:a14="http://schemas.microsoft.com/office/drawing/2010/main" xmlns:ma14="http://schemas.microsoft.com/office/mac/drawingml/2011/main" val="1"/>
             </a:ext>
           </a:extLst>
         </p:spPr>
@@ -5953,7 +5958,7 @@
           </a:ln>
           <a:extLst>
             <a:ext uri="{C572A759-6A51-4108-AA02-DFA0A04FC94B}">
-              <ma14:wrappingTextBoxFlag xmlns:ma14="http://schemas.microsoft.com/office/mac/drawingml/2011/main" xmlns:a14="http://schemas.microsoft.com/office/drawing/2010/main" xmlns:m="http://schemas.openxmlformats.org/officeDocument/2006/math" xmlns="" val="1"/>
+              <ma14:wrappingTextBoxFlag xmlns="" xmlns:m="http://schemas.openxmlformats.org/officeDocument/2006/math" xmlns:a14="http://schemas.microsoft.com/office/drawing/2010/main" xmlns:ma14="http://schemas.microsoft.com/office/mac/drawingml/2011/main" val="1"/>
             </a:ext>
           </a:extLst>
         </p:spPr>
@@ -6117,7 +6122,7 @@
           </a:ln>
           <a:extLst>
             <a:ext uri="{C572A759-6A51-4108-AA02-DFA0A04FC94B}">
-              <ma14:wrappingTextBoxFlag xmlns:ma14="http://schemas.microsoft.com/office/mac/drawingml/2011/main" xmlns:a14="http://schemas.microsoft.com/office/drawing/2010/main" xmlns:m="http://schemas.openxmlformats.org/officeDocument/2006/math" xmlns="" val="1"/>
+              <ma14:wrappingTextBoxFlag xmlns="" xmlns:m="http://schemas.openxmlformats.org/officeDocument/2006/math" xmlns:a14="http://schemas.microsoft.com/office/drawing/2010/main" xmlns:ma14="http://schemas.microsoft.com/office/mac/drawingml/2011/main" val="1"/>
             </a:ext>
           </a:extLst>
         </p:spPr>
@@ -6162,7 +6167,7 @@
           </a:ln>
           <a:extLst>
             <a:ext uri="{C572A759-6A51-4108-AA02-DFA0A04FC94B}">
-              <ma14:wrappingTextBoxFlag xmlns:ma14="http://schemas.microsoft.com/office/mac/drawingml/2011/main" xmlns:a14="http://schemas.microsoft.com/office/drawing/2010/main" xmlns:m="http://schemas.openxmlformats.org/officeDocument/2006/math" xmlns="" val="1"/>
+              <ma14:wrappingTextBoxFlag xmlns="" xmlns:m="http://schemas.openxmlformats.org/officeDocument/2006/math" xmlns:a14="http://schemas.microsoft.com/office/drawing/2010/main" xmlns:ma14="http://schemas.microsoft.com/office/mac/drawingml/2011/main" val="1"/>
             </a:ext>
           </a:extLst>
         </p:spPr>
@@ -6220,7 +6225,7 @@
           </a:ln>
           <a:extLst>
             <a:ext uri="{C572A759-6A51-4108-AA02-DFA0A04FC94B}">
-              <ma14:wrappingTextBoxFlag xmlns:ma14="http://schemas.microsoft.com/office/mac/drawingml/2011/main" xmlns:a14="http://schemas.microsoft.com/office/drawing/2010/main" xmlns:m="http://schemas.openxmlformats.org/officeDocument/2006/math" xmlns="" val="1"/>
+              <ma14:wrappingTextBoxFlag xmlns="" xmlns:m="http://schemas.openxmlformats.org/officeDocument/2006/math" xmlns:a14="http://schemas.microsoft.com/office/drawing/2010/main" xmlns:ma14="http://schemas.microsoft.com/office/mac/drawingml/2011/main" val="1"/>
             </a:ext>
           </a:extLst>
         </p:spPr>
@@ -6267,7 +6272,7 @@
           </a:ln>
           <a:extLst>
             <a:ext uri="{C572A759-6A51-4108-AA02-DFA0A04FC94B}">
-              <ma14:wrappingTextBoxFlag xmlns:ma14="http://schemas.microsoft.com/office/mac/drawingml/2011/main" xmlns:a14="http://schemas.microsoft.com/office/drawing/2010/main" xmlns:m="http://schemas.openxmlformats.org/officeDocument/2006/math" xmlns="" val="1"/>
+              <ma14:wrappingTextBoxFlag xmlns="" xmlns:m="http://schemas.openxmlformats.org/officeDocument/2006/math" xmlns:a14="http://schemas.microsoft.com/office/drawing/2010/main" xmlns:ma14="http://schemas.microsoft.com/office/mac/drawingml/2011/main" val="1"/>
             </a:ext>
           </a:extLst>
         </p:spPr>
@@ -6314,7 +6319,7 @@
           </a:ln>
           <a:extLst>
             <a:ext uri="{C572A759-6A51-4108-AA02-DFA0A04FC94B}">
-              <ma14:wrappingTextBoxFlag xmlns:ma14="http://schemas.microsoft.com/office/mac/drawingml/2011/main" xmlns:a14="http://schemas.microsoft.com/office/drawing/2010/main" xmlns:m="http://schemas.openxmlformats.org/officeDocument/2006/math" xmlns="" val="1"/>
+              <ma14:wrappingTextBoxFlag xmlns="" xmlns:m="http://schemas.openxmlformats.org/officeDocument/2006/math" xmlns:a14="http://schemas.microsoft.com/office/drawing/2010/main" xmlns:ma14="http://schemas.microsoft.com/office/mac/drawingml/2011/main" val="1"/>
             </a:ext>
           </a:extLst>
         </p:spPr>
@@ -6361,7 +6366,7 @@
           </a:ln>
           <a:extLst>
             <a:ext uri="{C572A759-6A51-4108-AA02-DFA0A04FC94B}">
-              <ma14:wrappingTextBoxFlag xmlns:ma14="http://schemas.microsoft.com/office/mac/drawingml/2011/main" xmlns:a14="http://schemas.microsoft.com/office/drawing/2010/main" xmlns:m="http://schemas.openxmlformats.org/officeDocument/2006/math" xmlns="" val="1"/>
+              <ma14:wrappingTextBoxFlag xmlns="" xmlns:m="http://schemas.openxmlformats.org/officeDocument/2006/math" xmlns:a14="http://schemas.microsoft.com/office/drawing/2010/main" xmlns:ma14="http://schemas.microsoft.com/office/mac/drawingml/2011/main" val="1"/>
             </a:ext>
           </a:extLst>
         </p:spPr>
@@ -6408,7 +6413,7 @@
           </a:ln>
           <a:extLst>
             <a:ext uri="{C572A759-6A51-4108-AA02-DFA0A04FC94B}">
-              <ma14:wrappingTextBoxFlag xmlns:ma14="http://schemas.microsoft.com/office/mac/drawingml/2011/main" xmlns:a14="http://schemas.microsoft.com/office/drawing/2010/main" xmlns:m="http://schemas.openxmlformats.org/officeDocument/2006/math" xmlns="" val="1"/>
+              <ma14:wrappingTextBoxFlag xmlns="" xmlns:m="http://schemas.openxmlformats.org/officeDocument/2006/math" xmlns:a14="http://schemas.microsoft.com/office/drawing/2010/main" xmlns:ma14="http://schemas.microsoft.com/office/mac/drawingml/2011/main" val="1"/>
             </a:ext>
           </a:extLst>
         </p:spPr>
@@ -6478,7 +6483,7 @@
           </a:ln>
           <a:extLst>
             <a:ext uri="{C572A759-6A51-4108-AA02-DFA0A04FC94B}">
-              <ma14:wrappingTextBoxFlag xmlns:ma14="http://schemas.microsoft.com/office/mac/drawingml/2011/main" xmlns:a14="http://schemas.microsoft.com/office/drawing/2010/main" xmlns:m="http://schemas.openxmlformats.org/officeDocument/2006/math" xmlns="" val="1"/>
+              <ma14:wrappingTextBoxFlag xmlns="" xmlns:m="http://schemas.openxmlformats.org/officeDocument/2006/math" xmlns:a14="http://schemas.microsoft.com/office/drawing/2010/main" xmlns:ma14="http://schemas.microsoft.com/office/mac/drawingml/2011/main" val="1"/>
             </a:ext>
           </a:extLst>
         </p:spPr>
@@ -6558,7 +6563,7 @@
           </a:ln>
           <a:extLst>
             <a:ext uri="{C572A759-6A51-4108-AA02-DFA0A04FC94B}">
-              <ma14:wrappingTextBoxFlag xmlns:ma14="http://schemas.microsoft.com/office/mac/drawingml/2011/main" xmlns:a14="http://schemas.microsoft.com/office/drawing/2010/main" xmlns:m="http://schemas.openxmlformats.org/officeDocument/2006/math" xmlns="" val="1"/>
+              <ma14:wrappingTextBoxFlag xmlns="" xmlns:m="http://schemas.openxmlformats.org/officeDocument/2006/math" xmlns:a14="http://schemas.microsoft.com/office/drawing/2010/main" xmlns:ma14="http://schemas.microsoft.com/office/mac/drawingml/2011/main" val="1"/>
             </a:ext>
           </a:extLst>
         </p:spPr>
@@ -6603,7 +6608,7 @@
           </a:ln>
           <a:extLst>
             <a:ext uri="{C572A759-6A51-4108-AA02-DFA0A04FC94B}">
-              <ma14:wrappingTextBoxFlag xmlns:ma14="http://schemas.microsoft.com/office/mac/drawingml/2011/main" xmlns:a14="http://schemas.microsoft.com/office/drawing/2010/main" xmlns:m="http://schemas.openxmlformats.org/officeDocument/2006/math" xmlns="" val="1"/>
+              <ma14:wrappingTextBoxFlag xmlns="" xmlns:m="http://schemas.openxmlformats.org/officeDocument/2006/math" xmlns:a14="http://schemas.microsoft.com/office/drawing/2010/main" xmlns:ma14="http://schemas.microsoft.com/office/mac/drawingml/2011/main" val="1"/>
             </a:ext>
           </a:extLst>
         </p:spPr>
@@ -6661,7 +6666,7 @@
           </a:ln>
           <a:extLst>
             <a:ext uri="{C572A759-6A51-4108-AA02-DFA0A04FC94B}">
-              <ma14:wrappingTextBoxFlag xmlns:ma14="http://schemas.microsoft.com/office/mac/drawingml/2011/main" xmlns:a14="http://schemas.microsoft.com/office/drawing/2010/main" xmlns:m="http://schemas.openxmlformats.org/officeDocument/2006/math" xmlns="" val="1"/>
+              <ma14:wrappingTextBoxFlag xmlns="" xmlns:m="http://schemas.openxmlformats.org/officeDocument/2006/math" xmlns:a14="http://schemas.microsoft.com/office/drawing/2010/main" xmlns:ma14="http://schemas.microsoft.com/office/mac/drawingml/2011/main" val="1"/>
             </a:ext>
           </a:extLst>
         </p:spPr>
@@ -6708,7 +6713,7 @@
           </a:ln>
           <a:extLst>
             <a:ext uri="{C572A759-6A51-4108-AA02-DFA0A04FC94B}">
-              <ma14:wrappingTextBoxFlag xmlns:ma14="http://schemas.microsoft.com/office/mac/drawingml/2011/main" xmlns:a14="http://schemas.microsoft.com/office/drawing/2010/main" xmlns:m="http://schemas.openxmlformats.org/officeDocument/2006/math" xmlns="" val="1"/>
+              <ma14:wrappingTextBoxFlag xmlns="" xmlns:m="http://schemas.openxmlformats.org/officeDocument/2006/math" xmlns:a14="http://schemas.microsoft.com/office/drawing/2010/main" xmlns:ma14="http://schemas.microsoft.com/office/mac/drawingml/2011/main" val="1"/>
             </a:ext>
           </a:extLst>
         </p:spPr>
@@ -6755,7 +6760,7 @@
           </a:ln>
           <a:extLst>
             <a:ext uri="{C572A759-6A51-4108-AA02-DFA0A04FC94B}">
-              <ma14:wrappingTextBoxFlag xmlns:ma14="http://schemas.microsoft.com/office/mac/drawingml/2011/main" xmlns:a14="http://schemas.microsoft.com/office/drawing/2010/main" xmlns:m="http://schemas.openxmlformats.org/officeDocument/2006/math" xmlns="" val="1"/>
+              <ma14:wrappingTextBoxFlag xmlns="" xmlns:m="http://schemas.openxmlformats.org/officeDocument/2006/math" xmlns:a14="http://schemas.microsoft.com/office/drawing/2010/main" xmlns:ma14="http://schemas.microsoft.com/office/mac/drawingml/2011/main" val="1"/>
             </a:ext>
           </a:extLst>
         </p:spPr>
@@ -6802,7 +6807,7 @@
           </a:ln>
           <a:extLst>
             <a:ext uri="{C572A759-6A51-4108-AA02-DFA0A04FC94B}">
-              <ma14:wrappingTextBoxFlag xmlns:ma14="http://schemas.microsoft.com/office/mac/drawingml/2011/main" xmlns:a14="http://schemas.microsoft.com/office/drawing/2010/main" xmlns:m="http://schemas.openxmlformats.org/officeDocument/2006/math" xmlns="" val="1"/>
+              <ma14:wrappingTextBoxFlag xmlns="" xmlns:m="http://schemas.openxmlformats.org/officeDocument/2006/math" xmlns:a14="http://schemas.microsoft.com/office/drawing/2010/main" xmlns:ma14="http://schemas.microsoft.com/office/mac/drawingml/2011/main" val="1"/>
             </a:ext>
           </a:extLst>
         </p:spPr>
@@ -6849,7 +6854,7 @@
           </a:ln>
           <a:extLst>
             <a:ext uri="{C572A759-6A51-4108-AA02-DFA0A04FC94B}">
-              <ma14:wrappingTextBoxFlag xmlns:ma14="http://schemas.microsoft.com/office/mac/drawingml/2011/main" xmlns:a14="http://schemas.microsoft.com/office/drawing/2010/main" xmlns:m="http://schemas.openxmlformats.org/officeDocument/2006/math" xmlns="" val="1"/>
+              <ma14:wrappingTextBoxFlag xmlns="" xmlns:m="http://schemas.openxmlformats.org/officeDocument/2006/math" xmlns:a14="http://schemas.microsoft.com/office/drawing/2010/main" xmlns:ma14="http://schemas.microsoft.com/office/mac/drawingml/2011/main" val="1"/>
             </a:ext>
           </a:extLst>
         </p:spPr>
@@ -7257,7 +7262,7 @@
           </a:ln>
           <a:extLst>
             <a:ext uri="{C572A759-6A51-4108-AA02-DFA0A04FC94B}">
-              <ma14:wrappingTextBoxFlag xmlns:ma14="http://schemas.microsoft.com/office/mac/drawingml/2011/main" xmlns:a14="http://schemas.microsoft.com/office/drawing/2010/main" xmlns:m="http://schemas.openxmlformats.org/officeDocument/2006/math" xmlns="" val="1"/>
+              <ma14:wrappingTextBoxFlag xmlns="" xmlns:m="http://schemas.openxmlformats.org/officeDocument/2006/math" xmlns:a14="http://schemas.microsoft.com/office/drawing/2010/main" xmlns:ma14="http://schemas.microsoft.com/office/mac/drawingml/2011/main" val="1"/>
             </a:ext>
           </a:extLst>
         </p:spPr>
@@ -7331,7 +7336,7 @@
           </a:ln>
           <a:extLst>
             <a:ext uri="{C572A759-6A51-4108-AA02-DFA0A04FC94B}">
-              <ma14:wrappingTextBoxFlag xmlns:ma14="http://schemas.microsoft.com/office/mac/drawingml/2011/main" xmlns:a14="http://schemas.microsoft.com/office/drawing/2010/main" xmlns:m="http://schemas.openxmlformats.org/officeDocument/2006/math" xmlns="" val="1"/>
+              <ma14:wrappingTextBoxFlag xmlns="" xmlns:m="http://schemas.openxmlformats.org/officeDocument/2006/math" xmlns:a14="http://schemas.microsoft.com/office/drawing/2010/main" xmlns:ma14="http://schemas.microsoft.com/office/mac/drawingml/2011/main" val="1"/>
             </a:ext>
           </a:extLst>
         </p:spPr>
@@ -7540,7 +7545,7 @@
           </a:ln>
           <a:extLst>
             <a:ext uri="{C572A759-6A51-4108-AA02-DFA0A04FC94B}">
-              <ma14:wrappingTextBoxFlag xmlns:ma14="http://schemas.microsoft.com/office/mac/drawingml/2011/main" xmlns:a14="http://schemas.microsoft.com/office/drawing/2010/main" xmlns:m="http://schemas.openxmlformats.org/officeDocument/2006/math" xmlns="" val="1"/>
+              <ma14:wrappingTextBoxFlag xmlns="" xmlns:m="http://schemas.openxmlformats.org/officeDocument/2006/math" xmlns:a14="http://schemas.microsoft.com/office/drawing/2010/main" xmlns:ma14="http://schemas.microsoft.com/office/mac/drawingml/2011/main" val="1"/>
             </a:ext>
           </a:extLst>
         </p:spPr>
@@ -7602,7 +7607,7 @@
           </a:ln>
           <a:extLst>
             <a:ext uri="{C572A759-6A51-4108-AA02-DFA0A04FC94B}">
-              <ma14:wrappingTextBoxFlag xmlns:ma14="http://schemas.microsoft.com/office/mac/drawingml/2011/main" xmlns:a14="http://schemas.microsoft.com/office/drawing/2010/main" xmlns:m="http://schemas.openxmlformats.org/officeDocument/2006/math" xmlns="" val="1"/>
+              <ma14:wrappingTextBoxFlag xmlns="" xmlns:m="http://schemas.openxmlformats.org/officeDocument/2006/math" xmlns:a14="http://schemas.microsoft.com/office/drawing/2010/main" xmlns:ma14="http://schemas.microsoft.com/office/mac/drawingml/2011/main" val="1"/>
             </a:ext>
           </a:extLst>
         </p:spPr>
@@ -7813,7 +7818,7 @@
           </a:ln>
           <a:extLst>
             <a:ext uri="{C572A759-6A51-4108-AA02-DFA0A04FC94B}">
-              <ma14:wrappingTextBoxFlag xmlns:ma14="http://schemas.microsoft.com/office/mac/drawingml/2011/main" xmlns:a14="http://schemas.microsoft.com/office/drawing/2010/main" xmlns:m="http://schemas.openxmlformats.org/officeDocument/2006/math" xmlns="" val="1"/>
+              <ma14:wrappingTextBoxFlag xmlns="" xmlns:m="http://schemas.openxmlformats.org/officeDocument/2006/math" xmlns:a14="http://schemas.microsoft.com/office/drawing/2010/main" xmlns:ma14="http://schemas.microsoft.com/office/mac/drawingml/2011/main" val="1"/>
             </a:ext>
           </a:extLst>
         </p:spPr>
@@ -7929,7 +7934,7 @@
           </a:ln>
           <a:extLst>
             <a:ext uri="{C572A759-6A51-4108-AA02-DFA0A04FC94B}">
-              <ma14:wrappingTextBoxFlag xmlns:ma14="http://schemas.microsoft.com/office/mac/drawingml/2011/main" xmlns:a14="http://schemas.microsoft.com/office/drawing/2010/main" xmlns:m="http://schemas.openxmlformats.org/officeDocument/2006/math" xmlns="" val="1"/>
+              <ma14:wrappingTextBoxFlag xmlns="" xmlns:m="http://schemas.openxmlformats.org/officeDocument/2006/math" xmlns:a14="http://schemas.microsoft.com/office/drawing/2010/main" xmlns:ma14="http://schemas.microsoft.com/office/mac/drawingml/2011/main" val="1"/>
             </a:ext>
           </a:extLst>
         </p:spPr>
@@ -7987,7 +7992,7 @@
           </a:ln>
           <a:extLst>
             <a:ext uri="{C572A759-6A51-4108-AA02-DFA0A04FC94B}">
-              <ma14:wrappingTextBoxFlag xmlns:ma14="http://schemas.microsoft.com/office/mac/drawingml/2011/main" xmlns:a14="http://schemas.microsoft.com/office/drawing/2010/main" xmlns:m="http://schemas.openxmlformats.org/officeDocument/2006/math" xmlns="" val="1"/>
+              <ma14:wrappingTextBoxFlag xmlns="" xmlns:m="http://schemas.openxmlformats.org/officeDocument/2006/math" xmlns:a14="http://schemas.microsoft.com/office/drawing/2010/main" xmlns:ma14="http://schemas.microsoft.com/office/mac/drawingml/2011/main" val="1"/>
             </a:ext>
           </a:extLst>
         </p:spPr>
@@ -8116,7 +8121,7 @@
           </a:ln>
           <a:extLst>
             <a:ext uri="{C572A759-6A51-4108-AA02-DFA0A04FC94B}">
-              <ma14:wrappingTextBoxFlag xmlns:ma14="http://schemas.microsoft.com/office/mac/drawingml/2011/main" xmlns:a14="http://schemas.microsoft.com/office/drawing/2010/main" xmlns:m="http://schemas.openxmlformats.org/officeDocument/2006/math" xmlns="" val="1"/>
+              <ma14:wrappingTextBoxFlag xmlns="" xmlns:m="http://schemas.openxmlformats.org/officeDocument/2006/math" xmlns:a14="http://schemas.microsoft.com/office/drawing/2010/main" xmlns:ma14="http://schemas.microsoft.com/office/mac/drawingml/2011/main" val="1"/>
             </a:ext>
           </a:extLst>
         </p:spPr>
@@ -8191,7 +8196,7 @@
           </a:ln>
           <a:extLst>
             <a:ext uri="{C572A759-6A51-4108-AA02-DFA0A04FC94B}">
-              <ma14:wrappingTextBoxFlag xmlns:ma14="http://schemas.microsoft.com/office/mac/drawingml/2011/main" xmlns:a14="http://schemas.microsoft.com/office/drawing/2010/main" xmlns:m="http://schemas.openxmlformats.org/officeDocument/2006/math" xmlns="" val="1"/>
+              <ma14:wrappingTextBoxFlag xmlns="" xmlns:m="http://schemas.openxmlformats.org/officeDocument/2006/math" xmlns:a14="http://schemas.microsoft.com/office/drawing/2010/main" xmlns:ma14="http://schemas.microsoft.com/office/mac/drawingml/2011/main" val="1"/>
             </a:ext>
           </a:extLst>
         </p:spPr>
@@ -8294,7 +8299,7 @@
           </a:ln>
           <a:extLst>
             <a:ext uri="{C572A759-6A51-4108-AA02-DFA0A04FC94B}">
-              <ma14:wrappingTextBoxFlag xmlns:ma14="http://schemas.microsoft.com/office/mac/drawingml/2011/main" xmlns:a14="http://schemas.microsoft.com/office/drawing/2010/main" xmlns:m="http://schemas.openxmlformats.org/officeDocument/2006/math" xmlns="" val="1"/>
+              <ma14:wrappingTextBoxFlag xmlns="" xmlns:m="http://schemas.openxmlformats.org/officeDocument/2006/math" xmlns:a14="http://schemas.microsoft.com/office/drawing/2010/main" xmlns:ma14="http://schemas.microsoft.com/office/mac/drawingml/2011/main" val="1"/>
             </a:ext>
           </a:extLst>
         </p:spPr>
@@ -8437,7 +8442,7 @@
           </a:ln>
           <a:extLst>
             <a:ext uri="{C572A759-6A51-4108-AA02-DFA0A04FC94B}">
-              <ma14:wrappingTextBoxFlag xmlns:ma14="http://schemas.microsoft.com/office/mac/drawingml/2011/main" xmlns:a14="http://schemas.microsoft.com/office/drawing/2010/main" xmlns:m="http://schemas.openxmlformats.org/officeDocument/2006/math" xmlns="" val="1"/>
+              <ma14:wrappingTextBoxFlag xmlns="" xmlns:m="http://schemas.openxmlformats.org/officeDocument/2006/math" xmlns:a14="http://schemas.microsoft.com/office/drawing/2010/main" xmlns:ma14="http://schemas.microsoft.com/office/mac/drawingml/2011/main" val="1"/>
             </a:ext>
           </a:extLst>
         </p:spPr>
@@ -8516,7 +8521,7 @@
           </a:ln>
           <a:extLst>
             <a:ext uri="{C572A759-6A51-4108-AA02-DFA0A04FC94B}">
-              <ma14:wrappingTextBoxFlag xmlns:ma14="http://schemas.microsoft.com/office/mac/drawingml/2011/main" xmlns:a14="http://schemas.microsoft.com/office/drawing/2010/main" xmlns:m="http://schemas.openxmlformats.org/officeDocument/2006/math" xmlns="" val="1"/>
+              <ma14:wrappingTextBoxFlag xmlns="" xmlns:m="http://schemas.openxmlformats.org/officeDocument/2006/math" xmlns:a14="http://schemas.microsoft.com/office/drawing/2010/main" xmlns:ma14="http://schemas.microsoft.com/office/mac/drawingml/2011/main" val="1"/>
             </a:ext>
           </a:extLst>
         </p:spPr>
@@ -8566,7 +8571,7 @@
           </a:ln>
           <a:extLst>
             <a:ext uri="{C572A759-6A51-4108-AA02-DFA0A04FC94B}">
-              <ma14:wrappingTextBoxFlag xmlns:ma14="http://schemas.microsoft.com/office/mac/drawingml/2011/main" xmlns:a14="http://schemas.microsoft.com/office/drawing/2010/main" xmlns:m="http://schemas.openxmlformats.org/officeDocument/2006/math" xmlns="" val="1"/>
+              <ma14:wrappingTextBoxFlag xmlns="" xmlns:m="http://schemas.openxmlformats.org/officeDocument/2006/math" xmlns:a14="http://schemas.microsoft.com/office/drawing/2010/main" xmlns:ma14="http://schemas.microsoft.com/office/mac/drawingml/2011/main" val="1"/>
             </a:ext>
           </a:extLst>
         </p:spPr>
@@ -8616,7 +8621,7 @@
           </a:ln>
           <a:extLst>
             <a:ext uri="{C572A759-6A51-4108-AA02-DFA0A04FC94B}">
-              <ma14:wrappingTextBoxFlag xmlns:ma14="http://schemas.microsoft.com/office/mac/drawingml/2011/main" xmlns:a14="http://schemas.microsoft.com/office/drawing/2010/main" xmlns:m="http://schemas.openxmlformats.org/officeDocument/2006/math" xmlns="" val="1"/>
+              <ma14:wrappingTextBoxFlag xmlns="" xmlns:m="http://schemas.openxmlformats.org/officeDocument/2006/math" xmlns:a14="http://schemas.microsoft.com/office/drawing/2010/main" xmlns:ma14="http://schemas.microsoft.com/office/mac/drawingml/2011/main" val="1"/>
             </a:ext>
           </a:extLst>
         </p:spPr>
@@ -8841,7 +8846,7 @@
           </a:ln>
           <a:extLst>
             <a:ext uri="{C572A759-6A51-4108-AA02-DFA0A04FC94B}">
-              <ma14:wrappingTextBoxFlag xmlns:ma14="http://schemas.microsoft.com/office/mac/drawingml/2011/main" xmlns:a14="http://schemas.microsoft.com/office/drawing/2010/main" xmlns:m="http://schemas.openxmlformats.org/officeDocument/2006/math" xmlns="" val="1"/>
+              <ma14:wrappingTextBoxFlag xmlns="" xmlns:m="http://schemas.openxmlformats.org/officeDocument/2006/math" xmlns:a14="http://schemas.microsoft.com/office/drawing/2010/main" xmlns:ma14="http://schemas.microsoft.com/office/mac/drawingml/2011/main" val="1"/>
             </a:ext>
           </a:extLst>
         </p:spPr>
@@ -8944,7 +8949,7 @@
           </a:ln>
           <a:extLst>
             <a:ext uri="{C572A759-6A51-4108-AA02-DFA0A04FC94B}">
-              <ma14:wrappingTextBoxFlag xmlns:ma14="http://schemas.microsoft.com/office/mac/drawingml/2011/main" xmlns:a14="http://schemas.microsoft.com/office/drawing/2010/main" xmlns:m="http://schemas.openxmlformats.org/officeDocument/2006/math" xmlns="" val="1"/>
+              <ma14:wrappingTextBoxFlag xmlns="" xmlns:m="http://schemas.openxmlformats.org/officeDocument/2006/math" xmlns:a14="http://schemas.microsoft.com/office/drawing/2010/main" xmlns:ma14="http://schemas.microsoft.com/office/mac/drawingml/2011/main" val="1"/>
             </a:ext>
           </a:extLst>
         </p:spPr>
@@ -9032,7 +9037,7 @@
           </a:ln>
           <a:extLst>
             <a:ext uri="{C572A759-6A51-4108-AA02-DFA0A04FC94B}">
-              <ma14:wrappingTextBoxFlag xmlns:ma14="http://schemas.microsoft.com/office/mac/drawingml/2011/main" xmlns:a14="http://schemas.microsoft.com/office/drawing/2010/main" xmlns:m="http://schemas.openxmlformats.org/officeDocument/2006/math" xmlns="" val="1"/>
+              <ma14:wrappingTextBoxFlag xmlns="" xmlns:m="http://schemas.openxmlformats.org/officeDocument/2006/math" xmlns:a14="http://schemas.microsoft.com/office/drawing/2010/main" xmlns:ma14="http://schemas.microsoft.com/office/mac/drawingml/2011/main" val="1"/>
             </a:ext>
           </a:extLst>
         </p:spPr>
@@ -9132,7 +9137,7 @@
           </a:ln>
           <a:extLst>
             <a:ext uri="{C572A759-6A51-4108-AA02-DFA0A04FC94B}">
-              <ma14:wrappingTextBoxFlag xmlns:ma14="http://schemas.microsoft.com/office/mac/drawingml/2011/main" xmlns:a14="http://schemas.microsoft.com/office/drawing/2010/main" xmlns:m="http://schemas.openxmlformats.org/officeDocument/2006/math" xmlns="" val="1"/>
+              <ma14:wrappingTextBoxFlag xmlns="" xmlns:m="http://schemas.openxmlformats.org/officeDocument/2006/math" xmlns:a14="http://schemas.microsoft.com/office/drawing/2010/main" xmlns:ma14="http://schemas.microsoft.com/office/mac/drawingml/2011/main" val="1"/>
             </a:ext>
           </a:extLst>
         </p:spPr>
@@ -9233,7 +9238,7 @@
           </a:ln>
           <a:extLst>
             <a:ext uri="{C572A759-6A51-4108-AA02-DFA0A04FC94B}">
-              <ma14:wrappingTextBoxFlag xmlns:ma14="http://schemas.microsoft.com/office/mac/drawingml/2011/main" xmlns:a14="http://schemas.microsoft.com/office/drawing/2010/main" xmlns:m="http://schemas.openxmlformats.org/officeDocument/2006/math" xmlns="" val="1"/>
+              <ma14:wrappingTextBoxFlag xmlns="" xmlns:m="http://schemas.openxmlformats.org/officeDocument/2006/math" xmlns:a14="http://schemas.microsoft.com/office/drawing/2010/main" xmlns:ma14="http://schemas.microsoft.com/office/mac/drawingml/2011/main" val="1"/>
             </a:ext>
           </a:extLst>
         </p:spPr>
@@ -9457,7 +9462,7 @@
           </a:ln>
           <a:extLst>
             <a:ext uri="{C572A759-6A51-4108-AA02-DFA0A04FC94B}">
-              <ma14:wrappingTextBoxFlag xmlns:ma14="http://schemas.microsoft.com/office/mac/drawingml/2011/main" xmlns:a14="http://schemas.microsoft.com/office/drawing/2010/main" xmlns:m="http://schemas.openxmlformats.org/officeDocument/2006/math" xmlns="" val="1"/>
+              <ma14:wrappingTextBoxFlag xmlns="" xmlns:m="http://schemas.openxmlformats.org/officeDocument/2006/math" xmlns:a14="http://schemas.microsoft.com/office/drawing/2010/main" xmlns:ma14="http://schemas.microsoft.com/office/mac/drawingml/2011/main" val="1"/>
             </a:ext>
           </a:extLst>
         </p:spPr>
@@ -9508,7 +9513,7 @@
           </a:ln>
           <a:extLst>
             <a:ext uri="{C572A759-6A51-4108-AA02-DFA0A04FC94B}">
-              <ma14:wrappingTextBoxFlag xmlns:ma14="http://schemas.microsoft.com/office/mac/drawingml/2011/main" xmlns:a14="http://schemas.microsoft.com/office/drawing/2010/main" xmlns:m="http://schemas.openxmlformats.org/officeDocument/2006/math" xmlns="" val="1"/>
+              <ma14:wrappingTextBoxFlag xmlns="" xmlns:m="http://schemas.openxmlformats.org/officeDocument/2006/math" xmlns:a14="http://schemas.microsoft.com/office/drawing/2010/main" xmlns:ma14="http://schemas.microsoft.com/office/mac/drawingml/2011/main" val="1"/>
             </a:ext>
           </a:extLst>
         </p:spPr>
@@ -9559,7 +9564,7 @@
           </a:ln>
           <a:extLst>
             <a:ext uri="{C572A759-6A51-4108-AA02-DFA0A04FC94B}">
-              <ma14:wrappingTextBoxFlag xmlns:ma14="http://schemas.microsoft.com/office/mac/drawingml/2011/main" xmlns:a14="http://schemas.microsoft.com/office/drawing/2010/main" xmlns:m="http://schemas.openxmlformats.org/officeDocument/2006/math" xmlns="" val="1"/>
+              <ma14:wrappingTextBoxFlag xmlns="" xmlns:m="http://schemas.openxmlformats.org/officeDocument/2006/math" xmlns:a14="http://schemas.microsoft.com/office/drawing/2010/main" xmlns:ma14="http://schemas.microsoft.com/office/mac/drawingml/2011/main" val="1"/>
             </a:ext>
           </a:extLst>
         </p:spPr>
@@ -9610,7 +9615,7 @@
           </a:ln>
           <a:extLst>
             <a:ext uri="{C572A759-6A51-4108-AA02-DFA0A04FC94B}">
-              <ma14:wrappingTextBoxFlag xmlns:ma14="http://schemas.microsoft.com/office/mac/drawingml/2011/main" xmlns:a14="http://schemas.microsoft.com/office/drawing/2010/main" xmlns:m="http://schemas.openxmlformats.org/officeDocument/2006/math" xmlns="" val="1"/>
+              <ma14:wrappingTextBoxFlag xmlns="" xmlns:m="http://schemas.openxmlformats.org/officeDocument/2006/math" xmlns:a14="http://schemas.microsoft.com/office/drawing/2010/main" xmlns:ma14="http://schemas.microsoft.com/office/mac/drawingml/2011/main" val="1"/>
             </a:ext>
           </a:extLst>
         </p:spPr>
@@ -9683,7 +9688,7 @@
           </a:ln>
           <a:extLst>
             <a:ext uri="{C572A759-6A51-4108-AA02-DFA0A04FC94B}">
-              <ma14:wrappingTextBoxFlag xmlns:ma14="http://schemas.microsoft.com/office/mac/drawingml/2011/main" xmlns:a14="http://schemas.microsoft.com/office/drawing/2010/main" xmlns:m="http://schemas.openxmlformats.org/officeDocument/2006/math" xmlns="" val="1"/>
+              <ma14:wrappingTextBoxFlag xmlns="" xmlns:m="http://schemas.openxmlformats.org/officeDocument/2006/math" xmlns:a14="http://schemas.microsoft.com/office/drawing/2010/main" xmlns:ma14="http://schemas.microsoft.com/office/mac/drawingml/2011/main" val="1"/>
             </a:ext>
           </a:extLst>
         </p:spPr>
@@ -9862,7 +9867,7 @@
           </a:ln>
           <a:extLst>
             <a:ext uri="{C572A759-6A51-4108-AA02-DFA0A04FC94B}">
-              <ma14:wrappingTextBoxFlag xmlns:ma14="http://schemas.microsoft.com/office/mac/drawingml/2011/main" xmlns:a14="http://schemas.microsoft.com/office/drawing/2010/main" xmlns:m="http://schemas.openxmlformats.org/officeDocument/2006/math" xmlns="" val="1"/>
+              <ma14:wrappingTextBoxFlag xmlns="" xmlns:m="http://schemas.openxmlformats.org/officeDocument/2006/math" xmlns:a14="http://schemas.microsoft.com/office/drawing/2010/main" xmlns:ma14="http://schemas.microsoft.com/office/mac/drawingml/2011/main" val="1"/>
             </a:ext>
           </a:extLst>
         </p:spPr>
@@ -9897,7 +9902,7 @@
           </a:ln>
           <a:extLst>
             <a:ext uri="{C572A759-6A51-4108-AA02-DFA0A04FC94B}">
-              <ma14:wrappingTextBoxFlag xmlns:ma14="http://schemas.microsoft.com/office/mac/drawingml/2011/main" xmlns:a14="http://schemas.microsoft.com/office/drawing/2010/main" xmlns:m="http://schemas.openxmlformats.org/officeDocument/2006/math" xmlns="" val="1"/>
+              <ma14:wrappingTextBoxFlag xmlns="" xmlns:m="http://schemas.openxmlformats.org/officeDocument/2006/math" xmlns:a14="http://schemas.microsoft.com/office/drawing/2010/main" xmlns:ma14="http://schemas.microsoft.com/office/mac/drawingml/2011/main" val="1"/>
             </a:ext>
           </a:extLst>
         </p:spPr>
@@ -9944,7 +9949,7 @@
           </a:ln>
           <a:extLst>
             <a:ext uri="{C572A759-6A51-4108-AA02-DFA0A04FC94B}">
-              <ma14:wrappingTextBoxFlag xmlns:ma14="http://schemas.microsoft.com/office/mac/drawingml/2011/main" xmlns:a14="http://schemas.microsoft.com/office/drawing/2010/main" xmlns:m="http://schemas.openxmlformats.org/officeDocument/2006/math" xmlns="" val="1"/>
+              <ma14:wrappingTextBoxFlag xmlns="" xmlns:m="http://schemas.openxmlformats.org/officeDocument/2006/math" xmlns:a14="http://schemas.microsoft.com/office/drawing/2010/main" xmlns:ma14="http://schemas.microsoft.com/office/mac/drawingml/2011/main" val="1"/>
             </a:ext>
           </a:extLst>
         </p:spPr>
@@ -10168,7 +10173,7 @@
           </a:ln>
           <a:extLst>
             <a:ext uri="{C572A759-6A51-4108-AA02-DFA0A04FC94B}">
-              <ma14:wrappingTextBoxFlag xmlns:ma14="http://schemas.microsoft.com/office/mac/drawingml/2011/main" xmlns:a14="http://schemas.microsoft.com/office/drawing/2010/main" xmlns:m="http://schemas.openxmlformats.org/officeDocument/2006/math" xmlns="" val="1"/>
+              <ma14:wrappingTextBoxFlag xmlns="" xmlns:m="http://schemas.openxmlformats.org/officeDocument/2006/math" xmlns:a14="http://schemas.microsoft.com/office/drawing/2010/main" xmlns:ma14="http://schemas.microsoft.com/office/mac/drawingml/2011/main" val="1"/>
             </a:ext>
           </a:extLst>
         </p:spPr>
@@ -10219,7 +10224,7 @@
           </a:ln>
           <a:extLst>
             <a:ext uri="{C572A759-6A51-4108-AA02-DFA0A04FC94B}">
-              <ma14:wrappingTextBoxFlag xmlns:ma14="http://schemas.microsoft.com/office/mac/drawingml/2011/main" xmlns:a14="http://schemas.microsoft.com/office/drawing/2010/main" xmlns:m="http://schemas.openxmlformats.org/officeDocument/2006/math" xmlns="" val="1"/>
+              <ma14:wrappingTextBoxFlag xmlns="" xmlns:m="http://schemas.openxmlformats.org/officeDocument/2006/math" xmlns:a14="http://schemas.microsoft.com/office/drawing/2010/main" xmlns:ma14="http://schemas.microsoft.com/office/mac/drawingml/2011/main" val="1"/>
             </a:ext>
           </a:extLst>
         </p:spPr>
@@ -10270,7 +10275,7 @@
           </a:ln>
           <a:extLst>
             <a:ext uri="{C572A759-6A51-4108-AA02-DFA0A04FC94B}">
-              <ma14:wrappingTextBoxFlag xmlns:ma14="http://schemas.microsoft.com/office/mac/drawingml/2011/main" xmlns:a14="http://schemas.microsoft.com/office/drawing/2010/main" xmlns:m="http://schemas.openxmlformats.org/officeDocument/2006/math" xmlns="" val="1"/>
+              <ma14:wrappingTextBoxFlag xmlns="" xmlns:m="http://schemas.openxmlformats.org/officeDocument/2006/math" xmlns:a14="http://schemas.microsoft.com/office/drawing/2010/main" xmlns:ma14="http://schemas.microsoft.com/office/mac/drawingml/2011/main" val="1"/>
             </a:ext>
           </a:extLst>
         </p:spPr>
@@ -10363,7 +10368,7 @@
           </a:ln>
           <a:extLst>
             <a:ext uri="{C572A759-6A51-4108-AA02-DFA0A04FC94B}">
-              <ma14:wrappingTextBoxFlag xmlns:ma14="http://schemas.microsoft.com/office/mac/drawingml/2011/main" xmlns:a14="http://schemas.microsoft.com/office/drawing/2010/main" xmlns:m="http://schemas.openxmlformats.org/officeDocument/2006/math" xmlns="" val="1"/>
+              <ma14:wrappingTextBoxFlag xmlns="" xmlns:m="http://schemas.openxmlformats.org/officeDocument/2006/math" xmlns:a14="http://schemas.microsoft.com/office/drawing/2010/main" xmlns:ma14="http://schemas.microsoft.com/office/mac/drawingml/2011/main" val="1"/>
             </a:ext>
           </a:extLst>
         </p:spPr>
@@ -10436,7 +10441,7 @@
           </a:ln>
           <a:extLst>
             <a:ext uri="{C572A759-6A51-4108-AA02-DFA0A04FC94B}">
-              <ma14:wrappingTextBoxFlag xmlns:ma14="http://schemas.microsoft.com/office/mac/drawingml/2011/main" xmlns:a14="http://schemas.microsoft.com/office/drawing/2010/main" xmlns:m="http://schemas.openxmlformats.org/officeDocument/2006/math" xmlns="" val="1"/>
+              <ma14:wrappingTextBoxFlag xmlns="" xmlns:m="http://schemas.openxmlformats.org/officeDocument/2006/math" xmlns:a14="http://schemas.microsoft.com/office/drawing/2010/main" xmlns:ma14="http://schemas.microsoft.com/office/mac/drawingml/2011/main" val="1"/>
             </a:ext>
           </a:extLst>
         </p:spPr>
@@ -10615,7 +10620,7 @@
           </a:ln>
           <a:extLst>
             <a:ext uri="{C572A759-6A51-4108-AA02-DFA0A04FC94B}">
-              <ma14:wrappingTextBoxFlag xmlns:ma14="http://schemas.microsoft.com/office/mac/drawingml/2011/main" xmlns:a14="http://schemas.microsoft.com/office/drawing/2010/main" xmlns:m="http://schemas.openxmlformats.org/officeDocument/2006/math" xmlns="" val="1"/>
+              <ma14:wrappingTextBoxFlag xmlns="" xmlns:m="http://schemas.openxmlformats.org/officeDocument/2006/math" xmlns:a14="http://schemas.microsoft.com/office/drawing/2010/main" xmlns:ma14="http://schemas.microsoft.com/office/mac/drawingml/2011/main" val="1"/>
             </a:ext>
           </a:extLst>
         </p:spPr>
@@ -10650,7 +10655,7 @@
           </a:ln>
           <a:extLst>
             <a:ext uri="{C572A759-6A51-4108-AA02-DFA0A04FC94B}">
-              <ma14:wrappingTextBoxFlag xmlns:ma14="http://schemas.microsoft.com/office/mac/drawingml/2011/main" xmlns:a14="http://schemas.microsoft.com/office/drawing/2010/main" xmlns:m="http://schemas.openxmlformats.org/officeDocument/2006/math" xmlns="" val="1"/>
+              <ma14:wrappingTextBoxFlag xmlns="" xmlns:m="http://schemas.openxmlformats.org/officeDocument/2006/math" xmlns:a14="http://schemas.microsoft.com/office/drawing/2010/main" xmlns:ma14="http://schemas.microsoft.com/office/mac/drawingml/2011/main" val="1"/>
             </a:ext>
           </a:extLst>
         </p:spPr>
@@ -10697,7 +10702,7 @@
           </a:ln>
           <a:extLst>
             <a:ext uri="{C572A759-6A51-4108-AA02-DFA0A04FC94B}">
-              <ma14:wrappingTextBoxFlag xmlns:ma14="http://schemas.microsoft.com/office/mac/drawingml/2011/main" xmlns:a14="http://schemas.microsoft.com/office/drawing/2010/main" xmlns:m="http://schemas.openxmlformats.org/officeDocument/2006/math" xmlns="" val="1"/>
+              <ma14:wrappingTextBoxFlag xmlns="" xmlns:m="http://schemas.openxmlformats.org/officeDocument/2006/math" xmlns:a14="http://schemas.microsoft.com/office/drawing/2010/main" xmlns:ma14="http://schemas.microsoft.com/office/mac/drawingml/2011/main" val="1"/>
             </a:ext>
           </a:extLst>
         </p:spPr>
@@ -10921,7 +10926,7 @@
           </a:ln>
           <a:extLst>
             <a:ext uri="{C572A759-6A51-4108-AA02-DFA0A04FC94B}">
-              <ma14:wrappingTextBoxFlag xmlns:ma14="http://schemas.microsoft.com/office/mac/drawingml/2011/main" xmlns:a14="http://schemas.microsoft.com/office/drawing/2010/main" xmlns:m="http://schemas.openxmlformats.org/officeDocument/2006/math" xmlns="" val="1"/>
+              <ma14:wrappingTextBoxFlag xmlns="" xmlns:m="http://schemas.openxmlformats.org/officeDocument/2006/math" xmlns:a14="http://schemas.microsoft.com/office/drawing/2010/main" xmlns:ma14="http://schemas.microsoft.com/office/mac/drawingml/2011/main" val="1"/>
             </a:ext>
           </a:extLst>
         </p:spPr>
@@ -10972,7 +10977,7 @@
           </a:ln>
           <a:extLst>
             <a:ext uri="{C572A759-6A51-4108-AA02-DFA0A04FC94B}">
-              <ma14:wrappingTextBoxFlag xmlns:ma14="http://schemas.microsoft.com/office/mac/drawingml/2011/main" xmlns:a14="http://schemas.microsoft.com/office/drawing/2010/main" xmlns:m="http://schemas.openxmlformats.org/officeDocument/2006/math" xmlns="" val="1"/>
+              <ma14:wrappingTextBoxFlag xmlns="" xmlns:m="http://schemas.openxmlformats.org/officeDocument/2006/math" xmlns:a14="http://schemas.microsoft.com/office/drawing/2010/main" xmlns:ma14="http://schemas.microsoft.com/office/mac/drawingml/2011/main" val="1"/>
             </a:ext>
           </a:extLst>
         </p:spPr>
@@ -11023,7 +11028,7 @@
           </a:ln>
           <a:extLst>
             <a:ext uri="{C572A759-6A51-4108-AA02-DFA0A04FC94B}">
-              <ma14:wrappingTextBoxFlag xmlns:ma14="http://schemas.microsoft.com/office/mac/drawingml/2011/main" xmlns:a14="http://schemas.microsoft.com/office/drawing/2010/main" xmlns:m="http://schemas.openxmlformats.org/officeDocument/2006/math" xmlns="" val="1"/>
+              <ma14:wrappingTextBoxFlag xmlns="" xmlns:m="http://schemas.openxmlformats.org/officeDocument/2006/math" xmlns:a14="http://schemas.microsoft.com/office/drawing/2010/main" xmlns:ma14="http://schemas.microsoft.com/office/mac/drawingml/2011/main" val="1"/>
             </a:ext>
           </a:extLst>
         </p:spPr>
@@ -11116,7 +11121,7 @@
           </a:ln>
           <a:extLst>
             <a:ext uri="{C572A759-6A51-4108-AA02-DFA0A04FC94B}">
-              <ma14:wrappingTextBoxFlag xmlns:ma14="http://schemas.microsoft.com/office/mac/drawingml/2011/main" xmlns:a14="http://schemas.microsoft.com/office/drawing/2010/main" xmlns:m="http://schemas.openxmlformats.org/officeDocument/2006/math" xmlns="" val="1"/>
+              <ma14:wrappingTextBoxFlag xmlns="" xmlns:m="http://schemas.openxmlformats.org/officeDocument/2006/math" xmlns:a14="http://schemas.microsoft.com/office/drawing/2010/main" xmlns:ma14="http://schemas.microsoft.com/office/mac/drawingml/2011/main" val="1"/>
             </a:ext>
           </a:extLst>
         </p:spPr>
@@ -11235,7 +11240,7 @@
             <a:effectLst/>
             <a:extLst>
               <a:ext uri="{C572A759-6A51-4108-AA02-DFA0A04FC94B}">
-                <ma14:wrappingTextBoxFlag xmlns:ma14="http://schemas.microsoft.com/office/mac/drawingml/2011/main" xmlns:a14="http://schemas.microsoft.com/office/drawing/2010/main" xmlns:m="http://schemas.openxmlformats.org/officeDocument/2006/math" xmlns="" val="1"/>
+                <ma14:wrappingTextBoxFlag xmlns="" xmlns:m="http://schemas.openxmlformats.org/officeDocument/2006/math" xmlns:a14="http://schemas.microsoft.com/office/drawing/2010/main" xmlns:ma14="http://schemas.microsoft.com/office/mac/drawingml/2011/main" val="1"/>
               </a:ext>
             </a:extLst>
           </p:spPr>
@@ -11292,7 +11297,7 @@
             <a:effectLst/>
             <a:extLst>
               <a:ext uri="{C572A759-6A51-4108-AA02-DFA0A04FC94B}">
-                <ma14:wrappingTextBoxFlag xmlns:ma14="http://schemas.microsoft.com/office/mac/drawingml/2011/main" xmlns:a14="http://schemas.microsoft.com/office/drawing/2010/main" xmlns:m="http://schemas.openxmlformats.org/officeDocument/2006/math" xmlns="" val="1"/>
+                <ma14:wrappingTextBoxFlag xmlns="" xmlns:m="http://schemas.openxmlformats.org/officeDocument/2006/math" xmlns:a14="http://schemas.microsoft.com/office/drawing/2010/main" xmlns:ma14="http://schemas.microsoft.com/office/mac/drawingml/2011/main" val="1"/>
               </a:ext>
             </a:extLst>
           </p:spPr>
@@ -11342,7 +11347,7 @@
             <a:effectLst/>
             <a:extLst>
               <a:ext uri="{C572A759-6A51-4108-AA02-DFA0A04FC94B}">
-                <ma14:wrappingTextBoxFlag xmlns:ma14="http://schemas.microsoft.com/office/mac/drawingml/2011/main" xmlns:a14="http://schemas.microsoft.com/office/drawing/2010/main" xmlns:m="http://schemas.openxmlformats.org/officeDocument/2006/math" xmlns="" val="1"/>
+                <ma14:wrappingTextBoxFlag xmlns="" xmlns:m="http://schemas.openxmlformats.org/officeDocument/2006/math" xmlns:a14="http://schemas.microsoft.com/office/drawing/2010/main" xmlns:ma14="http://schemas.microsoft.com/office/mac/drawingml/2011/main" val="1"/>
               </a:ext>
             </a:extLst>
           </p:spPr>
@@ -11387,7 +11392,7 @@
           </a:ln>
           <a:extLst>
             <a:ext uri="{C572A759-6A51-4108-AA02-DFA0A04FC94B}">
-              <ma14:wrappingTextBoxFlag xmlns:ma14="http://schemas.microsoft.com/office/mac/drawingml/2011/main" xmlns:a14="http://schemas.microsoft.com/office/drawing/2010/main" xmlns:m="http://schemas.openxmlformats.org/officeDocument/2006/math" xmlns="" val="1"/>
+              <ma14:wrappingTextBoxFlag xmlns="" xmlns:m="http://schemas.openxmlformats.org/officeDocument/2006/math" xmlns:a14="http://schemas.microsoft.com/office/drawing/2010/main" xmlns:ma14="http://schemas.microsoft.com/office/mac/drawingml/2011/main" val="1"/>
             </a:ext>
           </a:extLst>
         </p:spPr>
@@ -11434,7 +11439,7 @@
           </a:ln>
           <a:extLst>
             <a:ext uri="{C572A759-6A51-4108-AA02-DFA0A04FC94B}">
-              <ma14:wrappingTextBoxFlag xmlns:ma14="http://schemas.microsoft.com/office/mac/drawingml/2011/main" xmlns:a14="http://schemas.microsoft.com/office/drawing/2010/main" xmlns:m="http://schemas.openxmlformats.org/officeDocument/2006/math" xmlns="" val="1"/>
+              <ma14:wrappingTextBoxFlag xmlns="" xmlns:m="http://schemas.openxmlformats.org/officeDocument/2006/math" xmlns:a14="http://schemas.microsoft.com/office/drawing/2010/main" xmlns:ma14="http://schemas.microsoft.com/office/mac/drawingml/2011/main" val="1"/>
             </a:ext>
           </a:extLst>
         </p:spPr>
@@ -11481,7 +11486,7 @@
           </a:ln>
           <a:extLst>
             <a:ext uri="{C572A759-6A51-4108-AA02-DFA0A04FC94B}">
-              <ma14:wrappingTextBoxFlag xmlns:ma14="http://schemas.microsoft.com/office/mac/drawingml/2011/main" xmlns:a14="http://schemas.microsoft.com/office/drawing/2010/main" xmlns:m="http://schemas.openxmlformats.org/officeDocument/2006/math" xmlns="" val="1"/>
+              <ma14:wrappingTextBoxFlag xmlns="" xmlns:m="http://schemas.openxmlformats.org/officeDocument/2006/math" xmlns:a14="http://schemas.microsoft.com/office/drawing/2010/main" xmlns:ma14="http://schemas.microsoft.com/office/mac/drawingml/2011/main" val="1"/>
             </a:ext>
           </a:extLst>
         </p:spPr>
@@ -11528,7 +11533,7 @@
           </a:ln>
           <a:extLst>
             <a:ext uri="{C572A759-6A51-4108-AA02-DFA0A04FC94B}">
-              <ma14:wrappingTextBoxFlag xmlns:ma14="http://schemas.microsoft.com/office/mac/drawingml/2011/main" xmlns:a14="http://schemas.microsoft.com/office/drawing/2010/main" xmlns:m="http://schemas.openxmlformats.org/officeDocument/2006/math" xmlns="" val="1"/>
+              <ma14:wrappingTextBoxFlag xmlns="" xmlns:m="http://schemas.openxmlformats.org/officeDocument/2006/math" xmlns:a14="http://schemas.microsoft.com/office/drawing/2010/main" xmlns:ma14="http://schemas.microsoft.com/office/mac/drawingml/2011/main" val="1"/>
             </a:ext>
           </a:extLst>
         </p:spPr>
@@ -11571,7 +11576,7 @@
           </a:ln>
           <a:extLst>
             <a:ext uri="{C572A759-6A51-4108-AA02-DFA0A04FC94B}">
-              <ma14:wrappingTextBoxFlag xmlns:ma14="http://schemas.microsoft.com/office/mac/drawingml/2011/main" xmlns:a14="http://schemas.microsoft.com/office/drawing/2010/main" xmlns:m="http://schemas.openxmlformats.org/officeDocument/2006/math" xmlns="" val="1"/>
+              <ma14:wrappingTextBoxFlag xmlns="" xmlns:m="http://schemas.openxmlformats.org/officeDocument/2006/math" xmlns:a14="http://schemas.microsoft.com/office/drawing/2010/main" xmlns:ma14="http://schemas.microsoft.com/office/mac/drawingml/2011/main" val="1"/>
             </a:ext>
           </a:extLst>
         </p:spPr>
@@ -11791,7 +11796,7 @@
           </a:ln>
           <a:extLst>
             <a:ext uri="{C572A759-6A51-4108-AA02-DFA0A04FC94B}">
-              <ma14:wrappingTextBoxFlag xmlns:ma14="http://schemas.microsoft.com/office/mac/drawingml/2011/main" xmlns:a14="http://schemas.microsoft.com/office/drawing/2010/main" xmlns:m="http://schemas.openxmlformats.org/officeDocument/2006/math" xmlns="" val="1"/>
+              <ma14:wrappingTextBoxFlag xmlns="" xmlns:m="http://schemas.openxmlformats.org/officeDocument/2006/math" xmlns:a14="http://schemas.microsoft.com/office/drawing/2010/main" xmlns:ma14="http://schemas.microsoft.com/office/mac/drawingml/2011/main" val="1"/>
             </a:ext>
           </a:extLst>
         </p:spPr>
@@ -11838,7 +11843,7 @@
           </a:ln>
           <a:extLst>
             <a:ext uri="{C572A759-6A51-4108-AA02-DFA0A04FC94B}">
-              <ma14:wrappingTextBoxFlag xmlns:ma14="http://schemas.microsoft.com/office/mac/drawingml/2011/main" xmlns:a14="http://schemas.microsoft.com/office/drawing/2010/main" xmlns:m="http://schemas.openxmlformats.org/officeDocument/2006/math" xmlns="" val="1"/>
+              <ma14:wrappingTextBoxFlag xmlns="" xmlns:m="http://schemas.openxmlformats.org/officeDocument/2006/math" xmlns:a14="http://schemas.microsoft.com/office/drawing/2010/main" xmlns:ma14="http://schemas.microsoft.com/office/mac/drawingml/2011/main" val="1"/>
             </a:ext>
           </a:extLst>
         </p:spPr>
@@ -11882,7 +11887,7 @@
           </a:ln>
           <a:extLst>
             <a:ext uri="{C572A759-6A51-4108-AA02-DFA0A04FC94B}">
-              <ma14:wrappingTextBoxFlag xmlns:ma14="http://schemas.microsoft.com/office/mac/drawingml/2011/main" xmlns:a14="http://schemas.microsoft.com/office/drawing/2010/main" xmlns:m="http://schemas.openxmlformats.org/officeDocument/2006/math" xmlns="" val="1"/>
+              <ma14:wrappingTextBoxFlag xmlns="" xmlns:m="http://schemas.openxmlformats.org/officeDocument/2006/math" xmlns:a14="http://schemas.microsoft.com/office/drawing/2010/main" xmlns:ma14="http://schemas.microsoft.com/office/mac/drawingml/2011/main" val="1"/>
             </a:ext>
           </a:extLst>
         </p:spPr>
@@ -11929,7 +11934,7 @@
           </a:ln>
           <a:extLst>
             <a:ext uri="{C572A759-6A51-4108-AA02-DFA0A04FC94B}">
-              <ma14:wrappingTextBoxFlag xmlns:ma14="http://schemas.microsoft.com/office/mac/drawingml/2011/main" xmlns:a14="http://schemas.microsoft.com/office/drawing/2010/main" xmlns:m="http://schemas.openxmlformats.org/officeDocument/2006/math" xmlns="" val="1"/>
+              <ma14:wrappingTextBoxFlag xmlns="" xmlns:m="http://schemas.openxmlformats.org/officeDocument/2006/math" xmlns:a14="http://schemas.microsoft.com/office/drawing/2010/main" xmlns:ma14="http://schemas.microsoft.com/office/mac/drawingml/2011/main" val="1"/>
             </a:ext>
           </a:extLst>
         </p:spPr>
@@ -11973,7 +11978,7 @@
           </a:ln>
           <a:extLst>
             <a:ext uri="{C572A759-6A51-4108-AA02-DFA0A04FC94B}">
-              <ma14:wrappingTextBoxFlag xmlns:ma14="http://schemas.microsoft.com/office/mac/drawingml/2011/main" xmlns:a14="http://schemas.microsoft.com/office/drawing/2010/main" xmlns:m="http://schemas.openxmlformats.org/officeDocument/2006/math" xmlns="" val="1"/>
+              <ma14:wrappingTextBoxFlag xmlns="" xmlns:m="http://schemas.openxmlformats.org/officeDocument/2006/math" xmlns:a14="http://schemas.microsoft.com/office/drawing/2010/main" xmlns:ma14="http://schemas.microsoft.com/office/mac/drawingml/2011/main" val="1"/>
             </a:ext>
           </a:extLst>
         </p:spPr>
@@ -12020,7 +12025,7 @@
           </a:ln>
           <a:extLst>
             <a:ext uri="{C572A759-6A51-4108-AA02-DFA0A04FC94B}">
-              <ma14:wrappingTextBoxFlag xmlns:ma14="http://schemas.microsoft.com/office/mac/drawingml/2011/main" xmlns:a14="http://schemas.microsoft.com/office/drawing/2010/main" xmlns:m="http://schemas.openxmlformats.org/officeDocument/2006/math" xmlns="" val="1"/>
+              <ma14:wrappingTextBoxFlag xmlns="" xmlns:m="http://schemas.openxmlformats.org/officeDocument/2006/math" xmlns:a14="http://schemas.microsoft.com/office/drawing/2010/main" xmlns:ma14="http://schemas.microsoft.com/office/mac/drawingml/2011/main" val="1"/>
             </a:ext>
           </a:extLst>
         </p:spPr>
@@ -12064,7 +12069,7 @@
           </a:ln>
           <a:extLst>
             <a:ext uri="{C572A759-6A51-4108-AA02-DFA0A04FC94B}">
-              <ma14:wrappingTextBoxFlag xmlns:ma14="http://schemas.microsoft.com/office/mac/drawingml/2011/main" xmlns:a14="http://schemas.microsoft.com/office/drawing/2010/main" xmlns:m="http://schemas.openxmlformats.org/officeDocument/2006/math" xmlns="" val="1"/>
+              <ma14:wrappingTextBoxFlag xmlns="" xmlns:m="http://schemas.openxmlformats.org/officeDocument/2006/math" xmlns:a14="http://schemas.microsoft.com/office/drawing/2010/main" xmlns:ma14="http://schemas.microsoft.com/office/mac/drawingml/2011/main" val="1"/>
             </a:ext>
           </a:extLst>
         </p:spPr>
@@ -12111,7 +12116,7 @@
           </a:ln>
           <a:extLst>
             <a:ext uri="{C572A759-6A51-4108-AA02-DFA0A04FC94B}">
-              <ma14:wrappingTextBoxFlag xmlns:ma14="http://schemas.microsoft.com/office/mac/drawingml/2011/main" xmlns:a14="http://schemas.microsoft.com/office/drawing/2010/main" xmlns:m="http://schemas.openxmlformats.org/officeDocument/2006/math" xmlns="" val="1"/>
+              <ma14:wrappingTextBoxFlag xmlns="" xmlns:m="http://schemas.openxmlformats.org/officeDocument/2006/math" xmlns:a14="http://schemas.microsoft.com/office/drawing/2010/main" xmlns:ma14="http://schemas.microsoft.com/office/mac/drawingml/2011/main" val="1"/>
             </a:ext>
           </a:extLst>
         </p:spPr>
@@ -12361,7 +12366,7 @@
           </a:ln>
           <a:extLst>
             <a:ext uri="{C572A759-6A51-4108-AA02-DFA0A04FC94B}">
-              <ma14:wrappingTextBoxFlag xmlns:ma14="http://schemas.microsoft.com/office/mac/drawingml/2011/main" xmlns:a14="http://schemas.microsoft.com/office/drawing/2010/main" xmlns:m="http://schemas.openxmlformats.org/officeDocument/2006/math" xmlns="" val="1"/>
+              <ma14:wrappingTextBoxFlag xmlns="" xmlns:m="http://schemas.openxmlformats.org/officeDocument/2006/math" xmlns:a14="http://schemas.microsoft.com/office/drawing/2010/main" xmlns:ma14="http://schemas.microsoft.com/office/mac/drawingml/2011/main" val="1"/>
             </a:ext>
           </a:extLst>
         </p:spPr>
@@ -12434,7 +12439,7 @@
           </a:ln>
           <a:extLst>
             <a:ext uri="{C572A759-6A51-4108-AA02-DFA0A04FC94B}">
-              <ma14:wrappingTextBoxFlag xmlns:ma14="http://schemas.microsoft.com/office/mac/drawingml/2011/main" xmlns:a14="http://schemas.microsoft.com/office/drawing/2010/main" xmlns:m="http://schemas.openxmlformats.org/officeDocument/2006/math" xmlns="" val="1"/>
+              <ma14:wrappingTextBoxFlag xmlns="" xmlns:m="http://schemas.openxmlformats.org/officeDocument/2006/math" xmlns:a14="http://schemas.microsoft.com/office/drawing/2010/main" xmlns:ma14="http://schemas.microsoft.com/office/mac/drawingml/2011/main" val="1"/>
             </a:ext>
           </a:extLst>
         </p:spPr>
@@ -12481,7 +12486,7 @@
           </a:ln>
           <a:extLst>
             <a:ext uri="{C572A759-6A51-4108-AA02-DFA0A04FC94B}">
-              <ma14:wrappingTextBoxFlag xmlns:ma14="http://schemas.microsoft.com/office/mac/drawingml/2011/main" xmlns:a14="http://schemas.microsoft.com/office/drawing/2010/main" xmlns:m="http://schemas.openxmlformats.org/officeDocument/2006/math" xmlns="" val="1"/>
+              <ma14:wrappingTextBoxFlag xmlns="" xmlns:m="http://schemas.openxmlformats.org/officeDocument/2006/math" xmlns:a14="http://schemas.microsoft.com/office/drawing/2010/main" xmlns:ma14="http://schemas.microsoft.com/office/mac/drawingml/2011/main" val="1"/>
             </a:ext>
           </a:extLst>
         </p:spPr>
@@ -12528,7 +12533,7 @@
           </a:ln>
           <a:extLst>
             <a:ext uri="{C572A759-6A51-4108-AA02-DFA0A04FC94B}">
-              <ma14:wrappingTextBoxFlag xmlns:ma14="http://schemas.microsoft.com/office/mac/drawingml/2011/main" xmlns:a14="http://schemas.microsoft.com/office/drawing/2010/main" xmlns:m="http://schemas.openxmlformats.org/officeDocument/2006/math" xmlns="" val="1"/>
+              <ma14:wrappingTextBoxFlag xmlns="" xmlns:m="http://schemas.openxmlformats.org/officeDocument/2006/math" xmlns:a14="http://schemas.microsoft.com/office/drawing/2010/main" xmlns:ma14="http://schemas.microsoft.com/office/mac/drawingml/2011/main" val="1"/>
             </a:ext>
           </a:extLst>
         </p:spPr>
@@ -12575,7 +12580,7 @@
           </a:ln>
           <a:extLst>
             <a:ext uri="{C572A759-6A51-4108-AA02-DFA0A04FC94B}">
-              <ma14:wrappingTextBoxFlag xmlns:ma14="http://schemas.microsoft.com/office/mac/drawingml/2011/main" xmlns:a14="http://schemas.microsoft.com/office/drawing/2010/main" xmlns:m="http://schemas.openxmlformats.org/officeDocument/2006/math" xmlns="" val="1"/>
+              <ma14:wrappingTextBoxFlag xmlns="" xmlns:m="http://schemas.openxmlformats.org/officeDocument/2006/math" xmlns:a14="http://schemas.microsoft.com/office/drawing/2010/main" xmlns:ma14="http://schemas.microsoft.com/office/mac/drawingml/2011/main" val="1"/>
             </a:ext>
           </a:extLst>
         </p:spPr>
@@ -12811,7 +12816,7 @@
           </a:ln>
           <a:extLst>
             <a:ext uri="{C572A759-6A51-4108-AA02-DFA0A04FC94B}">
-              <ma14:wrappingTextBoxFlag xmlns:ma14="http://schemas.microsoft.com/office/mac/drawingml/2011/main" xmlns:a14="http://schemas.microsoft.com/office/drawing/2010/main" xmlns:m="http://schemas.openxmlformats.org/officeDocument/2006/math" xmlns="" val="1"/>
+              <ma14:wrappingTextBoxFlag xmlns="" xmlns:m="http://schemas.openxmlformats.org/officeDocument/2006/math" xmlns:a14="http://schemas.microsoft.com/office/drawing/2010/main" xmlns:ma14="http://schemas.microsoft.com/office/mac/drawingml/2011/main" val="1"/>
             </a:ext>
           </a:extLst>
         </p:spPr>
@@ -12858,7 +12863,7 @@
           </a:ln>
           <a:extLst>
             <a:ext uri="{C572A759-6A51-4108-AA02-DFA0A04FC94B}">
-              <ma14:wrappingTextBoxFlag xmlns:ma14="http://schemas.microsoft.com/office/mac/drawingml/2011/main" xmlns:a14="http://schemas.microsoft.com/office/drawing/2010/main" xmlns:m="http://schemas.openxmlformats.org/officeDocument/2006/math" xmlns="" val="1"/>
+              <ma14:wrappingTextBoxFlag xmlns="" xmlns:m="http://schemas.openxmlformats.org/officeDocument/2006/math" xmlns:a14="http://schemas.microsoft.com/office/drawing/2010/main" xmlns:ma14="http://schemas.microsoft.com/office/mac/drawingml/2011/main" val="1"/>
             </a:ext>
           </a:extLst>
         </p:spPr>
@@ -13109,7 +13114,7 @@
           </a:ln>
           <a:extLst>
             <a:ext uri="{C572A759-6A51-4108-AA02-DFA0A04FC94B}">
-              <ma14:wrappingTextBoxFlag xmlns:ma14="http://schemas.microsoft.com/office/mac/drawingml/2011/main" xmlns:a14="http://schemas.microsoft.com/office/drawing/2010/main" xmlns:m="http://schemas.openxmlformats.org/officeDocument/2006/math" xmlns="" val="1"/>
+              <ma14:wrappingTextBoxFlag xmlns="" xmlns:m="http://schemas.openxmlformats.org/officeDocument/2006/math" xmlns:a14="http://schemas.microsoft.com/office/drawing/2010/main" xmlns:ma14="http://schemas.microsoft.com/office/mac/drawingml/2011/main" val="1"/>
             </a:ext>
           </a:extLst>
         </p:spPr>
@@ -13290,7 +13295,7 @@
           </a:ln>
           <a:extLst>
             <a:ext uri="{C572A759-6A51-4108-AA02-DFA0A04FC94B}">
-              <ma14:wrappingTextBoxFlag xmlns:ma14="http://schemas.microsoft.com/office/mac/drawingml/2011/main" xmlns:a14="http://schemas.microsoft.com/office/drawing/2010/main" xmlns:m="http://schemas.openxmlformats.org/officeDocument/2006/math" xmlns="" val="1"/>
+              <ma14:wrappingTextBoxFlag xmlns="" xmlns:m="http://schemas.openxmlformats.org/officeDocument/2006/math" xmlns:a14="http://schemas.microsoft.com/office/drawing/2010/main" xmlns:ma14="http://schemas.microsoft.com/office/mac/drawingml/2011/main" val="1"/>
             </a:ext>
           </a:extLst>
         </p:spPr>
@@ -13332,7 +13337,7 @@
           </a:ln>
           <a:extLst>
             <a:ext uri="{C572A759-6A51-4108-AA02-DFA0A04FC94B}">
-              <ma14:wrappingTextBoxFlag xmlns:ma14="http://schemas.microsoft.com/office/mac/drawingml/2011/main" xmlns:a14="http://schemas.microsoft.com/office/drawing/2010/main" xmlns:m="http://schemas.openxmlformats.org/officeDocument/2006/math" xmlns="" val="1"/>
+              <ma14:wrappingTextBoxFlag xmlns="" xmlns:m="http://schemas.openxmlformats.org/officeDocument/2006/math" xmlns:a14="http://schemas.microsoft.com/office/drawing/2010/main" xmlns:ma14="http://schemas.microsoft.com/office/mac/drawingml/2011/main" val="1"/>
             </a:ext>
           </a:extLst>
         </p:spPr>
@@ -13380,7 +13385,7 @@
           </a:ln>
           <a:extLst>
             <a:ext uri="{C572A759-6A51-4108-AA02-DFA0A04FC94B}">
-              <ma14:wrappingTextBoxFlag xmlns:ma14="http://schemas.microsoft.com/office/mac/drawingml/2011/main" xmlns:a14="http://schemas.microsoft.com/office/drawing/2010/main" xmlns:m="http://schemas.openxmlformats.org/officeDocument/2006/math" xmlns="" val="1"/>
+              <ma14:wrappingTextBoxFlag xmlns="" xmlns:m="http://schemas.openxmlformats.org/officeDocument/2006/math" xmlns:a14="http://schemas.microsoft.com/office/drawing/2010/main" xmlns:ma14="http://schemas.microsoft.com/office/mac/drawingml/2011/main" val="1"/>
             </a:ext>
           </a:extLst>
         </p:spPr>
@@ -13425,7 +13430,7 @@
           </a:ln>
           <a:extLst>
             <a:ext uri="{C572A759-6A51-4108-AA02-DFA0A04FC94B}">
-              <ma14:wrappingTextBoxFlag xmlns:ma14="http://schemas.microsoft.com/office/mac/drawingml/2011/main" xmlns:a14="http://schemas.microsoft.com/office/drawing/2010/main" xmlns:m="http://schemas.openxmlformats.org/officeDocument/2006/math" xmlns="" val="1"/>
+              <ma14:wrappingTextBoxFlag xmlns="" xmlns:m="http://schemas.openxmlformats.org/officeDocument/2006/math" xmlns:a14="http://schemas.microsoft.com/office/drawing/2010/main" xmlns:ma14="http://schemas.microsoft.com/office/mac/drawingml/2011/main" val="1"/>
             </a:ext>
           </a:extLst>
         </p:spPr>
@@ -13472,7 +13477,7 @@
           </a:ln>
           <a:extLst>
             <a:ext uri="{C572A759-6A51-4108-AA02-DFA0A04FC94B}">
-              <ma14:wrappingTextBoxFlag xmlns:ma14="http://schemas.microsoft.com/office/mac/drawingml/2011/main" xmlns:a14="http://schemas.microsoft.com/office/drawing/2010/main" xmlns:m="http://schemas.openxmlformats.org/officeDocument/2006/math" xmlns="" val="1"/>
+              <ma14:wrappingTextBoxFlag xmlns="" xmlns:m="http://schemas.openxmlformats.org/officeDocument/2006/math" xmlns:a14="http://schemas.microsoft.com/office/drawing/2010/main" xmlns:ma14="http://schemas.microsoft.com/office/mac/drawingml/2011/main" val="1"/>
             </a:ext>
           </a:extLst>
         </p:spPr>
@@ -13522,7 +13527,7 @@
           </a:ln>
           <a:extLst>
             <a:ext uri="{C572A759-6A51-4108-AA02-DFA0A04FC94B}">
-              <ma14:wrappingTextBoxFlag xmlns:ma14="http://schemas.microsoft.com/office/mac/drawingml/2011/main" xmlns:a14="http://schemas.microsoft.com/office/drawing/2010/main" xmlns:m="http://schemas.openxmlformats.org/officeDocument/2006/math" xmlns="" val="1"/>
+              <ma14:wrappingTextBoxFlag xmlns="" xmlns:m="http://schemas.openxmlformats.org/officeDocument/2006/math" xmlns:a14="http://schemas.microsoft.com/office/drawing/2010/main" xmlns:ma14="http://schemas.microsoft.com/office/mac/drawingml/2011/main" val="1"/>
             </a:ext>
           </a:extLst>
         </p:spPr>
@@ -13567,7 +13572,7 @@
           </a:ln>
           <a:extLst>
             <a:ext uri="{C572A759-6A51-4108-AA02-DFA0A04FC94B}">
-              <ma14:wrappingTextBoxFlag xmlns:ma14="http://schemas.microsoft.com/office/mac/drawingml/2011/main" xmlns:a14="http://schemas.microsoft.com/office/drawing/2010/main" xmlns:m="http://schemas.openxmlformats.org/officeDocument/2006/math" xmlns="" val="1"/>
+              <ma14:wrappingTextBoxFlag xmlns="" xmlns:m="http://schemas.openxmlformats.org/officeDocument/2006/math" xmlns:a14="http://schemas.microsoft.com/office/drawing/2010/main" xmlns:ma14="http://schemas.microsoft.com/office/mac/drawingml/2011/main" val="1"/>
             </a:ext>
           </a:extLst>
         </p:spPr>
@@ -13614,7 +13619,7 @@
           </a:ln>
           <a:extLst>
             <a:ext uri="{C572A759-6A51-4108-AA02-DFA0A04FC94B}">
-              <ma14:wrappingTextBoxFlag xmlns:ma14="http://schemas.microsoft.com/office/mac/drawingml/2011/main" xmlns:a14="http://schemas.microsoft.com/office/drawing/2010/main" xmlns:m="http://schemas.openxmlformats.org/officeDocument/2006/math" xmlns="" val="1"/>
+              <ma14:wrappingTextBoxFlag xmlns="" xmlns:m="http://schemas.openxmlformats.org/officeDocument/2006/math" xmlns:a14="http://schemas.microsoft.com/office/drawing/2010/main" xmlns:ma14="http://schemas.microsoft.com/office/mac/drawingml/2011/main" val="1"/>
             </a:ext>
           </a:extLst>
         </p:spPr>
@@ -13766,7 +13771,7 @@
           </a:ln>
           <a:extLst>
             <a:ext uri="{C572A759-6A51-4108-AA02-DFA0A04FC94B}">
-              <ma14:wrappingTextBoxFlag xmlns:ma14="http://schemas.microsoft.com/office/mac/drawingml/2011/main" xmlns:a14="http://schemas.microsoft.com/office/drawing/2010/main" xmlns:m="http://schemas.openxmlformats.org/officeDocument/2006/math" xmlns="" val="1"/>
+              <ma14:wrappingTextBoxFlag xmlns="" xmlns:m="http://schemas.openxmlformats.org/officeDocument/2006/math" xmlns:a14="http://schemas.microsoft.com/office/drawing/2010/main" xmlns:ma14="http://schemas.microsoft.com/office/mac/drawingml/2011/main" val="1"/>
             </a:ext>
           </a:extLst>
         </p:spPr>
@@ -14529,8 +14534,8 @@
           </a:graphicData>
         </a:graphic>
       </p:graphicFrame>
-      <mc:AlternateContent xmlns:mc="http://schemas.openxmlformats.org/markup-compatibility/2006">
-        <mc:Choice xmlns:a14="http://schemas.microsoft.com/office/drawing/2010/main" Requires="a14">
+      <mc:AlternateContent xmlns:mc="http://schemas.openxmlformats.org/markup-compatibility/2006" xmlns:a14="http://schemas.microsoft.com/office/drawing/2010/main">
+        <mc:Choice Requires="a14">
           <p:sp>
             <p:nvSpPr>
               <p:cNvPr id="487" name="Equation"/>
@@ -14749,7 +14754,7 @@
             </p:txBody>
           </p:sp>
         </mc:Choice>
-        <mc:Fallback>
+        <mc:Fallback xmlns="">
           <p:sp>
             <p:nvSpPr>
               <p:cNvPr id="487" name="Equation"/>
@@ -14791,8 +14796,8 @@
           </p:sp>
         </mc:Fallback>
       </mc:AlternateContent>
-      <mc:AlternateContent xmlns:mc="http://schemas.openxmlformats.org/markup-compatibility/2006">
-        <mc:Choice xmlns:a14="http://schemas.microsoft.com/office/drawing/2010/main" Requires="a14">
+      <mc:AlternateContent xmlns:mc="http://schemas.openxmlformats.org/markup-compatibility/2006" xmlns:a14="http://schemas.microsoft.com/office/drawing/2010/main">
+        <mc:Choice Requires="a14">
           <p:sp>
             <p:nvSpPr>
               <p:cNvPr id="488" name="Equation"/>
@@ -14906,7 +14911,7 @@
             </p:txBody>
           </p:sp>
         </mc:Choice>
-        <mc:Fallback>
+        <mc:Fallback xmlns="">
           <p:sp>
             <p:nvSpPr>
               <p:cNvPr id="488" name="Equation"/>
@@ -15057,7 +15062,7 @@
           </a:ln>
           <a:extLst>
             <a:ext uri="{C572A759-6A51-4108-AA02-DFA0A04FC94B}">
-              <ma14:wrappingTextBoxFlag xmlns:ma14="http://schemas.microsoft.com/office/mac/drawingml/2011/main" xmlns:a14="http://schemas.microsoft.com/office/drawing/2010/main" xmlns:m="http://schemas.openxmlformats.org/officeDocument/2006/math" xmlns="" val="1"/>
+              <ma14:wrappingTextBoxFlag xmlns="" xmlns:m="http://schemas.openxmlformats.org/officeDocument/2006/math" xmlns:a14="http://schemas.microsoft.com/office/drawing/2010/main" xmlns:ma14="http://schemas.microsoft.com/office/mac/drawingml/2011/main" val="1"/>
             </a:ext>
           </a:extLst>
         </p:spPr>
@@ -15110,7 +15115,7 @@
           </a:ln>
           <a:extLst>
             <a:ext uri="{C572A759-6A51-4108-AA02-DFA0A04FC94B}">
-              <ma14:wrappingTextBoxFlag xmlns:ma14="http://schemas.microsoft.com/office/mac/drawingml/2011/main" xmlns:a14="http://schemas.microsoft.com/office/drawing/2010/main" xmlns:m="http://schemas.openxmlformats.org/officeDocument/2006/math" xmlns="" val="1"/>
+              <ma14:wrappingTextBoxFlag xmlns="" xmlns:m="http://schemas.openxmlformats.org/officeDocument/2006/math" xmlns:a14="http://schemas.microsoft.com/office/drawing/2010/main" xmlns:ma14="http://schemas.microsoft.com/office/mac/drawingml/2011/main" val="1"/>
             </a:ext>
           </a:extLst>
         </p:spPr>
@@ -15393,7 +15398,7 @@
           </a:ln>
           <a:extLst>
             <a:ext uri="{C572A759-6A51-4108-AA02-DFA0A04FC94B}">
-              <ma14:wrappingTextBoxFlag xmlns:ma14="http://schemas.microsoft.com/office/mac/drawingml/2011/main" xmlns:a14="http://schemas.microsoft.com/office/drawing/2010/main" xmlns:m="http://schemas.openxmlformats.org/officeDocument/2006/math" xmlns="" val="1"/>
+              <ma14:wrappingTextBoxFlag xmlns="" xmlns:m="http://schemas.openxmlformats.org/officeDocument/2006/math" xmlns:a14="http://schemas.microsoft.com/office/drawing/2010/main" xmlns:ma14="http://schemas.microsoft.com/office/mac/drawingml/2011/main" val="1"/>
             </a:ext>
           </a:extLst>
         </p:spPr>
@@ -15438,7 +15443,7 @@
           </a:ln>
           <a:extLst>
             <a:ext uri="{C572A759-6A51-4108-AA02-DFA0A04FC94B}">
-              <ma14:wrappingTextBoxFlag xmlns:ma14="http://schemas.microsoft.com/office/mac/drawingml/2011/main" xmlns:a14="http://schemas.microsoft.com/office/drawing/2010/main" xmlns:m="http://schemas.openxmlformats.org/officeDocument/2006/math" xmlns="" val="1"/>
+              <ma14:wrappingTextBoxFlag xmlns="" xmlns:m="http://schemas.openxmlformats.org/officeDocument/2006/math" xmlns:a14="http://schemas.microsoft.com/office/drawing/2010/main" xmlns:ma14="http://schemas.microsoft.com/office/mac/drawingml/2011/main" val="1"/>
             </a:ext>
           </a:extLst>
         </p:spPr>
@@ -15525,7 +15530,7 @@
           </a:ln>
           <a:extLst>
             <a:ext uri="{C572A759-6A51-4108-AA02-DFA0A04FC94B}">
-              <ma14:wrappingTextBoxFlag xmlns:ma14="http://schemas.microsoft.com/office/mac/drawingml/2011/main" xmlns:a14="http://schemas.microsoft.com/office/drawing/2010/main" xmlns:m="http://schemas.openxmlformats.org/officeDocument/2006/math" xmlns="" val="1"/>
+              <ma14:wrappingTextBoxFlag xmlns="" xmlns:m="http://schemas.openxmlformats.org/officeDocument/2006/math" xmlns:a14="http://schemas.microsoft.com/office/drawing/2010/main" xmlns:ma14="http://schemas.microsoft.com/office/mac/drawingml/2011/main" val="1"/>
             </a:ext>
           </a:extLst>
         </p:spPr>
@@ -15560,7 +15565,7 @@
           </a:ln>
           <a:extLst>
             <a:ext uri="{C572A759-6A51-4108-AA02-DFA0A04FC94B}">
-              <ma14:wrappingTextBoxFlag xmlns:ma14="http://schemas.microsoft.com/office/mac/drawingml/2011/main" xmlns:a14="http://schemas.microsoft.com/office/drawing/2010/main" xmlns:m="http://schemas.openxmlformats.org/officeDocument/2006/math" xmlns="" val="1"/>
+              <ma14:wrappingTextBoxFlag xmlns="" xmlns:m="http://schemas.openxmlformats.org/officeDocument/2006/math" xmlns:a14="http://schemas.microsoft.com/office/drawing/2010/main" xmlns:ma14="http://schemas.microsoft.com/office/mac/drawingml/2011/main" val="1"/>
             </a:ext>
           </a:extLst>
         </p:spPr>
@@ -15640,7 +15645,7 @@
           </a:ln>
           <a:extLst>
             <a:ext uri="{C572A759-6A51-4108-AA02-DFA0A04FC94B}">
-              <ma14:wrappingTextBoxFlag xmlns:ma14="http://schemas.microsoft.com/office/mac/drawingml/2011/main" xmlns:a14="http://schemas.microsoft.com/office/drawing/2010/main" xmlns:m="http://schemas.openxmlformats.org/officeDocument/2006/math" xmlns="" val="1"/>
+              <ma14:wrappingTextBoxFlag xmlns="" xmlns:m="http://schemas.openxmlformats.org/officeDocument/2006/math" xmlns:a14="http://schemas.microsoft.com/office/drawing/2010/main" xmlns:ma14="http://schemas.microsoft.com/office/mac/drawingml/2011/main" val="1"/>
             </a:ext>
           </a:extLst>
         </p:spPr>
@@ -15790,7 +15795,7 @@
           </a:ln>
           <a:extLst>
             <a:ext uri="{C572A759-6A51-4108-AA02-DFA0A04FC94B}">
-              <ma14:wrappingTextBoxFlag xmlns:ma14="http://schemas.microsoft.com/office/mac/drawingml/2011/main" xmlns:a14="http://schemas.microsoft.com/office/drawing/2010/main" xmlns:m="http://schemas.openxmlformats.org/officeDocument/2006/math" xmlns="" val="1"/>
+              <ma14:wrappingTextBoxFlag xmlns="" xmlns:m="http://schemas.openxmlformats.org/officeDocument/2006/math" xmlns:a14="http://schemas.microsoft.com/office/drawing/2010/main" xmlns:ma14="http://schemas.microsoft.com/office/mac/drawingml/2011/main" val="1"/>
             </a:ext>
           </a:extLst>
         </p:spPr>
@@ -16553,8 +16558,8 @@
           </a:graphicData>
         </a:graphic>
       </p:graphicFrame>
-      <mc:AlternateContent xmlns:mc="http://schemas.openxmlformats.org/markup-compatibility/2006">
-        <mc:Choice xmlns:a14="http://schemas.microsoft.com/office/drawing/2010/main" Requires="a14">
+      <mc:AlternateContent xmlns:mc="http://schemas.openxmlformats.org/markup-compatibility/2006" xmlns:a14="http://schemas.microsoft.com/office/drawing/2010/main">
+        <mc:Choice Requires="a14">
           <p:sp>
             <p:nvSpPr>
               <p:cNvPr id="500" name="Equation"/>
@@ -16773,7 +16778,7 @@
             </p:txBody>
           </p:sp>
         </mc:Choice>
-        <mc:Fallback>
+        <mc:Fallback xmlns="">
           <p:sp>
             <p:nvSpPr>
               <p:cNvPr id="500" name="Equation"/>
@@ -16815,8 +16820,8 @@
           </p:sp>
         </mc:Fallback>
       </mc:AlternateContent>
-      <mc:AlternateContent xmlns:mc="http://schemas.openxmlformats.org/markup-compatibility/2006">
-        <mc:Choice xmlns:a14="http://schemas.microsoft.com/office/drawing/2010/main" Requires="a14">
+      <mc:AlternateContent xmlns:mc="http://schemas.openxmlformats.org/markup-compatibility/2006" xmlns:a14="http://schemas.microsoft.com/office/drawing/2010/main">
+        <mc:Choice Requires="a14">
           <p:sp>
             <p:nvSpPr>
               <p:cNvPr id="501" name="Equation"/>
@@ -16930,7 +16935,7 @@
             </p:txBody>
           </p:sp>
         </mc:Choice>
-        <mc:Fallback>
+        <mc:Fallback xmlns="">
           <p:sp>
             <p:nvSpPr>
               <p:cNvPr id="501" name="Equation"/>
@@ -17081,7 +17086,7 @@
           </a:ln>
           <a:extLst>
             <a:ext uri="{C572A759-6A51-4108-AA02-DFA0A04FC94B}">
-              <ma14:wrappingTextBoxFlag xmlns:ma14="http://schemas.microsoft.com/office/mac/drawingml/2011/main" xmlns:a14="http://schemas.microsoft.com/office/drawing/2010/main" xmlns:m="http://schemas.openxmlformats.org/officeDocument/2006/math" xmlns="" val="1"/>
+              <ma14:wrappingTextBoxFlag xmlns="" xmlns:m="http://schemas.openxmlformats.org/officeDocument/2006/math" xmlns:a14="http://schemas.microsoft.com/office/drawing/2010/main" xmlns:ma14="http://schemas.microsoft.com/office/mac/drawingml/2011/main" val="1"/>
             </a:ext>
           </a:extLst>
         </p:spPr>
@@ -17109,8 +17114,8 @@
           </a:p>
         </p:txBody>
       </p:sp>
-      <mc:AlternateContent xmlns:mc="http://schemas.openxmlformats.org/markup-compatibility/2006">
-        <mc:Choice xmlns:a14="http://schemas.microsoft.com/office/drawing/2010/main" Requires="a14">
+      <mc:AlternateContent xmlns:mc="http://schemas.openxmlformats.org/markup-compatibility/2006" xmlns:a14="http://schemas.microsoft.com/office/drawing/2010/main">
+        <mc:Choice Requires="a14">
           <p:sp>
             <p:nvSpPr>
               <p:cNvPr id="505" name="Equation"/>
@@ -17213,7 +17218,7 @@
             </p:txBody>
           </p:sp>
         </mc:Choice>
-        <mc:Fallback>
+        <mc:Fallback xmlns="">
           <p:sp>
             <p:nvSpPr>
               <p:cNvPr id="505" name="Equation"/>
@@ -17255,8 +17260,8 @@
           </p:sp>
         </mc:Fallback>
       </mc:AlternateContent>
-      <mc:AlternateContent xmlns:mc="http://schemas.openxmlformats.org/markup-compatibility/2006">
-        <mc:Choice xmlns:a14="http://schemas.microsoft.com/office/drawing/2010/main" Requires="a14">
+      <mc:AlternateContent xmlns:mc="http://schemas.openxmlformats.org/markup-compatibility/2006" xmlns:a14="http://schemas.microsoft.com/office/drawing/2010/main">
+        <mc:Choice Requires="a14">
           <p:sp>
             <p:nvSpPr>
               <p:cNvPr id="506" name="Equation"/>
@@ -17475,7 +17480,7 @@
             </p:txBody>
           </p:sp>
         </mc:Choice>
-        <mc:Fallback>
+        <mc:Fallback xmlns="">
           <p:sp>
             <p:nvSpPr>
               <p:cNvPr id="506" name="Equation"/>
@@ -17517,58 +17522,8 @@
           </p:sp>
         </mc:Fallback>
       </mc:AlternateContent>
-      <p:sp>
-        <p:nvSpPr>
-          <p:cNvPr id="507" name="⋅"/>
-          <p:cNvSpPr txBox="1"/>
-          <p:nvPr/>
-        </p:nvSpPr>
-        <p:spPr>
-          <a:xfrm>
-            <a:off x="3041060" y="7964711"/>
-            <a:ext cx="230531" cy="723901"/>
-          </a:xfrm>
-          <a:prstGeom prst="rect">
-            <a:avLst/>
-          </a:prstGeom>
-          <a:ln w="12700">
-            <a:miter lim="400000"/>
-          </a:ln>
-          <a:extLst>
-            <a:ext uri="{C572A759-6A51-4108-AA02-DFA0A04FC94B}">
-              <ma14:wrappingTextBoxFlag xmlns:ma14="http://schemas.microsoft.com/office/mac/drawingml/2011/main" xmlns:a14="http://schemas.microsoft.com/office/drawing/2010/main" xmlns:m="http://schemas.openxmlformats.org/officeDocument/2006/math" xmlns="" val="1"/>
-            </a:ext>
-          </a:extLst>
-        </p:spPr>
-        <p:txBody>
-          <a:bodyPr wrap="none" lIns="50800" tIns="50800" rIns="50800" bIns="50800" anchor="ctr">
-            <a:spAutoFit/>
-          </a:bodyPr>
-          <a:lstStyle>
-            <a:lvl1pPr algn="l" defTabSz="457200">
-              <a:lnSpc>
-                <a:spcPts val="6200"/>
-              </a:lnSpc>
-              <a:defRPr sz="3200">
-                <a:solidFill>
-                  <a:srgbClr val="222222"/>
-                </a:solidFill>
-                <a:latin typeface="STIXGeneral-Regular"/>
-                <a:ea typeface="STIXGeneral-Regular"/>
-                <a:cs typeface="STIXGeneral-Regular"/>
-                <a:sym typeface="STIXGeneral-Regular"/>
-              </a:defRPr>
-            </a:lvl1pPr>
-          </a:lstStyle>
-          <a:p>
-            <a:r>
-              <a:t>⋅</a:t>
-            </a:r>
-          </a:p>
-        </p:txBody>
-      </p:sp>
-      <mc:AlternateContent xmlns:mc="http://schemas.openxmlformats.org/markup-compatibility/2006">
-        <mc:Choice xmlns:a14="http://schemas.microsoft.com/office/drawing/2010/main" Requires="a14">
+      <mc:AlternateContent xmlns:mc="http://schemas.openxmlformats.org/markup-compatibility/2006" xmlns:a14="http://schemas.microsoft.com/office/drawing/2010/main">
+        <mc:Choice Requires="a14">
           <p:sp>
             <p:nvSpPr>
               <p:cNvPr id="508" name="Equation"/>
@@ -17619,7 +17574,7 @@
             </p:txBody>
           </p:sp>
         </mc:Choice>
-        <mc:Fallback>
+        <mc:Fallback xmlns="">
           <p:sp>
             <p:nvSpPr>
               <p:cNvPr id="508" name="Equation"/>
@@ -17680,7 +17635,7 @@
           </a:ln>
           <a:extLst>
             <a:ext uri="{C572A759-6A51-4108-AA02-DFA0A04FC94B}">
-              <ma14:wrappingTextBoxFlag xmlns:ma14="http://schemas.microsoft.com/office/mac/drawingml/2011/main" xmlns:a14="http://schemas.microsoft.com/office/drawing/2010/main" xmlns:m="http://schemas.openxmlformats.org/officeDocument/2006/math" xmlns="" val="1"/>
+              <ma14:wrappingTextBoxFlag xmlns="" xmlns:m="http://schemas.openxmlformats.org/officeDocument/2006/math" xmlns:a14="http://schemas.microsoft.com/office/drawing/2010/main" xmlns:ma14="http://schemas.microsoft.com/office/mac/drawingml/2011/main" val="1"/>
             </a:ext>
           </a:extLst>
         </p:spPr>
@@ -17727,7 +17682,7 @@
           </a:ln>
           <a:extLst>
             <a:ext uri="{C572A759-6A51-4108-AA02-DFA0A04FC94B}">
-              <ma14:wrappingTextBoxFlag xmlns:ma14="http://schemas.microsoft.com/office/mac/drawingml/2011/main" xmlns:a14="http://schemas.microsoft.com/office/drawing/2010/main" xmlns:m="http://schemas.openxmlformats.org/officeDocument/2006/math" xmlns="" val="1"/>
+              <ma14:wrappingTextBoxFlag xmlns="" xmlns:m="http://schemas.openxmlformats.org/officeDocument/2006/math" xmlns:a14="http://schemas.microsoft.com/office/drawing/2010/main" xmlns:ma14="http://schemas.microsoft.com/office/mac/drawingml/2011/main" val="1"/>
             </a:ext>
           </a:extLst>
         </p:spPr>
@@ -17774,7 +17729,7 @@
           </a:ln>
           <a:extLst>
             <a:ext uri="{C572A759-6A51-4108-AA02-DFA0A04FC94B}">
-              <ma14:wrappingTextBoxFlag xmlns:ma14="http://schemas.microsoft.com/office/mac/drawingml/2011/main" xmlns:a14="http://schemas.microsoft.com/office/drawing/2010/main" xmlns:m="http://schemas.openxmlformats.org/officeDocument/2006/math" xmlns="" val="1"/>
+              <ma14:wrappingTextBoxFlag xmlns="" xmlns:m="http://schemas.openxmlformats.org/officeDocument/2006/math" xmlns:a14="http://schemas.microsoft.com/office/drawing/2010/main" xmlns:ma14="http://schemas.microsoft.com/office/mac/drawingml/2011/main" val="1"/>
             </a:ext>
           </a:extLst>
         </p:spPr>
@@ -17799,116 +17754,6 @@
             <a:r>
               <a:t>b</a:t>
             </a:r>
-          </a:p>
-        </p:txBody>
-      </p:sp>
-      <p:sp>
-        <p:nvSpPr>
-          <p:cNvPr id="512" name="dot product*"/>
-          <p:cNvSpPr txBox="1"/>
-          <p:nvPr/>
-        </p:nvSpPr>
-        <p:spPr>
-          <a:xfrm>
-            <a:off x="3670720" y="9041520"/>
-            <a:ext cx="1700511" cy="457201"/>
-          </a:xfrm>
-          <a:prstGeom prst="rect">
-            <a:avLst/>
-          </a:prstGeom>
-          <a:ln w="12700">
-            <a:miter lim="400000"/>
-          </a:ln>
-          <a:extLst>
-            <a:ext uri="{C572A759-6A51-4108-AA02-DFA0A04FC94B}">
-              <ma14:wrappingTextBoxFlag xmlns:ma14="http://schemas.microsoft.com/office/mac/drawingml/2011/main" xmlns:a14="http://schemas.microsoft.com/office/drawing/2010/main" xmlns:m="http://schemas.openxmlformats.org/officeDocument/2006/math" xmlns="" val="1"/>
-            </a:ext>
-          </a:extLst>
-        </p:spPr>
-        <p:txBody>
-          <a:bodyPr wrap="none" lIns="50800" tIns="50800" rIns="50800" bIns="50800" anchor="ctr">
-            <a:spAutoFit/>
-          </a:bodyPr>
-          <a:lstStyle>
-            <a:lvl1pPr>
-              <a:defRPr>
-                <a:solidFill>
-                  <a:schemeClr val="accent5">
-                    <a:hueOff val="-82419"/>
-                    <a:satOff val="-9513"/>
-                    <a:lumOff val="-16343"/>
-                  </a:schemeClr>
-                </a:solidFill>
-              </a:defRPr>
-            </a:lvl1pPr>
-          </a:lstStyle>
-          <a:p>
-            <a:r>
-              <a:t>dot product*</a:t>
-            </a:r>
-          </a:p>
-        </p:txBody>
-      </p:sp>
-      <p:sp>
-        <p:nvSpPr>
-          <p:cNvPr id="518" name="Connection Line"/>
-          <p:cNvSpPr/>
-          <p:nvPr/>
-        </p:nvSpPr>
-        <p:spPr>
-          <a:xfrm>
-            <a:off x="3184482" y="8911180"/>
-            <a:ext cx="474663" cy="405451"/>
-          </a:xfrm>
-          <a:custGeom>
-            <a:avLst/>
-            <a:gdLst/>
-            <a:ahLst/>
-            <a:cxnLst>
-              <a:cxn ang="0">
-                <a:pos x="wd2" y="hd2"/>
-              </a:cxn>
-              <a:cxn ang="5400000">
-                <a:pos x="wd2" y="hd2"/>
-              </a:cxn>
-              <a:cxn ang="10800000">
-                <a:pos x="wd2" y="hd2"/>
-              </a:cxn>
-              <a:cxn ang="16200000">
-                <a:pos x="wd2" y="hd2"/>
-              </a:cxn>
-            </a:cxnLst>
-            <a:rect l="0" t="0" r="r" b="b"/>
-            <a:pathLst>
-              <a:path w="21600" h="19667" extrusionOk="0">
-                <a:moveTo>
-                  <a:pt x="21600" y="19162"/>
-                </a:moveTo>
-                <a:cubicBezTo>
-                  <a:pt x="8363" y="21600"/>
-                  <a:pt x="1163" y="15213"/>
-                  <a:pt x="0" y="0"/>
-                </a:cubicBezTo>
-              </a:path>
-            </a:pathLst>
-          </a:custGeom>
-          <a:ln w="25400">
-            <a:solidFill>
-              <a:schemeClr val="accent5">
-                <a:hueOff val="-82419"/>
-                <a:satOff val="-9513"/>
-                <a:lumOff val="-16343"/>
-              </a:schemeClr>
-            </a:solidFill>
-            <a:miter lim="400000"/>
-            <a:tailEnd type="triangle"/>
-          </a:ln>
-        </p:spPr>
-        <p:txBody>
-          <a:bodyPr/>
-          <a:lstStyle/>
-          <a:p>
-            <a:endParaRPr/>
           </a:p>
         </p:txBody>
       </p:sp>
@@ -18021,7 +17866,7 @@
           </a:ln>
           <a:extLst>
             <a:ext uri="{C572A759-6A51-4108-AA02-DFA0A04FC94B}">
-              <ma14:wrappingTextBoxFlag xmlns:ma14="http://schemas.microsoft.com/office/mac/drawingml/2011/main" xmlns:a14="http://schemas.microsoft.com/office/drawing/2010/main" xmlns:m="http://schemas.openxmlformats.org/officeDocument/2006/math" xmlns="" val="1"/>
+              <ma14:wrappingTextBoxFlag xmlns="" xmlns:m="http://schemas.openxmlformats.org/officeDocument/2006/math" xmlns:a14="http://schemas.microsoft.com/office/drawing/2010/main" xmlns:ma14="http://schemas.microsoft.com/office/mac/drawingml/2011/main" val="1"/>
             </a:ext>
           </a:extLst>
         </p:spPr>
@@ -18040,56 +17885,6 @@
           <a:p>
             <a:r>
               <a:t>y = Xc + b</a:t>
-            </a:r>
-          </a:p>
-        </p:txBody>
-      </p:sp>
-      <p:sp>
-        <p:nvSpPr>
-          <p:cNvPr id="517" name="*dot product is usually between vectors by definition, but numpy uses np.dot for matrix multiplication"/>
-          <p:cNvSpPr txBox="1"/>
-          <p:nvPr/>
-        </p:nvSpPr>
-        <p:spPr>
-          <a:xfrm>
-            <a:off x="7523403" y="8815455"/>
-            <a:ext cx="4902065" cy="609601"/>
-          </a:xfrm>
-          <a:prstGeom prst="rect">
-            <a:avLst/>
-          </a:prstGeom>
-          <a:ln w="12700">
-            <a:miter lim="400000"/>
-          </a:ln>
-          <a:extLst>
-            <a:ext uri="{C572A759-6A51-4108-AA02-DFA0A04FC94B}">
-              <ma14:wrappingTextBoxFlag xmlns:ma14="http://schemas.microsoft.com/office/mac/drawingml/2011/main" xmlns:a14="http://schemas.microsoft.com/office/drawing/2010/main" xmlns:m="http://schemas.openxmlformats.org/officeDocument/2006/math" xmlns="" val="1"/>
-            </a:ext>
-          </a:extLst>
-        </p:spPr>
-        <p:txBody>
-          <a:bodyPr wrap="none" lIns="50800" tIns="50800" rIns="50800" bIns="50800" anchor="ctr">
-            <a:spAutoFit/>
-          </a:bodyPr>
-          <a:lstStyle/>
-          <a:p>
-            <a:pPr>
-              <a:defRPr sz="1800">
-                <a:solidFill>
-                  <a:schemeClr val="accent5">
-                    <a:hueOff val="-82419"/>
-                    <a:satOff val="-9513"/>
-                    <a:lumOff val="-16343"/>
-                  </a:schemeClr>
-                </a:solidFill>
-              </a:defRPr>
-            </a:pPr>
-            <a:r>
-              <a:t>*dot product is usually between vectors by definition,</a:t>
-            </a:r>
-            <a:br/>
-            <a:r>
-              <a:t>but numpy uses np.dot for matrix multiplication</a:t>
             </a:r>
           </a:p>
         </p:txBody>
@@ -18183,7 +17978,7 @@
           </a:ln>
           <a:extLst>
             <a:ext uri="{C572A759-6A51-4108-AA02-DFA0A04FC94B}">
-              <ma14:wrappingTextBoxFlag xmlns:ma14="http://schemas.microsoft.com/office/mac/drawingml/2011/main" xmlns:a14="http://schemas.microsoft.com/office/drawing/2010/main" xmlns:m="http://schemas.openxmlformats.org/officeDocument/2006/math" xmlns="" val="1"/>
+              <ma14:wrappingTextBoxFlag xmlns="" xmlns:m="http://schemas.openxmlformats.org/officeDocument/2006/math" xmlns:a14="http://schemas.microsoft.com/office/drawing/2010/main" xmlns:ma14="http://schemas.microsoft.com/office/mac/drawingml/2011/main" val="1"/>
             </a:ext>
           </a:extLst>
         </p:spPr>
@@ -18946,8 +18741,8 @@
           </a:graphicData>
         </a:graphic>
       </p:graphicFrame>
-      <mc:AlternateContent xmlns:mc="http://schemas.openxmlformats.org/markup-compatibility/2006">
-        <mc:Choice xmlns:a14="http://schemas.microsoft.com/office/drawing/2010/main" Requires="a14">
+      <mc:AlternateContent xmlns:mc="http://schemas.openxmlformats.org/markup-compatibility/2006" xmlns:a14="http://schemas.microsoft.com/office/drawing/2010/main">
+        <mc:Choice Requires="a14">
           <p:sp>
             <p:nvSpPr>
               <p:cNvPr id="526" name="Equation"/>
@@ -19166,7 +18961,7 @@
             </p:txBody>
           </p:sp>
         </mc:Choice>
-        <mc:Fallback>
+        <mc:Fallback xmlns="">
           <p:sp>
             <p:nvSpPr>
               <p:cNvPr id="526" name="Equation"/>
@@ -19208,8 +19003,8 @@
           </p:sp>
         </mc:Fallback>
       </mc:AlternateContent>
-      <mc:AlternateContent xmlns:mc="http://schemas.openxmlformats.org/markup-compatibility/2006">
-        <mc:Choice xmlns:a14="http://schemas.microsoft.com/office/drawing/2010/main" Requires="a14">
+      <mc:AlternateContent xmlns:mc="http://schemas.openxmlformats.org/markup-compatibility/2006" xmlns:a14="http://schemas.microsoft.com/office/drawing/2010/main">
+        <mc:Choice Requires="a14">
           <p:sp>
             <p:nvSpPr>
               <p:cNvPr id="527" name="Equation"/>
@@ -19323,7 +19118,7 @@
             </p:txBody>
           </p:sp>
         </mc:Choice>
-        <mc:Fallback>
+        <mc:Fallback xmlns="">
           <p:sp>
             <p:nvSpPr>
               <p:cNvPr id="527" name="Equation"/>
@@ -19474,7 +19269,7 @@
           </a:ln>
           <a:extLst>
             <a:ext uri="{C572A759-6A51-4108-AA02-DFA0A04FC94B}">
-              <ma14:wrappingTextBoxFlag xmlns:ma14="http://schemas.microsoft.com/office/mac/drawingml/2011/main" xmlns:a14="http://schemas.microsoft.com/office/drawing/2010/main" xmlns:m="http://schemas.openxmlformats.org/officeDocument/2006/math" xmlns="" val="1"/>
+              <ma14:wrappingTextBoxFlag xmlns="" xmlns:m="http://schemas.openxmlformats.org/officeDocument/2006/math" xmlns:a14="http://schemas.microsoft.com/office/drawing/2010/main" xmlns:ma14="http://schemas.microsoft.com/office/mac/drawingml/2011/main" val="1"/>
             </a:ext>
           </a:extLst>
         </p:spPr>
@@ -19502,8 +19297,8 @@
           </a:p>
         </p:txBody>
       </p:sp>
-      <mc:AlternateContent xmlns:mc="http://schemas.openxmlformats.org/markup-compatibility/2006">
-        <mc:Choice xmlns:a14="http://schemas.microsoft.com/office/drawing/2010/main" Requires="a14">
+      <mc:AlternateContent xmlns:mc="http://schemas.openxmlformats.org/markup-compatibility/2006" xmlns:a14="http://schemas.microsoft.com/office/drawing/2010/main">
+        <mc:Choice Requires="a14">
           <p:sp>
             <p:nvSpPr>
               <p:cNvPr id="531" name="Equation"/>
@@ -19606,7 +19401,7 @@
             </p:txBody>
           </p:sp>
         </mc:Choice>
-        <mc:Fallback>
+        <mc:Fallback xmlns="">
           <p:sp>
             <p:nvSpPr>
               <p:cNvPr id="531" name="Equation"/>
@@ -19648,8 +19443,8 @@
           </p:sp>
         </mc:Fallback>
       </mc:AlternateContent>
-      <mc:AlternateContent xmlns:mc="http://schemas.openxmlformats.org/markup-compatibility/2006">
-        <mc:Choice xmlns:a14="http://schemas.microsoft.com/office/drawing/2010/main" Requires="a14">
+      <mc:AlternateContent xmlns:mc="http://schemas.openxmlformats.org/markup-compatibility/2006" xmlns:a14="http://schemas.microsoft.com/office/drawing/2010/main">
+        <mc:Choice Requires="a14">
           <p:sp>
             <p:nvSpPr>
               <p:cNvPr id="532" name="Equation"/>
@@ -19868,7 +19663,7 @@
             </p:txBody>
           </p:sp>
         </mc:Choice>
-        <mc:Fallback>
+        <mc:Fallback xmlns="">
           <p:sp>
             <p:nvSpPr>
               <p:cNvPr id="532" name="Equation"/>
@@ -19910,58 +19705,8 @@
           </p:sp>
         </mc:Fallback>
       </mc:AlternateContent>
-      <p:sp>
-        <p:nvSpPr>
-          <p:cNvPr id="533" name="⋅"/>
-          <p:cNvSpPr txBox="1"/>
-          <p:nvPr/>
-        </p:nvSpPr>
-        <p:spPr>
-          <a:xfrm>
-            <a:off x="3041060" y="7964711"/>
-            <a:ext cx="230531" cy="723901"/>
-          </a:xfrm>
-          <a:prstGeom prst="rect">
-            <a:avLst/>
-          </a:prstGeom>
-          <a:ln w="12700">
-            <a:miter lim="400000"/>
-          </a:ln>
-          <a:extLst>
-            <a:ext uri="{C572A759-6A51-4108-AA02-DFA0A04FC94B}">
-              <ma14:wrappingTextBoxFlag xmlns:ma14="http://schemas.microsoft.com/office/mac/drawingml/2011/main" xmlns:a14="http://schemas.microsoft.com/office/drawing/2010/main" xmlns:m="http://schemas.openxmlformats.org/officeDocument/2006/math" xmlns="" val="1"/>
-            </a:ext>
-          </a:extLst>
-        </p:spPr>
-        <p:txBody>
-          <a:bodyPr wrap="none" lIns="50800" tIns="50800" rIns="50800" bIns="50800" anchor="ctr">
-            <a:spAutoFit/>
-          </a:bodyPr>
-          <a:lstStyle>
-            <a:lvl1pPr algn="l" defTabSz="457200">
-              <a:lnSpc>
-                <a:spcPts val="6200"/>
-              </a:lnSpc>
-              <a:defRPr sz="3200">
-                <a:solidFill>
-                  <a:srgbClr val="222222"/>
-                </a:solidFill>
-                <a:latin typeface="STIXGeneral-Regular"/>
-                <a:ea typeface="STIXGeneral-Regular"/>
-                <a:cs typeface="STIXGeneral-Regular"/>
-                <a:sym typeface="STIXGeneral-Regular"/>
-              </a:defRPr>
-            </a:lvl1pPr>
-          </a:lstStyle>
-          <a:p>
-            <a:r>
-              <a:t>⋅</a:t>
-            </a:r>
-          </a:p>
-        </p:txBody>
-      </p:sp>
-      <mc:AlternateContent xmlns:mc="http://schemas.openxmlformats.org/markup-compatibility/2006">
-        <mc:Choice xmlns:a14="http://schemas.microsoft.com/office/drawing/2010/main" Requires="a14">
+      <mc:AlternateContent xmlns:mc="http://schemas.openxmlformats.org/markup-compatibility/2006" xmlns:a14="http://schemas.microsoft.com/office/drawing/2010/main">
+        <mc:Choice Requires="a14">
           <p:sp>
             <p:nvSpPr>
               <p:cNvPr id="534" name="Equation"/>
@@ -20012,7 +19757,7 @@
             </p:txBody>
           </p:sp>
         </mc:Choice>
-        <mc:Fallback>
+        <mc:Fallback xmlns="">
           <p:sp>
             <p:nvSpPr>
               <p:cNvPr id="534" name="Equation"/>
@@ -20073,7 +19818,7 @@
           </a:ln>
           <a:extLst>
             <a:ext uri="{C572A759-6A51-4108-AA02-DFA0A04FC94B}">
-              <ma14:wrappingTextBoxFlag xmlns:ma14="http://schemas.microsoft.com/office/mac/drawingml/2011/main" xmlns:a14="http://schemas.microsoft.com/office/drawing/2010/main" xmlns:m="http://schemas.openxmlformats.org/officeDocument/2006/math" xmlns="" val="1"/>
+              <ma14:wrappingTextBoxFlag xmlns="" xmlns:m="http://schemas.openxmlformats.org/officeDocument/2006/math" xmlns:a14="http://schemas.microsoft.com/office/drawing/2010/main" xmlns:ma14="http://schemas.microsoft.com/office/mac/drawingml/2011/main" val="1"/>
             </a:ext>
           </a:extLst>
         </p:spPr>
@@ -20120,7 +19865,7 @@
           </a:ln>
           <a:extLst>
             <a:ext uri="{C572A759-6A51-4108-AA02-DFA0A04FC94B}">
-              <ma14:wrappingTextBoxFlag xmlns:ma14="http://schemas.microsoft.com/office/mac/drawingml/2011/main" xmlns:a14="http://schemas.microsoft.com/office/drawing/2010/main" xmlns:m="http://schemas.openxmlformats.org/officeDocument/2006/math" xmlns="" val="1"/>
+              <ma14:wrappingTextBoxFlag xmlns="" xmlns:m="http://schemas.openxmlformats.org/officeDocument/2006/math" xmlns:a14="http://schemas.microsoft.com/office/drawing/2010/main" xmlns:ma14="http://schemas.microsoft.com/office/mac/drawingml/2011/main" val="1"/>
             </a:ext>
           </a:extLst>
         </p:spPr>
@@ -20167,7 +19912,7 @@
           </a:ln>
           <a:extLst>
             <a:ext uri="{C572A759-6A51-4108-AA02-DFA0A04FC94B}">
-              <ma14:wrappingTextBoxFlag xmlns:ma14="http://schemas.microsoft.com/office/mac/drawingml/2011/main" xmlns:a14="http://schemas.microsoft.com/office/drawing/2010/main" xmlns:m="http://schemas.openxmlformats.org/officeDocument/2006/math" xmlns="" val="1"/>
+              <ma14:wrappingTextBoxFlag xmlns="" xmlns:m="http://schemas.openxmlformats.org/officeDocument/2006/math" xmlns:a14="http://schemas.microsoft.com/office/drawing/2010/main" xmlns:ma14="http://schemas.microsoft.com/office/mac/drawingml/2011/main" val="1"/>
             </a:ext>
           </a:extLst>
         </p:spPr>
@@ -20192,116 +19937,6 @@
             <a:r>
               <a:t>b</a:t>
             </a:r>
-          </a:p>
-        </p:txBody>
-      </p:sp>
-      <p:sp>
-        <p:nvSpPr>
-          <p:cNvPr id="538" name="dot product"/>
-          <p:cNvSpPr txBox="1"/>
-          <p:nvPr/>
-        </p:nvSpPr>
-        <p:spPr>
-          <a:xfrm>
-            <a:off x="3678732" y="9041520"/>
-            <a:ext cx="1557487" cy="457201"/>
-          </a:xfrm>
-          <a:prstGeom prst="rect">
-            <a:avLst/>
-          </a:prstGeom>
-          <a:ln w="12700">
-            <a:miter lim="400000"/>
-          </a:ln>
-          <a:extLst>
-            <a:ext uri="{C572A759-6A51-4108-AA02-DFA0A04FC94B}">
-              <ma14:wrappingTextBoxFlag xmlns:ma14="http://schemas.microsoft.com/office/mac/drawingml/2011/main" xmlns:a14="http://schemas.microsoft.com/office/drawing/2010/main" xmlns:m="http://schemas.openxmlformats.org/officeDocument/2006/math" xmlns="" val="1"/>
-            </a:ext>
-          </a:extLst>
-        </p:spPr>
-        <p:txBody>
-          <a:bodyPr wrap="none" lIns="50800" tIns="50800" rIns="50800" bIns="50800" anchor="ctr">
-            <a:spAutoFit/>
-          </a:bodyPr>
-          <a:lstStyle>
-            <a:lvl1pPr>
-              <a:defRPr>
-                <a:solidFill>
-                  <a:schemeClr val="accent5">
-                    <a:hueOff val="-82419"/>
-                    <a:satOff val="-9513"/>
-                    <a:lumOff val="-16343"/>
-                  </a:schemeClr>
-                </a:solidFill>
-              </a:defRPr>
-            </a:lvl1pPr>
-          </a:lstStyle>
-          <a:p>
-            <a:r>
-              <a:t>dot product</a:t>
-            </a:r>
-          </a:p>
-        </p:txBody>
-      </p:sp>
-      <p:sp>
-        <p:nvSpPr>
-          <p:cNvPr id="555" name="Connection Line"/>
-          <p:cNvSpPr/>
-          <p:nvPr/>
-        </p:nvSpPr>
-        <p:spPr>
-          <a:xfrm>
-            <a:off x="3184482" y="8911180"/>
-            <a:ext cx="474663" cy="405451"/>
-          </a:xfrm>
-          <a:custGeom>
-            <a:avLst/>
-            <a:gdLst/>
-            <a:ahLst/>
-            <a:cxnLst>
-              <a:cxn ang="0">
-                <a:pos x="wd2" y="hd2"/>
-              </a:cxn>
-              <a:cxn ang="5400000">
-                <a:pos x="wd2" y="hd2"/>
-              </a:cxn>
-              <a:cxn ang="10800000">
-                <a:pos x="wd2" y="hd2"/>
-              </a:cxn>
-              <a:cxn ang="16200000">
-                <a:pos x="wd2" y="hd2"/>
-              </a:cxn>
-            </a:cxnLst>
-            <a:rect l="0" t="0" r="r" b="b"/>
-            <a:pathLst>
-              <a:path w="21600" h="19667" extrusionOk="0">
-                <a:moveTo>
-                  <a:pt x="21600" y="19162"/>
-                </a:moveTo>
-                <a:cubicBezTo>
-                  <a:pt x="8363" y="21600"/>
-                  <a:pt x="1163" y="15213"/>
-                  <a:pt x="0" y="0"/>
-                </a:cubicBezTo>
-              </a:path>
-            </a:pathLst>
-          </a:custGeom>
-          <a:ln w="25400">
-            <a:solidFill>
-              <a:schemeClr val="accent5">
-                <a:hueOff val="-82419"/>
-                <a:satOff val="-9513"/>
-                <a:lumOff val="-16343"/>
-              </a:schemeClr>
-            </a:solidFill>
-            <a:miter lim="400000"/>
-            <a:tailEnd type="triangle"/>
-          </a:ln>
-        </p:spPr>
-        <p:txBody>
-          <a:bodyPr/>
-          <a:lstStyle/>
-          <a:p>
-            <a:endParaRPr/>
           </a:p>
         </p:txBody>
       </p:sp>
@@ -20414,7 +20049,7 @@
           </a:ln>
           <a:extLst>
             <a:ext uri="{C572A759-6A51-4108-AA02-DFA0A04FC94B}">
-              <ma14:wrappingTextBoxFlag xmlns:ma14="http://schemas.microsoft.com/office/mac/drawingml/2011/main" xmlns:a14="http://schemas.microsoft.com/office/drawing/2010/main" xmlns:m="http://schemas.openxmlformats.org/officeDocument/2006/math" xmlns="" val="1"/>
+              <ma14:wrappingTextBoxFlag xmlns="" xmlns:m="http://schemas.openxmlformats.org/officeDocument/2006/math" xmlns:a14="http://schemas.microsoft.com/office/drawing/2010/main" xmlns:ma14="http://schemas.microsoft.com/office/mac/drawingml/2011/main" val="1"/>
             </a:ext>
           </a:extLst>
         </p:spPr>
@@ -20456,7 +20091,7 @@
           </a:ln>
           <a:extLst>
             <a:ext uri="{C572A759-6A51-4108-AA02-DFA0A04FC94B}">
-              <ma14:wrappingTextBoxFlag xmlns:ma14="http://schemas.microsoft.com/office/mac/drawingml/2011/main" xmlns:a14="http://schemas.microsoft.com/office/drawing/2010/main" xmlns:m="http://schemas.openxmlformats.org/officeDocument/2006/math" xmlns="" val="1"/>
+              <ma14:wrappingTextBoxFlag xmlns="" xmlns:m="http://schemas.openxmlformats.org/officeDocument/2006/math" xmlns:a14="http://schemas.microsoft.com/office/drawing/2010/main" xmlns:ma14="http://schemas.microsoft.com/office/mac/drawingml/2011/main" val="1"/>
             </a:ext>
           </a:extLst>
         </p:spPr>
@@ -20500,7 +20135,7 @@
           </a:ln>
           <a:extLst>
             <a:ext uri="{C572A759-6A51-4108-AA02-DFA0A04FC94B}">
-              <ma14:wrappingTextBoxFlag xmlns:ma14="http://schemas.microsoft.com/office/mac/drawingml/2011/main" xmlns:a14="http://schemas.microsoft.com/office/drawing/2010/main" xmlns:m="http://schemas.openxmlformats.org/officeDocument/2006/math" xmlns="" val="1"/>
+              <ma14:wrappingTextBoxFlag xmlns="" xmlns:m="http://schemas.openxmlformats.org/officeDocument/2006/math" xmlns:a14="http://schemas.microsoft.com/office/drawing/2010/main" xmlns:ma14="http://schemas.microsoft.com/office/mac/drawingml/2011/main" val="1"/>
             </a:ext>
           </a:extLst>
         </p:spPr>
@@ -20544,7 +20179,7 @@
           </a:ln>
           <a:extLst>
             <a:ext uri="{C572A759-6A51-4108-AA02-DFA0A04FC94B}">
-              <ma14:wrappingTextBoxFlag xmlns:ma14="http://schemas.microsoft.com/office/mac/drawingml/2011/main" xmlns:a14="http://schemas.microsoft.com/office/drawing/2010/main" xmlns:m="http://schemas.openxmlformats.org/officeDocument/2006/math" xmlns="" val="1"/>
+              <ma14:wrappingTextBoxFlag xmlns="" xmlns:m="http://schemas.openxmlformats.org/officeDocument/2006/math" xmlns:a14="http://schemas.microsoft.com/office/drawing/2010/main" xmlns:ma14="http://schemas.microsoft.com/office/mac/drawingml/2011/main" val="1"/>
             </a:ext>
           </a:extLst>
         </p:spPr>
@@ -20591,7 +20226,7 @@
           </a:ln>
           <a:extLst>
             <a:ext uri="{C572A759-6A51-4108-AA02-DFA0A04FC94B}">
-              <ma14:wrappingTextBoxFlag xmlns:ma14="http://schemas.microsoft.com/office/mac/drawingml/2011/main" xmlns:a14="http://schemas.microsoft.com/office/drawing/2010/main" xmlns:m="http://schemas.openxmlformats.org/officeDocument/2006/math" xmlns="" val="1"/>
+              <ma14:wrappingTextBoxFlag xmlns="" xmlns:m="http://schemas.openxmlformats.org/officeDocument/2006/math" xmlns:a14="http://schemas.microsoft.com/office/drawing/2010/main" xmlns:ma14="http://schemas.microsoft.com/office/mac/drawingml/2011/main" val="1"/>
             </a:ext>
           </a:extLst>
         </p:spPr>
@@ -20638,7 +20273,7 @@
           </a:ln>
           <a:extLst>
             <a:ext uri="{C572A759-6A51-4108-AA02-DFA0A04FC94B}">
-              <ma14:wrappingTextBoxFlag xmlns:ma14="http://schemas.microsoft.com/office/mac/drawingml/2011/main" xmlns:a14="http://schemas.microsoft.com/office/drawing/2010/main" xmlns:m="http://schemas.openxmlformats.org/officeDocument/2006/math" xmlns="" val="1"/>
+              <ma14:wrappingTextBoxFlag xmlns="" xmlns:m="http://schemas.openxmlformats.org/officeDocument/2006/math" xmlns:a14="http://schemas.microsoft.com/office/drawing/2010/main" xmlns:ma14="http://schemas.microsoft.com/office/mac/drawingml/2011/main" val="1"/>
             </a:ext>
           </a:extLst>
         </p:spPr>
@@ -20685,7 +20320,7 @@
           </a:ln>
           <a:extLst>
             <a:ext uri="{C572A759-6A51-4108-AA02-DFA0A04FC94B}">
-              <ma14:wrappingTextBoxFlag xmlns:ma14="http://schemas.microsoft.com/office/mac/drawingml/2011/main" xmlns:a14="http://schemas.microsoft.com/office/drawing/2010/main" xmlns:m="http://schemas.openxmlformats.org/officeDocument/2006/math" xmlns="" val="1"/>
+              <ma14:wrappingTextBoxFlag xmlns="" xmlns:m="http://schemas.openxmlformats.org/officeDocument/2006/math" xmlns:a14="http://schemas.microsoft.com/office/drawing/2010/main" xmlns:ma14="http://schemas.microsoft.com/office/mac/drawingml/2011/main" val="1"/>
             </a:ext>
           </a:extLst>
         </p:spPr>
@@ -20732,7 +20367,7 @@
           </a:ln>
           <a:extLst>
             <a:ext uri="{C572A759-6A51-4108-AA02-DFA0A04FC94B}">
-              <ma14:wrappingTextBoxFlag xmlns:ma14="http://schemas.microsoft.com/office/mac/drawingml/2011/main" xmlns:a14="http://schemas.microsoft.com/office/drawing/2010/main" xmlns:m="http://schemas.openxmlformats.org/officeDocument/2006/math" xmlns="" val="1"/>
+              <ma14:wrappingTextBoxFlag xmlns="" xmlns:m="http://schemas.openxmlformats.org/officeDocument/2006/math" xmlns:a14="http://schemas.microsoft.com/office/drawing/2010/main" xmlns:ma14="http://schemas.microsoft.com/office/mac/drawingml/2011/main" val="1"/>
             </a:ext>
           </a:extLst>
         </p:spPr>
@@ -20779,7 +20414,7 @@
           </a:ln>
           <a:extLst>
             <a:ext uri="{C572A759-6A51-4108-AA02-DFA0A04FC94B}">
-              <ma14:wrappingTextBoxFlag xmlns:ma14="http://schemas.microsoft.com/office/mac/drawingml/2011/main" xmlns:a14="http://schemas.microsoft.com/office/drawing/2010/main" xmlns:m="http://schemas.openxmlformats.org/officeDocument/2006/math" xmlns="" val="1"/>
+              <ma14:wrappingTextBoxFlag xmlns="" xmlns:m="http://schemas.openxmlformats.org/officeDocument/2006/math" xmlns:a14="http://schemas.microsoft.com/office/drawing/2010/main" xmlns:ma14="http://schemas.microsoft.com/office/mac/drawingml/2011/main" val="1"/>
             </a:ext>
           </a:extLst>
         </p:spPr>
@@ -20826,7 +20461,7 @@
           </a:ln>
           <a:extLst>
             <a:ext uri="{C572A759-6A51-4108-AA02-DFA0A04FC94B}">
-              <ma14:wrappingTextBoxFlag xmlns:ma14="http://schemas.microsoft.com/office/mac/drawingml/2011/main" xmlns:a14="http://schemas.microsoft.com/office/drawing/2010/main" xmlns:m="http://schemas.openxmlformats.org/officeDocument/2006/math" xmlns="" val="1"/>
+              <ma14:wrappingTextBoxFlag xmlns="" xmlns:m="http://schemas.openxmlformats.org/officeDocument/2006/math" xmlns:a14="http://schemas.microsoft.com/office/drawing/2010/main" xmlns:ma14="http://schemas.microsoft.com/office/mac/drawingml/2011/main" val="1"/>
             </a:ext>
           </a:extLst>
         </p:spPr>
@@ -20957,7 +20592,7 @@
           </a:ln>
           <a:extLst>
             <a:ext uri="{C572A759-6A51-4108-AA02-DFA0A04FC94B}">
-              <ma14:wrappingTextBoxFlag xmlns:ma14="http://schemas.microsoft.com/office/mac/drawingml/2011/main" xmlns:a14="http://schemas.microsoft.com/office/drawing/2010/main" xmlns:m="http://schemas.openxmlformats.org/officeDocument/2006/math" xmlns="" val="1"/>
+              <ma14:wrappingTextBoxFlag xmlns="" xmlns:m="http://schemas.openxmlformats.org/officeDocument/2006/math" xmlns:a14="http://schemas.microsoft.com/office/drawing/2010/main" xmlns:ma14="http://schemas.microsoft.com/office/mac/drawingml/2011/main" val="1"/>
             </a:ext>
           </a:extLst>
         </p:spPr>
@@ -21074,7 +20709,7 @@
           </a:ln>
           <a:extLst>
             <a:ext uri="{C572A759-6A51-4108-AA02-DFA0A04FC94B}">
-              <ma14:wrappingTextBoxFlag xmlns:ma14="http://schemas.microsoft.com/office/mac/drawingml/2011/main" xmlns:a14="http://schemas.microsoft.com/office/drawing/2010/main" xmlns:m="http://schemas.openxmlformats.org/officeDocument/2006/math" xmlns="" val="1"/>
+              <ma14:wrappingTextBoxFlag xmlns="" xmlns:m="http://schemas.openxmlformats.org/officeDocument/2006/math" xmlns:a14="http://schemas.microsoft.com/office/drawing/2010/main" xmlns:ma14="http://schemas.microsoft.com/office/mac/drawingml/2011/main" val="1"/>
             </a:ext>
           </a:extLst>
         </p:spPr>
@@ -21837,8 +21472,8 @@
           </a:graphicData>
         </a:graphic>
       </p:graphicFrame>
-      <mc:AlternateContent xmlns:mc="http://schemas.openxmlformats.org/markup-compatibility/2006">
-        <mc:Choice xmlns:a14="http://schemas.microsoft.com/office/drawing/2010/main" Requires="a14">
+      <mc:AlternateContent xmlns:mc="http://schemas.openxmlformats.org/markup-compatibility/2006" xmlns:a14="http://schemas.microsoft.com/office/drawing/2010/main">
+        <mc:Choice Requires="a14">
           <p:sp>
             <p:nvSpPr>
               <p:cNvPr id="563" name="Equation"/>
@@ -22057,7 +21692,7 @@
             </p:txBody>
           </p:sp>
         </mc:Choice>
-        <mc:Fallback>
+        <mc:Fallback xmlns="">
           <p:sp>
             <p:nvSpPr>
               <p:cNvPr id="563" name="Equation"/>
@@ -22099,8 +21734,8 @@
           </p:sp>
         </mc:Fallback>
       </mc:AlternateContent>
-      <mc:AlternateContent xmlns:mc="http://schemas.openxmlformats.org/markup-compatibility/2006">
-        <mc:Choice xmlns:a14="http://schemas.microsoft.com/office/drawing/2010/main" Requires="a14">
+      <mc:AlternateContent xmlns:mc="http://schemas.openxmlformats.org/markup-compatibility/2006" xmlns:a14="http://schemas.microsoft.com/office/drawing/2010/main">
+        <mc:Choice Requires="a14">
           <p:sp>
             <p:nvSpPr>
               <p:cNvPr id="564" name="Equation"/>
@@ -22214,7 +21849,7 @@
             </p:txBody>
           </p:sp>
         </mc:Choice>
-        <mc:Fallback>
+        <mc:Fallback xmlns="">
           <p:sp>
             <p:nvSpPr>
               <p:cNvPr id="564" name="Equation"/>
@@ -22365,7 +22000,7 @@
           </a:ln>
           <a:extLst>
             <a:ext uri="{C572A759-6A51-4108-AA02-DFA0A04FC94B}">
-              <ma14:wrappingTextBoxFlag xmlns:ma14="http://schemas.microsoft.com/office/mac/drawingml/2011/main" xmlns:a14="http://schemas.microsoft.com/office/drawing/2010/main" xmlns:m="http://schemas.openxmlformats.org/officeDocument/2006/math" xmlns="" val="1"/>
+              <ma14:wrappingTextBoxFlag xmlns="" xmlns:m="http://schemas.openxmlformats.org/officeDocument/2006/math" xmlns:a14="http://schemas.microsoft.com/office/drawing/2010/main" xmlns:ma14="http://schemas.microsoft.com/office/mac/drawingml/2011/main" val="1"/>
             </a:ext>
           </a:extLst>
         </p:spPr>
@@ -22393,8 +22028,8 @@
           </a:p>
         </p:txBody>
       </p:sp>
-      <mc:AlternateContent xmlns:mc="http://schemas.openxmlformats.org/markup-compatibility/2006">
-        <mc:Choice xmlns:a14="http://schemas.microsoft.com/office/drawing/2010/main" Requires="a14">
+      <mc:AlternateContent xmlns:mc="http://schemas.openxmlformats.org/markup-compatibility/2006" xmlns:a14="http://schemas.microsoft.com/office/drawing/2010/main">
+        <mc:Choice Requires="a14">
           <p:sp>
             <p:nvSpPr>
               <p:cNvPr id="568" name="Equation"/>
@@ -22497,7 +22132,7 @@
             </p:txBody>
           </p:sp>
         </mc:Choice>
-        <mc:Fallback>
+        <mc:Fallback xmlns="">
           <p:sp>
             <p:nvSpPr>
               <p:cNvPr id="568" name="Equation"/>
@@ -22539,8 +22174,8 @@
           </p:sp>
         </mc:Fallback>
       </mc:AlternateContent>
-      <mc:AlternateContent xmlns:mc="http://schemas.openxmlformats.org/markup-compatibility/2006">
-        <mc:Choice xmlns:a14="http://schemas.microsoft.com/office/drawing/2010/main" Requires="a14">
+      <mc:AlternateContent xmlns:mc="http://schemas.openxmlformats.org/markup-compatibility/2006" xmlns:a14="http://schemas.microsoft.com/office/drawing/2010/main">
+        <mc:Choice Requires="a14">
           <p:sp>
             <p:nvSpPr>
               <p:cNvPr id="569" name="Equation"/>
@@ -22759,7 +22394,7 @@
             </p:txBody>
           </p:sp>
         </mc:Choice>
-        <mc:Fallback>
+        <mc:Fallback xmlns="">
           <p:sp>
             <p:nvSpPr>
               <p:cNvPr id="569" name="Equation"/>
@@ -22801,58 +22436,8 @@
           </p:sp>
         </mc:Fallback>
       </mc:AlternateContent>
-      <p:sp>
-        <p:nvSpPr>
-          <p:cNvPr id="570" name="⋅"/>
-          <p:cNvSpPr txBox="1"/>
-          <p:nvPr/>
-        </p:nvSpPr>
-        <p:spPr>
-          <a:xfrm>
-            <a:off x="3041060" y="7964711"/>
-            <a:ext cx="230531" cy="723901"/>
-          </a:xfrm>
-          <a:prstGeom prst="rect">
-            <a:avLst/>
-          </a:prstGeom>
-          <a:ln w="12700">
-            <a:miter lim="400000"/>
-          </a:ln>
-          <a:extLst>
-            <a:ext uri="{C572A759-6A51-4108-AA02-DFA0A04FC94B}">
-              <ma14:wrappingTextBoxFlag xmlns:ma14="http://schemas.microsoft.com/office/mac/drawingml/2011/main" xmlns:a14="http://schemas.microsoft.com/office/drawing/2010/main" xmlns:m="http://schemas.openxmlformats.org/officeDocument/2006/math" xmlns="" val="1"/>
-            </a:ext>
-          </a:extLst>
-        </p:spPr>
-        <p:txBody>
-          <a:bodyPr wrap="none" lIns="50800" tIns="50800" rIns="50800" bIns="50800" anchor="ctr">
-            <a:spAutoFit/>
-          </a:bodyPr>
-          <a:lstStyle>
-            <a:lvl1pPr algn="l" defTabSz="457200">
-              <a:lnSpc>
-                <a:spcPts val="6200"/>
-              </a:lnSpc>
-              <a:defRPr sz="3200">
-                <a:solidFill>
-                  <a:srgbClr val="222222"/>
-                </a:solidFill>
-                <a:latin typeface="STIXGeneral-Regular"/>
-                <a:ea typeface="STIXGeneral-Regular"/>
-                <a:cs typeface="STIXGeneral-Regular"/>
-                <a:sym typeface="STIXGeneral-Regular"/>
-              </a:defRPr>
-            </a:lvl1pPr>
-          </a:lstStyle>
-          <a:p>
-            <a:r>
-              <a:t>⋅</a:t>
-            </a:r>
-          </a:p>
-        </p:txBody>
-      </p:sp>
-      <mc:AlternateContent xmlns:mc="http://schemas.openxmlformats.org/markup-compatibility/2006">
-        <mc:Choice xmlns:a14="http://schemas.microsoft.com/office/drawing/2010/main" Requires="a14">
+      <mc:AlternateContent xmlns:mc="http://schemas.openxmlformats.org/markup-compatibility/2006" xmlns:a14="http://schemas.microsoft.com/office/drawing/2010/main">
+        <mc:Choice Requires="a14">
           <p:sp>
             <p:nvSpPr>
               <p:cNvPr id="571" name="Equation"/>
@@ -22903,7 +22488,7 @@
             </p:txBody>
           </p:sp>
         </mc:Choice>
-        <mc:Fallback>
+        <mc:Fallback xmlns="">
           <p:sp>
             <p:nvSpPr>
               <p:cNvPr id="571" name="Equation"/>
@@ -22964,7 +22549,7 @@
           </a:ln>
           <a:extLst>
             <a:ext uri="{C572A759-6A51-4108-AA02-DFA0A04FC94B}">
-              <ma14:wrappingTextBoxFlag xmlns:ma14="http://schemas.microsoft.com/office/mac/drawingml/2011/main" xmlns:a14="http://schemas.microsoft.com/office/drawing/2010/main" xmlns:m="http://schemas.openxmlformats.org/officeDocument/2006/math" xmlns="" val="1"/>
+              <ma14:wrappingTextBoxFlag xmlns="" xmlns:m="http://schemas.openxmlformats.org/officeDocument/2006/math" xmlns:a14="http://schemas.microsoft.com/office/drawing/2010/main" xmlns:ma14="http://schemas.microsoft.com/office/mac/drawingml/2011/main" val="1"/>
             </a:ext>
           </a:extLst>
         </p:spPr>
@@ -23011,7 +22596,7 @@
           </a:ln>
           <a:extLst>
             <a:ext uri="{C572A759-6A51-4108-AA02-DFA0A04FC94B}">
-              <ma14:wrappingTextBoxFlag xmlns:ma14="http://schemas.microsoft.com/office/mac/drawingml/2011/main" xmlns:a14="http://schemas.microsoft.com/office/drawing/2010/main" xmlns:m="http://schemas.openxmlformats.org/officeDocument/2006/math" xmlns="" val="1"/>
+              <ma14:wrappingTextBoxFlag xmlns="" xmlns:m="http://schemas.openxmlformats.org/officeDocument/2006/math" xmlns:a14="http://schemas.microsoft.com/office/drawing/2010/main" xmlns:ma14="http://schemas.microsoft.com/office/mac/drawingml/2011/main" val="1"/>
             </a:ext>
           </a:extLst>
         </p:spPr>
@@ -23058,7 +22643,7 @@
           </a:ln>
           <a:extLst>
             <a:ext uri="{C572A759-6A51-4108-AA02-DFA0A04FC94B}">
-              <ma14:wrappingTextBoxFlag xmlns:ma14="http://schemas.microsoft.com/office/mac/drawingml/2011/main" xmlns:a14="http://schemas.microsoft.com/office/drawing/2010/main" xmlns:m="http://schemas.openxmlformats.org/officeDocument/2006/math" xmlns="" val="1"/>
+              <ma14:wrappingTextBoxFlag xmlns="" xmlns:m="http://schemas.openxmlformats.org/officeDocument/2006/math" xmlns:a14="http://schemas.microsoft.com/office/drawing/2010/main" xmlns:ma14="http://schemas.microsoft.com/office/mac/drawingml/2011/main" val="1"/>
             </a:ext>
           </a:extLst>
         </p:spPr>
@@ -23083,116 +22668,6 @@
             <a:r>
               <a:t>b</a:t>
             </a:r>
-          </a:p>
-        </p:txBody>
-      </p:sp>
-      <p:sp>
-        <p:nvSpPr>
-          <p:cNvPr id="575" name="dot product"/>
-          <p:cNvSpPr txBox="1"/>
-          <p:nvPr/>
-        </p:nvSpPr>
-        <p:spPr>
-          <a:xfrm>
-            <a:off x="3678732" y="9041520"/>
-            <a:ext cx="1557487" cy="457201"/>
-          </a:xfrm>
-          <a:prstGeom prst="rect">
-            <a:avLst/>
-          </a:prstGeom>
-          <a:ln w="12700">
-            <a:miter lim="400000"/>
-          </a:ln>
-          <a:extLst>
-            <a:ext uri="{C572A759-6A51-4108-AA02-DFA0A04FC94B}">
-              <ma14:wrappingTextBoxFlag xmlns:ma14="http://schemas.microsoft.com/office/mac/drawingml/2011/main" xmlns:a14="http://schemas.microsoft.com/office/drawing/2010/main" xmlns:m="http://schemas.openxmlformats.org/officeDocument/2006/math" xmlns="" val="1"/>
-            </a:ext>
-          </a:extLst>
-        </p:spPr>
-        <p:txBody>
-          <a:bodyPr wrap="none" lIns="50800" tIns="50800" rIns="50800" bIns="50800" anchor="ctr">
-            <a:spAutoFit/>
-          </a:bodyPr>
-          <a:lstStyle>
-            <a:lvl1pPr>
-              <a:defRPr>
-                <a:solidFill>
-                  <a:schemeClr val="accent5">
-                    <a:hueOff val="-82419"/>
-                    <a:satOff val="-9513"/>
-                    <a:lumOff val="-16343"/>
-                  </a:schemeClr>
-                </a:solidFill>
-              </a:defRPr>
-            </a:lvl1pPr>
-          </a:lstStyle>
-          <a:p>
-            <a:r>
-              <a:t>dot product</a:t>
-            </a:r>
-          </a:p>
-        </p:txBody>
-      </p:sp>
-      <p:sp>
-        <p:nvSpPr>
-          <p:cNvPr id="592" name="Connection Line"/>
-          <p:cNvSpPr/>
-          <p:nvPr/>
-        </p:nvSpPr>
-        <p:spPr>
-          <a:xfrm>
-            <a:off x="3184482" y="8911180"/>
-            <a:ext cx="474663" cy="405451"/>
-          </a:xfrm>
-          <a:custGeom>
-            <a:avLst/>
-            <a:gdLst/>
-            <a:ahLst/>
-            <a:cxnLst>
-              <a:cxn ang="0">
-                <a:pos x="wd2" y="hd2"/>
-              </a:cxn>
-              <a:cxn ang="5400000">
-                <a:pos x="wd2" y="hd2"/>
-              </a:cxn>
-              <a:cxn ang="10800000">
-                <a:pos x="wd2" y="hd2"/>
-              </a:cxn>
-              <a:cxn ang="16200000">
-                <a:pos x="wd2" y="hd2"/>
-              </a:cxn>
-            </a:cxnLst>
-            <a:rect l="0" t="0" r="r" b="b"/>
-            <a:pathLst>
-              <a:path w="21600" h="19667" extrusionOk="0">
-                <a:moveTo>
-                  <a:pt x="21600" y="19162"/>
-                </a:moveTo>
-                <a:cubicBezTo>
-                  <a:pt x="8363" y="21600"/>
-                  <a:pt x="1163" y="15213"/>
-                  <a:pt x="0" y="0"/>
-                </a:cubicBezTo>
-              </a:path>
-            </a:pathLst>
-          </a:custGeom>
-          <a:ln w="25400">
-            <a:solidFill>
-              <a:schemeClr val="accent5">
-                <a:hueOff val="-82419"/>
-                <a:satOff val="-9513"/>
-                <a:lumOff val="-16343"/>
-              </a:schemeClr>
-            </a:solidFill>
-            <a:miter lim="400000"/>
-            <a:tailEnd type="triangle"/>
-          </a:ln>
-        </p:spPr>
-        <p:txBody>
-          <a:bodyPr/>
-          <a:lstStyle/>
-          <a:p>
-            <a:endParaRPr/>
           </a:p>
         </p:txBody>
       </p:sp>
@@ -23305,7 +22780,7 @@
           </a:ln>
           <a:extLst>
             <a:ext uri="{C572A759-6A51-4108-AA02-DFA0A04FC94B}">
-              <ma14:wrappingTextBoxFlag xmlns:ma14="http://schemas.microsoft.com/office/mac/drawingml/2011/main" xmlns:a14="http://schemas.microsoft.com/office/drawing/2010/main" xmlns:m="http://schemas.openxmlformats.org/officeDocument/2006/math" xmlns="" val="1"/>
+              <ma14:wrappingTextBoxFlag xmlns="" xmlns:m="http://schemas.openxmlformats.org/officeDocument/2006/math" xmlns:a14="http://schemas.microsoft.com/office/drawing/2010/main" xmlns:ma14="http://schemas.microsoft.com/office/mac/drawingml/2011/main" val="1"/>
             </a:ext>
           </a:extLst>
         </p:spPr>
@@ -23347,7 +22822,7 @@
           </a:ln>
           <a:extLst>
             <a:ext uri="{C572A759-6A51-4108-AA02-DFA0A04FC94B}">
-              <ma14:wrappingTextBoxFlag xmlns:ma14="http://schemas.microsoft.com/office/mac/drawingml/2011/main" xmlns:a14="http://schemas.microsoft.com/office/drawing/2010/main" xmlns:m="http://schemas.openxmlformats.org/officeDocument/2006/math" xmlns="" val="1"/>
+              <ma14:wrappingTextBoxFlag xmlns="" xmlns:m="http://schemas.openxmlformats.org/officeDocument/2006/math" xmlns:a14="http://schemas.microsoft.com/office/drawing/2010/main" xmlns:ma14="http://schemas.microsoft.com/office/mac/drawingml/2011/main" val="1"/>
             </a:ext>
           </a:extLst>
         </p:spPr>
@@ -23391,7 +22866,7 @@
           </a:ln>
           <a:extLst>
             <a:ext uri="{C572A759-6A51-4108-AA02-DFA0A04FC94B}">
-              <ma14:wrappingTextBoxFlag xmlns:ma14="http://schemas.microsoft.com/office/mac/drawingml/2011/main" xmlns:a14="http://schemas.microsoft.com/office/drawing/2010/main" xmlns:m="http://schemas.openxmlformats.org/officeDocument/2006/math" xmlns="" val="1"/>
+              <ma14:wrappingTextBoxFlag xmlns="" xmlns:m="http://schemas.openxmlformats.org/officeDocument/2006/math" xmlns:a14="http://schemas.microsoft.com/office/drawing/2010/main" xmlns:ma14="http://schemas.microsoft.com/office/mac/drawingml/2011/main" val="1"/>
             </a:ext>
           </a:extLst>
         </p:spPr>
@@ -23435,7 +22910,7 @@
           </a:ln>
           <a:extLst>
             <a:ext uri="{C572A759-6A51-4108-AA02-DFA0A04FC94B}">
-              <ma14:wrappingTextBoxFlag xmlns:ma14="http://schemas.microsoft.com/office/mac/drawingml/2011/main" xmlns:a14="http://schemas.microsoft.com/office/drawing/2010/main" xmlns:m="http://schemas.openxmlformats.org/officeDocument/2006/math" xmlns="" val="1"/>
+              <ma14:wrappingTextBoxFlag xmlns="" xmlns:m="http://schemas.openxmlformats.org/officeDocument/2006/math" xmlns:a14="http://schemas.microsoft.com/office/drawing/2010/main" xmlns:ma14="http://schemas.microsoft.com/office/mac/drawingml/2011/main" val="1"/>
             </a:ext>
           </a:extLst>
         </p:spPr>
@@ -23482,7 +22957,7 @@
           </a:ln>
           <a:extLst>
             <a:ext uri="{C572A759-6A51-4108-AA02-DFA0A04FC94B}">
-              <ma14:wrappingTextBoxFlag xmlns:ma14="http://schemas.microsoft.com/office/mac/drawingml/2011/main" xmlns:a14="http://schemas.microsoft.com/office/drawing/2010/main" xmlns:m="http://schemas.openxmlformats.org/officeDocument/2006/math" xmlns="" val="1"/>
+              <ma14:wrappingTextBoxFlag xmlns="" xmlns:m="http://schemas.openxmlformats.org/officeDocument/2006/math" xmlns:a14="http://schemas.microsoft.com/office/drawing/2010/main" xmlns:ma14="http://schemas.microsoft.com/office/mac/drawingml/2011/main" val="1"/>
             </a:ext>
           </a:extLst>
         </p:spPr>
@@ -23529,7 +23004,7 @@
           </a:ln>
           <a:extLst>
             <a:ext uri="{C572A759-6A51-4108-AA02-DFA0A04FC94B}">
-              <ma14:wrappingTextBoxFlag xmlns:ma14="http://schemas.microsoft.com/office/mac/drawingml/2011/main" xmlns:a14="http://schemas.microsoft.com/office/drawing/2010/main" xmlns:m="http://schemas.openxmlformats.org/officeDocument/2006/math" xmlns="" val="1"/>
+              <ma14:wrappingTextBoxFlag xmlns="" xmlns:m="http://schemas.openxmlformats.org/officeDocument/2006/math" xmlns:a14="http://schemas.microsoft.com/office/drawing/2010/main" xmlns:ma14="http://schemas.microsoft.com/office/mac/drawingml/2011/main" val="1"/>
             </a:ext>
           </a:extLst>
         </p:spPr>
@@ -23576,7 +23051,7 @@
           </a:ln>
           <a:extLst>
             <a:ext uri="{C572A759-6A51-4108-AA02-DFA0A04FC94B}">
-              <ma14:wrappingTextBoxFlag xmlns:ma14="http://schemas.microsoft.com/office/mac/drawingml/2011/main" xmlns:a14="http://schemas.microsoft.com/office/drawing/2010/main" xmlns:m="http://schemas.openxmlformats.org/officeDocument/2006/math" xmlns="" val="1"/>
+              <ma14:wrappingTextBoxFlag xmlns="" xmlns:m="http://schemas.openxmlformats.org/officeDocument/2006/math" xmlns:a14="http://schemas.microsoft.com/office/drawing/2010/main" xmlns:ma14="http://schemas.microsoft.com/office/mac/drawingml/2011/main" val="1"/>
             </a:ext>
           </a:extLst>
         </p:spPr>
@@ -23623,7 +23098,7 @@
           </a:ln>
           <a:extLst>
             <a:ext uri="{C572A759-6A51-4108-AA02-DFA0A04FC94B}">
-              <ma14:wrappingTextBoxFlag xmlns:ma14="http://schemas.microsoft.com/office/mac/drawingml/2011/main" xmlns:a14="http://schemas.microsoft.com/office/drawing/2010/main" xmlns:m="http://schemas.openxmlformats.org/officeDocument/2006/math" xmlns="" val="1"/>
+              <ma14:wrappingTextBoxFlag xmlns="" xmlns:m="http://schemas.openxmlformats.org/officeDocument/2006/math" xmlns:a14="http://schemas.microsoft.com/office/drawing/2010/main" xmlns:ma14="http://schemas.microsoft.com/office/mac/drawingml/2011/main" val="1"/>
             </a:ext>
           </a:extLst>
         </p:spPr>
@@ -23670,7 +23145,7 @@
           </a:ln>
           <a:extLst>
             <a:ext uri="{C572A759-6A51-4108-AA02-DFA0A04FC94B}">
-              <ma14:wrappingTextBoxFlag xmlns:ma14="http://schemas.microsoft.com/office/mac/drawingml/2011/main" xmlns:a14="http://schemas.microsoft.com/office/drawing/2010/main" xmlns:m="http://schemas.openxmlformats.org/officeDocument/2006/math" xmlns="" val="1"/>
+              <ma14:wrappingTextBoxFlag xmlns="" xmlns:m="http://schemas.openxmlformats.org/officeDocument/2006/math" xmlns:a14="http://schemas.microsoft.com/office/drawing/2010/main" xmlns:ma14="http://schemas.microsoft.com/office/mac/drawingml/2011/main" val="1"/>
             </a:ext>
           </a:extLst>
         </p:spPr>
@@ -23717,7 +23192,7 @@
           </a:ln>
           <a:extLst>
             <a:ext uri="{C572A759-6A51-4108-AA02-DFA0A04FC94B}">
-              <ma14:wrappingTextBoxFlag xmlns:ma14="http://schemas.microsoft.com/office/mac/drawingml/2011/main" xmlns:a14="http://schemas.microsoft.com/office/drawing/2010/main" xmlns:m="http://schemas.openxmlformats.org/officeDocument/2006/math" xmlns="" val="1"/>
+              <ma14:wrappingTextBoxFlag xmlns="" xmlns:m="http://schemas.openxmlformats.org/officeDocument/2006/math" xmlns:a14="http://schemas.microsoft.com/office/drawing/2010/main" xmlns:ma14="http://schemas.microsoft.com/office/mac/drawingml/2011/main" val="1"/>
             </a:ext>
           </a:extLst>
         </p:spPr>
@@ -23848,7 +23323,7 @@
           </a:ln>
           <a:extLst>
             <a:ext uri="{C572A759-6A51-4108-AA02-DFA0A04FC94B}">
-              <ma14:wrappingTextBoxFlag xmlns:ma14="http://schemas.microsoft.com/office/mac/drawingml/2011/main" xmlns:a14="http://schemas.microsoft.com/office/drawing/2010/main" xmlns:m="http://schemas.openxmlformats.org/officeDocument/2006/math" xmlns="" val="1"/>
+              <ma14:wrappingTextBoxFlag xmlns="" xmlns:m="http://schemas.openxmlformats.org/officeDocument/2006/math" xmlns:a14="http://schemas.microsoft.com/office/drawing/2010/main" xmlns:ma14="http://schemas.microsoft.com/office/mac/drawingml/2011/main" val="1"/>
             </a:ext>
           </a:extLst>
         </p:spPr>
@@ -23965,7 +23440,7 @@
           </a:ln>
           <a:extLst>
             <a:ext uri="{C572A759-6A51-4108-AA02-DFA0A04FC94B}">
-              <ma14:wrappingTextBoxFlag xmlns:ma14="http://schemas.microsoft.com/office/mac/drawingml/2011/main" xmlns:a14="http://schemas.microsoft.com/office/drawing/2010/main" xmlns:m="http://schemas.openxmlformats.org/officeDocument/2006/math" xmlns="" val="1"/>
+              <ma14:wrappingTextBoxFlag xmlns="" xmlns:m="http://schemas.openxmlformats.org/officeDocument/2006/math" xmlns:a14="http://schemas.microsoft.com/office/drawing/2010/main" xmlns:ma14="http://schemas.microsoft.com/office/mac/drawingml/2011/main" val="1"/>
             </a:ext>
           </a:extLst>
         </p:spPr>
@@ -24728,8 +24203,8 @@
           </a:graphicData>
         </a:graphic>
       </p:graphicFrame>
-      <mc:AlternateContent xmlns:mc="http://schemas.openxmlformats.org/markup-compatibility/2006">
-        <mc:Choice xmlns:a14="http://schemas.microsoft.com/office/drawing/2010/main" Requires="a14">
+      <mc:AlternateContent xmlns:mc="http://schemas.openxmlformats.org/markup-compatibility/2006" xmlns:a14="http://schemas.microsoft.com/office/drawing/2010/main">
+        <mc:Choice Requires="a14">
           <p:sp>
             <p:nvSpPr>
               <p:cNvPr id="600" name="Equation"/>
@@ -24948,7 +24423,7 @@
             </p:txBody>
           </p:sp>
         </mc:Choice>
-        <mc:Fallback>
+        <mc:Fallback xmlns="">
           <p:sp>
             <p:nvSpPr>
               <p:cNvPr id="600" name="Equation"/>
@@ -24990,8 +24465,8 @@
           </p:sp>
         </mc:Fallback>
       </mc:AlternateContent>
-      <mc:AlternateContent xmlns:mc="http://schemas.openxmlformats.org/markup-compatibility/2006">
-        <mc:Choice xmlns:a14="http://schemas.microsoft.com/office/drawing/2010/main" Requires="a14">
+      <mc:AlternateContent xmlns:mc="http://schemas.openxmlformats.org/markup-compatibility/2006" xmlns:a14="http://schemas.microsoft.com/office/drawing/2010/main">
+        <mc:Choice Requires="a14">
           <p:sp>
             <p:nvSpPr>
               <p:cNvPr id="601" name="Equation"/>
@@ -25105,7 +24580,7 @@
             </p:txBody>
           </p:sp>
         </mc:Choice>
-        <mc:Fallback>
+        <mc:Fallback xmlns="">
           <p:sp>
             <p:nvSpPr>
               <p:cNvPr id="601" name="Equation"/>
@@ -25256,7 +24731,7 @@
           </a:ln>
           <a:extLst>
             <a:ext uri="{C572A759-6A51-4108-AA02-DFA0A04FC94B}">
-              <ma14:wrappingTextBoxFlag xmlns:ma14="http://schemas.microsoft.com/office/mac/drawingml/2011/main" xmlns:a14="http://schemas.microsoft.com/office/drawing/2010/main" xmlns:m="http://schemas.openxmlformats.org/officeDocument/2006/math" xmlns="" val="1"/>
+              <ma14:wrappingTextBoxFlag xmlns="" xmlns:m="http://schemas.openxmlformats.org/officeDocument/2006/math" xmlns:a14="http://schemas.microsoft.com/office/drawing/2010/main" xmlns:ma14="http://schemas.microsoft.com/office/mac/drawingml/2011/main" val="1"/>
             </a:ext>
           </a:extLst>
         </p:spPr>
@@ -25332,8 +24807,8 @@
         </p:nvSpPr>
         <p:spPr>
           <a:xfrm>
-            <a:off x="7533245" y="7723261"/>
-            <a:ext cx="3772496" cy="1130301"/>
+            <a:off x="7533245" y="7498452"/>
+            <a:ext cx="4342535" cy="1579920"/>
           </a:xfrm>
           <a:prstGeom prst="rect">
             <a:avLst/>
@@ -25343,7 +24818,7 @@
           </a:ln>
           <a:extLst>
             <a:ext uri="{C572A759-6A51-4108-AA02-DFA0A04FC94B}">
-              <ma14:wrappingTextBoxFlag xmlns:ma14="http://schemas.microsoft.com/office/mac/drawingml/2011/main" xmlns:a14="http://schemas.microsoft.com/office/drawing/2010/main" xmlns:m="http://schemas.openxmlformats.org/officeDocument/2006/math" xmlns="" val="1"/>
+              <ma14:wrappingTextBoxFlag xmlns="" xmlns:m="http://schemas.openxmlformats.org/officeDocument/2006/math" xmlns:a14="http://schemas.microsoft.com/office/drawing/2010/main" xmlns:ma14="http://schemas.microsoft.com/office/mac/drawingml/2011/main" val="1"/>
             </a:ext>
           </a:extLst>
         </p:spPr>
@@ -25362,7 +24837,16 @@
               </a:defRPr>
             </a:pPr>
             <a:r>
-              <a:t>import numpy as np</a:t>
+              <a:rPr dirty="0"/>
+              <a:t>import </a:t>
+            </a:r>
+            <a:r>
+              <a:rPr dirty="0" err="1"/>
+              <a:t>numpy</a:t>
+            </a:r>
+            <a:r>
+              <a:rPr dirty="0"/>
+              <a:t> as np</a:t>
             </a:r>
           </a:p>
           <a:p>
@@ -25375,10 +24859,15 @@
               </a:defRPr>
             </a:pPr>
             <a:r>
-              <a:t>X = df.</a:t>
+              <a:rPr dirty="0"/>
+              <a:t>X = </a:t>
             </a:r>
             <a:r>
-              <a:rPr>
+              <a:rPr dirty="0" err="1"/>
+              <a:t>df.</a:t>
+            </a:r>
+            <a:r>
+              <a:rPr dirty="0" err="1">
                 <a:solidFill>
                   <a:schemeClr val="accent5">
                     <a:hueOff val="-82419"/>
@@ -25389,6 +24878,15 @@
               </a:rPr>
               <a:t>values</a:t>
             </a:r>
+            <a:endParaRPr dirty="0">
+              <a:solidFill>
+                <a:schemeClr val="accent5">
+                  <a:hueOff val="-82419"/>
+                  <a:satOff val="-9513"/>
+                  <a:lumOff val="-16343"/>
+                </a:schemeClr>
+              </a:solidFill>
+            </a:endParaRPr>
           </a:p>
           <a:p>
             <a:pPr algn="l">
@@ -25400,10 +24898,15 @@
               </a:defRPr>
             </a:pPr>
             <a:r>
-              <a:t>y = np.</a:t>
+              <a:rPr dirty="0"/>
+              <a:t>y = </a:t>
             </a:r>
             <a:r>
-              <a:rPr>
+              <a:rPr dirty="0" err="1"/>
+              <a:t>np.</a:t>
+            </a:r>
+            <a:r>
+              <a:rPr lang="en-US" dirty="0" err="1">
                 <a:solidFill>
                   <a:schemeClr val="accent5">
                     <a:hueOff val="-82419"/>
@@ -25412,16 +24915,33 @@
                   </a:schemeClr>
                 </a:solidFill>
               </a:rPr>
-              <a:t>dot</a:t>
+              <a:t>matmul</a:t>
             </a:r>
             <a:r>
+              <a:rPr dirty="0"/>
               <a:t>(X, c) + b</a:t>
             </a:r>
+            <a:endParaRPr lang="en-US" dirty="0"/>
+          </a:p>
+          <a:p>
+            <a:pPr algn="l">
+              <a:defRPr>
+                <a:latin typeface="Courier New"/>
+                <a:ea typeface="Courier New"/>
+                <a:cs typeface="Courier New"/>
+                <a:sym typeface="Courier New"/>
+              </a:defRPr>
+            </a:pPr>
+            <a:r>
+              <a:rPr lang="en-US" dirty="0"/>
+              <a:t>		or X @ c</a:t>
+            </a:r>
+            <a:endParaRPr dirty="0"/>
           </a:p>
         </p:txBody>
       </p:sp>
-      <mc:AlternateContent xmlns:mc="http://schemas.openxmlformats.org/markup-compatibility/2006">
-        <mc:Choice xmlns:a14="http://schemas.microsoft.com/office/drawing/2010/main" Requires="a14">
+      <mc:AlternateContent xmlns:mc="http://schemas.openxmlformats.org/markup-compatibility/2006" xmlns:a14="http://schemas.microsoft.com/office/drawing/2010/main">
+        <mc:Choice Requires="a14">
           <p:sp>
             <p:nvSpPr>
               <p:cNvPr id="607" name="Equation"/>
@@ -25524,7 +25044,7 @@
             </p:txBody>
           </p:sp>
         </mc:Choice>
-        <mc:Fallback>
+        <mc:Fallback xmlns="">
           <p:sp>
             <p:nvSpPr>
               <p:cNvPr id="607" name="Equation"/>
@@ -25566,8 +25086,8 @@
           </p:sp>
         </mc:Fallback>
       </mc:AlternateContent>
-      <mc:AlternateContent xmlns:mc="http://schemas.openxmlformats.org/markup-compatibility/2006">
-        <mc:Choice xmlns:a14="http://schemas.microsoft.com/office/drawing/2010/main" Requires="a14">
+      <mc:AlternateContent xmlns:mc="http://schemas.openxmlformats.org/markup-compatibility/2006" xmlns:a14="http://schemas.microsoft.com/office/drawing/2010/main">
+        <mc:Choice Requires="a14">
           <p:sp>
             <p:nvSpPr>
               <p:cNvPr id="608" name="Equation"/>
@@ -25786,7 +25306,7 @@
             </p:txBody>
           </p:sp>
         </mc:Choice>
-        <mc:Fallback>
+        <mc:Fallback xmlns="">
           <p:sp>
             <p:nvSpPr>
               <p:cNvPr id="608" name="Equation"/>
@@ -25830,56 +25350,6 @@
       </mc:AlternateContent>
       <p:sp>
         <p:nvSpPr>
-          <p:cNvPr id="609" name="⋅"/>
-          <p:cNvSpPr txBox="1"/>
-          <p:nvPr/>
-        </p:nvSpPr>
-        <p:spPr>
-          <a:xfrm>
-            <a:off x="3041060" y="7964711"/>
-            <a:ext cx="230531" cy="723901"/>
-          </a:xfrm>
-          <a:prstGeom prst="rect">
-            <a:avLst/>
-          </a:prstGeom>
-          <a:ln w="12700">
-            <a:miter lim="400000"/>
-          </a:ln>
-          <a:extLst>
-            <a:ext uri="{C572A759-6A51-4108-AA02-DFA0A04FC94B}">
-              <ma14:wrappingTextBoxFlag xmlns:ma14="http://schemas.microsoft.com/office/mac/drawingml/2011/main" xmlns:a14="http://schemas.microsoft.com/office/drawing/2010/main" xmlns:m="http://schemas.openxmlformats.org/officeDocument/2006/math" xmlns="" val="1"/>
-            </a:ext>
-          </a:extLst>
-        </p:spPr>
-        <p:txBody>
-          <a:bodyPr wrap="none" lIns="50800" tIns="50800" rIns="50800" bIns="50800" anchor="ctr">
-            <a:spAutoFit/>
-          </a:bodyPr>
-          <a:lstStyle>
-            <a:lvl1pPr algn="l" defTabSz="457200">
-              <a:lnSpc>
-                <a:spcPts val="6200"/>
-              </a:lnSpc>
-              <a:defRPr sz="3200">
-                <a:solidFill>
-                  <a:srgbClr val="222222"/>
-                </a:solidFill>
-                <a:latin typeface="STIXGeneral-Regular"/>
-                <a:ea typeface="STIXGeneral-Regular"/>
-                <a:cs typeface="STIXGeneral-Regular"/>
-                <a:sym typeface="STIXGeneral-Regular"/>
-              </a:defRPr>
-            </a:lvl1pPr>
-          </a:lstStyle>
-          <a:p>
-            <a:r>
-              <a:t>⋅</a:t>
-            </a:r>
-          </a:p>
-        </p:txBody>
-      </p:sp>
-      <p:sp>
-        <p:nvSpPr>
           <p:cNvPr id="610" name="X"/>
           <p:cNvSpPr txBox="1"/>
           <p:nvPr/>
@@ -25897,7 +25367,7 @@
           </a:ln>
           <a:extLst>
             <a:ext uri="{C572A759-6A51-4108-AA02-DFA0A04FC94B}">
-              <ma14:wrappingTextBoxFlag xmlns:ma14="http://schemas.microsoft.com/office/mac/drawingml/2011/main" xmlns:a14="http://schemas.microsoft.com/office/drawing/2010/main" xmlns:m="http://schemas.openxmlformats.org/officeDocument/2006/math" xmlns="" val="1"/>
+              <ma14:wrappingTextBoxFlag xmlns="" xmlns:m="http://schemas.openxmlformats.org/officeDocument/2006/math" xmlns:a14="http://schemas.microsoft.com/office/drawing/2010/main" xmlns:ma14="http://schemas.microsoft.com/office/mac/drawingml/2011/main" val="1"/>
             </a:ext>
           </a:extLst>
         </p:spPr>
@@ -25944,7 +25414,7 @@
           </a:ln>
           <a:extLst>
             <a:ext uri="{C572A759-6A51-4108-AA02-DFA0A04FC94B}">
-              <ma14:wrappingTextBoxFlag xmlns:ma14="http://schemas.microsoft.com/office/mac/drawingml/2011/main" xmlns:a14="http://schemas.microsoft.com/office/drawing/2010/main" xmlns:m="http://schemas.openxmlformats.org/officeDocument/2006/math" xmlns="" val="1"/>
+              <ma14:wrappingTextBoxFlag xmlns="" xmlns:m="http://schemas.openxmlformats.org/officeDocument/2006/math" xmlns:a14="http://schemas.microsoft.com/office/drawing/2010/main" xmlns:ma14="http://schemas.microsoft.com/office/mac/drawingml/2011/main" val="1"/>
             </a:ext>
           </a:extLst>
         </p:spPr>
@@ -25991,7 +25461,7 @@
           </a:ln>
           <a:extLst>
             <a:ext uri="{C572A759-6A51-4108-AA02-DFA0A04FC94B}">
-              <ma14:wrappingTextBoxFlag xmlns:ma14="http://schemas.microsoft.com/office/mac/drawingml/2011/main" xmlns:a14="http://schemas.microsoft.com/office/drawing/2010/main" xmlns:m="http://schemas.openxmlformats.org/officeDocument/2006/math" xmlns="" val="1"/>
+              <ma14:wrappingTextBoxFlag xmlns="" xmlns:m="http://schemas.openxmlformats.org/officeDocument/2006/math" xmlns:a14="http://schemas.microsoft.com/office/drawing/2010/main" xmlns:ma14="http://schemas.microsoft.com/office/mac/drawingml/2011/main" val="1"/>
             </a:ext>
           </a:extLst>
         </p:spPr>
@@ -26016,116 +25486,6 @@
             <a:r>
               <a:t>b</a:t>
             </a:r>
-          </a:p>
-        </p:txBody>
-      </p:sp>
-      <p:sp>
-        <p:nvSpPr>
-          <p:cNvPr id="613" name="dot product"/>
-          <p:cNvSpPr txBox="1"/>
-          <p:nvPr/>
-        </p:nvSpPr>
-        <p:spPr>
-          <a:xfrm>
-            <a:off x="3678732" y="9041520"/>
-            <a:ext cx="1557487" cy="457201"/>
-          </a:xfrm>
-          <a:prstGeom prst="rect">
-            <a:avLst/>
-          </a:prstGeom>
-          <a:ln w="12700">
-            <a:miter lim="400000"/>
-          </a:ln>
-          <a:extLst>
-            <a:ext uri="{C572A759-6A51-4108-AA02-DFA0A04FC94B}">
-              <ma14:wrappingTextBoxFlag xmlns:ma14="http://schemas.microsoft.com/office/mac/drawingml/2011/main" xmlns:a14="http://schemas.microsoft.com/office/drawing/2010/main" xmlns:m="http://schemas.openxmlformats.org/officeDocument/2006/math" xmlns="" val="1"/>
-            </a:ext>
-          </a:extLst>
-        </p:spPr>
-        <p:txBody>
-          <a:bodyPr wrap="none" lIns="50800" tIns="50800" rIns="50800" bIns="50800" anchor="ctr">
-            <a:spAutoFit/>
-          </a:bodyPr>
-          <a:lstStyle>
-            <a:lvl1pPr>
-              <a:defRPr>
-                <a:solidFill>
-                  <a:schemeClr val="accent5">
-                    <a:hueOff val="-82419"/>
-                    <a:satOff val="-9513"/>
-                    <a:lumOff val="-16343"/>
-                  </a:schemeClr>
-                </a:solidFill>
-              </a:defRPr>
-            </a:lvl1pPr>
-          </a:lstStyle>
-          <a:p>
-            <a:r>
-              <a:t>dot product</a:t>
-            </a:r>
-          </a:p>
-        </p:txBody>
-      </p:sp>
-      <p:sp>
-        <p:nvSpPr>
-          <p:cNvPr id="620" name="Connection Line"/>
-          <p:cNvSpPr/>
-          <p:nvPr/>
-        </p:nvSpPr>
-        <p:spPr>
-          <a:xfrm>
-            <a:off x="3184482" y="8911180"/>
-            <a:ext cx="474663" cy="405451"/>
-          </a:xfrm>
-          <a:custGeom>
-            <a:avLst/>
-            <a:gdLst/>
-            <a:ahLst/>
-            <a:cxnLst>
-              <a:cxn ang="0">
-                <a:pos x="wd2" y="hd2"/>
-              </a:cxn>
-              <a:cxn ang="5400000">
-                <a:pos x="wd2" y="hd2"/>
-              </a:cxn>
-              <a:cxn ang="10800000">
-                <a:pos x="wd2" y="hd2"/>
-              </a:cxn>
-              <a:cxn ang="16200000">
-                <a:pos x="wd2" y="hd2"/>
-              </a:cxn>
-            </a:cxnLst>
-            <a:rect l="0" t="0" r="r" b="b"/>
-            <a:pathLst>
-              <a:path w="21600" h="19667" extrusionOk="0">
-                <a:moveTo>
-                  <a:pt x="21600" y="19162"/>
-                </a:moveTo>
-                <a:cubicBezTo>
-                  <a:pt x="8363" y="21600"/>
-                  <a:pt x="1163" y="15213"/>
-                  <a:pt x="0" y="0"/>
-                </a:cubicBezTo>
-              </a:path>
-            </a:pathLst>
-          </a:custGeom>
-          <a:ln w="25400">
-            <a:solidFill>
-              <a:schemeClr val="accent5">
-                <a:hueOff val="-82419"/>
-                <a:satOff val="-9513"/>
-                <a:lumOff val="-16343"/>
-              </a:schemeClr>
-            </a:solidFill>
-            <a:miter lim="400000"/>
-            <a:tailEnd type="triangle"/>
-          </a:ln>
-        </p:spPr>
-        <p:txBody>
-          <a:bodyPr/>
-          <a:lstStyle/>
-          <a:p>
-            <a:endParaRPr/>
           </a:p>
         </p:txBody>
       </p:sp>
@@ -26238,7 +25598,7 @@
           </a:ln>
           <a:extLst>
             <a:ext uri="{C572A759-6A51-4108-AA02-DFA0A04FC94B}">
-              <ma14:wrappingTextBoxFlag xmlns:ma14="http://schemas.microsoft.com/office/mac/drawingml/2011/main" xmlns:a14="http://schemas.microsoft.com/office/drawing/2010/main" xmlns:m="http://schemas.openxmlformats.org/officeDocument/2006/math" xmlns="" val="1"/>
+              <ma14:wrappingTextBoxFlag xmlns="" xmlns:m="http://schemas.openxmlformats.org/officeDocument/2006/math" xmlns:a14="http://schemas.microsoft.com/office/drawing/2010/main" xmlns:ma14="http://schemas.microsoft.com/office/mac/drawingml/2011/main" val="1"/>
             </a:ext>
           </a:extLst>
         </p:spPr>
@@ -26280,7 +25640,7 @@
           </a:ln>
           <a:extLst>
             <a:ext uri="{C572A759-6A51-4108-AA02-DFA0A04FC94B}">
-              <ma14:wrappingTextBoxFlag xmlns:ma14="http://schemas.microsoft.com/office/mac/drawingml/2011/main" xmlns:a14="http://schemas.microsoft.com/office/drawing/2010/main" xmlns:m="http://schemas.openxmlformats.org/officeDocument/2006/math" xmlns="" val="1"/>
+              <ma14:wrappingTextBoxFlag xmlns="" xmlns:m="http://schemas.openxmlformats.org/officeDocument/2006/math" xmlns:a14="http://schemas.microsoft.com/office/drawing/2010/main" xmlns:ma14="http://schemas.microsoft.com/office/mac/drawingml/2011/main" val="1"/>
             </a:ext>
           </a:extLst>
         </p:spPr>
@@ -26348,8 +25708,8 @@
           </a:p>
         </p:txBody>
       </p:sp>
-      <mc:AlternateContent xmlns:mc="http://schemas.openxmlformats.org/markup-compatibility/2006">
-        <mc:Choice xmlns:a14="http://schemas.microsoft.com/office/drawing/2010/main" Requires="a14">
+      <mc:AlternateContent xmlns:mc="http://schemas.openxmlformats.org/markup-compatibility/2006" xmlns:a14="http://schemas.microsoft.com/office/drawing/2010/main">
+        <mc:Choice Requires="a14">
           <p:sp>
             <p:nvSpPr>
               <p:cNvPr id="619" name="Equation"/>
@@ -26400,7 +25760,7 @@
             </p:txBody>
           </p:sp>
         </mc:Choice>
-        <mc:Fallback>
+        <mc:Fallback xmlns="">
           <p:sp>
             <p:nvSpPr>
               <p:cNvPr id="619" name="Equation"/>
@@ -26506,8 +25866,8 @@
           </a:p>
         </p:txBody>
       </p:sp>
-      <mc:AlternateContent xmlns:mc="http://schemas.openxmlformats.org/markup-compatibility/2006">
-        <mc:Choice xmlns:a14="http://schemas.microsoft.com/office/drawing/2010/main" Requires="a14">
+      <mc:AlternateContent xmlns:mc="http://schemas.openxmlformats.org/markup-compatibility/2006" xmlns:a14="http://schemas.microsoft.com/office/drawing/2010/main">
+        <mc:Choice Requires="a14">
           <p:sp>
             <p:nvSpPr>
               <p:cNvPr id="623" name="Equation"/>
@@ -26726,7 +26086,7 @@
             </p:txBody>
           </p:sp>
         </mc:Choice>
-        <mc:Fallback>
+        <mc:Fallback xmlns="">
           <p:sp>
             <p:nvSpPr>
               <p:cNvPr id="623" name="Equation"/>
@@ -26768,8 +26128,8 @@
           </p:sp>
         </mc:Fallback>
       </mc:AlternateContent>
-      <mc:AlternateContent xmlns:mc="http://schemas.openxmlformats.org/markup-compatibility/2006">
-        <mc:Choice xmlns:a14="http://schemas.microsoft.com/office/drawing/2010/main" Requires="a14">
+      <mc:AlternateContent xmlns:mc="http://schemas.openxmlformats.org/markup-compatibility/2006" xmlns:a14="http://schemas.microsoft.com/office/drawing/2010/main">
+        <mc:Choice Requires="a14">
           <p:sp>
             <p:nvSpPr>
               <p:cNvPr id="624" name="Equation"/>
@@ -26883,7 +26243,7 @@
             </p:txBody>
           </p:sp>
         </mc:Choice>
-        <mc:Fallback>
+        <mc:Fallback xmlns="">
           <p:sp>
             <p:nvSpPr>
               <p:cNvPr id="624" name="Equation"/>
@@ -27034,7 +26394,7 @@
           </a:ln>
           <a:extLst>
             <a:ext uri="{C572A759-6A51-4108-AA02-DFA0A04FC94B}">
-              <ma14:wrappingTextBoxFlag xmlns:ma14="http://schemas.microsoft.com/office/mac/drawingml/2011/main" xmlns:a14="http://schemas.microsoft.com/office/drawing/2010/main" xmlns:m="http://schemas.openxmlformats.org/officeDocument/2006/math" xmlns="" val="1"/>
+              <ma14:wrappingTextBoxFlag xmlns="" xmlns:m="http://schemas.openxmlformats.org/officeDocument/2006/math" xmlns:a14="http://schemas.microsoft.com/office/drawing/2010/main" xmlns:ma14="http://schemas.microsoft.com/office/mac/drawingml/2011/main" val="1"/>
             </a:ext>
           </a:extLst>
         </p:spPr>
@@ -27110,8 +26470,8 @@
         </p:nvSpPr>
         <p:spPr>
           <a:xfrm>
-            <a:off x="7533245" y="7723261"/>
-            <a:ext cx="3772496" cy="1130301"/>
+            <a:off x="7533245" y="7498452"/>
+            <a:ext cx="4342535" cy="1579920"/>
           </a:xfrm>
           <a:prstGeom prst="rect">
             <a:avLst/>
@@ -27121,7 +26481,7 @@
           </a:ln>
           <a:extLst>
             <a:ext uri="{C572A759-6A51-4108-AA02-DFA0A04FC94B}">
-              <ma14:wrappingTextBoxFlag xmlns:ma14="http://schemas.microsoft.com/office/mac/drawingml/2011/main" xmlns:a14="http://schemas.microsoft.com/office/drawing/2010/main" xmlns:m="http://schemas.openxmlformats.org/officeDocument/2006/math" xmlns="" val="1"/>
+              <ma14:wrappingTextBoxFlag xmlns="" xmlns:m="http://schemas.openxmlformats.org/officeDocument/2006/math" xmlns:a14="http://schemas.microsoft.com/office/drawing/2010/main" xmlns:ma14="http://schemas.microsoft.com/office/mac/drawingml/2011/main" val="1"/>
             </a:ext>
           </a:extLst>
         </p:spPr>
@@ -27140,7 +26500,16 @@
               </a:defRPr>
             </a:pPr>
             <a:r>
-              <a:t>import numpy as np</a:t>
+              <a:rPr dirty="0"/>
+              <a:t>import </a:t>
+            </a:r>
+            <a:r>
+              <a:rPr dirty="0" err="1"/>
+              <a:t>numpy</a:t>
+            </a:r>
+            <a:r>
+              <a:rPr dirty="0"/>
+              <a:t> as np</a:t>
             </a:r>
           </a:p>
           <a:p>
@@ -27153,10 +26522,15 @@
               </a:defRPr>
             </a:pPr>
             <a:r>
-              <a:t>X = df.</a:t>
+              <a:rPr dirty="0"/>
+              <a:t>X = </a:t>
             </a:r>
             <a:r>
-              <a:rPr>
+              <a:rPr dirty="0" err="1"/>
+              <a:t>df.</a:t>
+            </a:r>
+            <a:r>
+              <a:rPr dirty="0" err="1">
                 <a:solidFill>
                   <a:schemeClr val="accent5">
                     <a:hueOff val="-82419"/>
@@ -27167,6 +26541,15 @@
               </a:rPr>
               <a:t>values</a:t>
             </a:r>
+            <a:endParaRPr dirty="0">
+              <a:solidFill>
+                <a:schemeClr val="accent5">
+                  <a:hueOff val="-82419"/>
+                  <a:satOff val="-9513"/>
+                  <a:lumOff val="-16343"/>
+                </a:schemeClr>
+              </a:solidFill>
+            </a:endParaRPr>
           </a:p>
           <a:p>
             <a:pPr algn="l">
@@ -27178,10 +26561,15 @@
               </a:defRPr>
             </a:pPr>
             <a:r>
-              <a:t>y = np.</a:t>
+              <a:rPr dirty="0"/>
+              <a:t>y = </a:t>
             </a:r>
             <a:r>
-              <a:rPr>
+              <a:rPr dirty="0" err="1"/>
+              <a:t>np.</a:t>
+            </a:r>
+            <a:r>
+              <a:rPr lang="en-US" dirty="0" err="1">
                 <a:solidFill>
                   <a:schemeClr val="accent5">
                     <a:hueOff val="-82419"/>
@@ -27190,11 +26578,28 @@
                   </a:schemeClr>
                 </a:solidFill>
               </a:rPr>
-              <a:t>dot</a:t>
+              <a:t>matmul</a:t>
             </a:r>
             <a:r>
+              <a:rPr dirty="0"/>
               <a:t>(X, c) + b</a:t>
             </a:r>
+            <a:endParaRPr lang="en-US" dirty="0"/>
+          </a:p>
+          <a:p>
+            <a:pPr algn="l">
+              <a:defRPr>
+                <a:latin typeface="Courier New"/>
+                <a:ea typeface="Courier New"/>
+                <a:cs typeface="Courier New"/>
+                <a:sym typeface="Courier New"/>
+              </a:defRPr>
+            </a:pPr>
+            <a:r>
+              <a:rPr lang="en-US" dirty="0"/>
+              <a:t>		or X @ c</a:t>
+            </a:r>
+            <a:endParaRPr dirty="0"/>
           </a:p>
         </p:txBody>
       </p:sp>
@@ -27217,7 +26622,7 @@
           </a:ln>
           <a:extLst>
             <a:ext uri="{C572A759-6A51-4108-AA02-DFA0A04FC94B}">
-              <ma14:wrappingTextBoxFlag xmlns:ma14="http://schemas.microsoft.com/office/mac/drawingml/2011/main" xmlns:a14="http://schemas.microsoft.com/office/drawing/2010/main" xmlns:m="http://schemas.openxmlformats.org/officeDocument/2006/math" xmlns="" val="1"/>
+              <ma14:wrappingTextBoxFlag xmlns="" xmlns:m="http://schemas.openxmlformats.org/officeDocument/2006/math" xmlns:a14="http://schemas.microsoft.com/office/drawing/2010/main" xmlns:ma14="http://schemas.microsoft.com/office/mac/drawingml/2011/main" val="1"/>
             </a:ext>
           </a:extLst>
         </p:spPr>
@@ -27284,7 +26689,7 @@
           </a:ln>
           <a:extLst>
             <a:ext uri="{C572A759-6A51-4108-AA02-DFA0A04FC94B}">
-              <ma14:wrappingTextBoxFlag xmlns:ma14="http://schemas.microsoft.com/office/mac/drawingml/2011/main" xmlns:a14="http://schemas.microsoft.com/office/drawing/2010/main" xmlns:m="http://schemas.openxmlformats.org/officeDocument/2006/math" xmlns="" val="1"/>
+              <ma14:wrappingTextBoxFlag xmlns="" xmlns:m="http://schemas.openxmlformats.org/officeDocument/2006/math" xmlns:a14="http://schemas.microsoft.com/office/drawing/2010/main" xmlns:ma14="http://schemas.microsoft.com/office/mac/drawingml/2011/main" val="1"/>
             </a:ext>
           </a:extLst>
         </p:spPr>
@@ -27331,7 +26736,7 @@
           </a:ln>
           <a:extLst>
             <a:ext uri="{C572A759-6A51-4108-AA02-DFA0A04FC94B}">
-              <ma14:wrappingTextBoxFlag xmlns:ma14="http://schemas.microsoft.com/office/mac/drawingml/2011/main" xmlns:a14="http://schemas.microsoft.com/office/drawing/2010/main" xmlns:m="http://schemas.openxmlformats.org/officeDocument/2006/math" xmlns="" val="1"/>
+              <ma14:wrappingTextBoxFlag xmlns="" xmlns:m="http://schemas.openxmlformats.org/officeDocument/2006/math" xmlns:a14="http://schemas.microsoft.com/office/drawing/2010/main" xmlns:ma14="http://schemas.microsoft.com/office/mac/drawingml/2011/main" val="1"/>
             </a:ext>
           </a:extLst>
         </p:spPr>
@@ -27359,8 +26764,8 @@
           </a:p>
         </p:txBody>
       </p:sp>
-      <mc:AlternateContent xmlns:mc="http://schemas.openxmlformats.org/markup-compatibility/2006">
-        <mc:Choice xmlns:a14="http://schemas.microsoft.com/office/drawing/2010/main" Requires="a14">
+      <mc:AlternateContent xmlns:mc="http://schemas.openxmlformats.org/markup-compatibility/2006" xmlns:a14="http://schemas.microsoft.com/office/drawing/2010/main">
+        <mc:Choice Requires="a14">
           <p:sp>
             <p:nvSpPr>
               <p:cNvPr id="633" name="Equation"/>
@@ -27463,7 +26868,7 @@
             </p:txBody>
           </p:sp>
         </mc:Choice>
-        <mc:Fallback>
+        <mc:Fallback xmlns="">
           <p:sp>
             <p:nvSpPr>
               <p:cNvPr id="633" name="Equation"/>
@@ -27505,8 +26910,8 @@
           </p:sp>
         </mc:Fallback>
       </mc:AlternateContent>
-      <mc:AlternateContent xmlns:mc="http://schemas.openxmlformats.org/markup-compatibility/2006">
-        <mc:Choice xmlns:a14="http://schemas.microsoft.com/office/drawing/2010/main" Requires="a14">
+      <mc:AlternateContent xmlns:mc="http://schemas.openxmlformats.org/markup-compatibility/2006" xmlns:a14="http://schemas.microsoft.com/office/drawing/2010/main">
+        <mc:Choice Requires="a14">
           <p:sp>
             <p:nvSpPr>
               <p:cNvPr id="634" name="Equation"/>
@@ -27725,7 +27130,7 @@
             </p:txBody>
           </p:sp>
         </mc:Choice>
-        <mc:Fallback>
+        <mc:Fallback xmlns="">
           <p:sp>
             <p:nvSpPr>
               <p:cNvPr id="634" name="Equation"/>
@@ -27769,56 +27174,6 @@
       </mc:AlternateContent>
       <p:sp>
         <p:nvSpPr>
-          <p:cNvPr id="635" name="⋅"/>
-          <p:cNvSpPr txBox="1"/>
-          <p:nvPr/>
-        </p:nvSpPr>
-        <p:spPr>
-          <a:xfrm>
-            <a:off x="3041060" y="7964711"/>
-            <a:ext cx="230531" cy="723901"/>
-          </a:xfrm>
-          <a:prstGeom prst="rect">
-            <a:avLst/>
-          </a:prstGeom>
-          <a:ln w="12700">
-            <a:miter lim="400000"/>
-          </a:ln>
-          <a:extLst>
-            <a:ext uri="{C572A759-6A51-4108-AA02-DFA0A04FC94B}">
-              <ma14:wrappingTextBoxFlag xmlns:ma14="http://schemas.microsoft.com/office/mac/drawingml/2011/main" xmlns:a14="http://schemas.microsoft.com/office/drawing/2010/main" xmlns:m="http://schemas.openxmlformats.org/officeDocument/2006/math" xmlns="" val="1"/>
-            </a:ext>
-          </a:extLst>
-        </p:spPr>
-        <p:txBody>
-          <a:bodyPr wrap="none" lIns="50800" tIns="50800" rIns="50800" bIns="50800" anchor="ctr">
-            <a:spAutoFit/>
-          </a:bodyPr>
-          <a:lstStyle>
-            <a:lvl1pPr algn="l" defTabSz="457200">
-              <a:lnSpc>
-                <a:spcPts val="6200"/>
-              </a:lnSpc>
-              <a:defRPr sz="3200">
-                <a:solidFill>
-                  <a:srgbClr val="222222"/>
-                </a:solidFill>
-                <a:latin typeface="STIXGeneral-Regular"/>
-                <a:ea typeface="STIXGeneral-Regular"/>
-                <a:cs typeface="STIXGeneral-Regular"/>
-                <a:sym typeface="STIXGeneral-Regular"/>
-              </a:defRPr>
-            </a:lvl1pPr>
-          </a:lstStyle>
-          <a:p>
-            <a:r>
-              <a:t>⋅</a:t>
-            </a:r>
-          </a:p>
-        </p:txBody>
-      </p:sp>
-      <p:sp>
-        <p:nvSpPr>
           <p:cNvPr id="636" name="X"/>
           <p:cNvSpPr txBox="1"/>
           <p:nvPr/>
@@ -27836,7 +27191,7 @@
           </a:ln>
           <a:extLst>
             <a:ext uri="{C572A759-6A51-4108-AA02-DFA0A04FC94B}">
-              <ma14:wrappingTextBoxFlag xmlns:ma14="http://schemas.microsoft.com/office/mac/drawingml/2011/main" xmlns:a14="http://schemas.microsoft.com/office/drawing/2010/main" xmlns:m="http://schemas.openxmlformats.org/officeDocument/2006/math" xmlns="" val="1"/>
+              <ma14:wrappingTextBoxFlag xmlns="" xmlns:m="http://schemas.openxmlformats.org/officeDocument/2006/math" xmlns:a14="http://schemas.microsoft.com/office/drawing/2010/main" xmlns:ma14="http://schemas.microsoft.com/office/mac/drawingml/2011/main" val="1"/>
             </a:ext>
           </a:extLst>
         </p:spPr>
@@ -27883,7 +27238,7 @@
           </a:ln>
           <a:extLst>
             <a:ext uri="{C572A759-6A51-4108-AA02-DFA0A04FC94B}">
-              <ma14:wrappingTextBoxFlag xmlns:ma14="http://schemas.microsoft.com/office/mac/drawingml/2011/main" xmlns:a14="http://schemas.microsoft.com/office/drawing/2010/main" xmlns:m="http://schemas.openxmlformats.org/officeDocument/2006/math" xmlns="" val="1"/>
+              <ma14:wrappingTextBoxFlag xmlns="" xmlns:m="http://schemas.openxmlformats.org/officeDocument/2006/math" xmlns:a14="http://schemas.microsoft.com/office/drawing/2010/main" xmlns:ma14="http://schemas.microsoft.com/office/mac/drawingml/2011/main" val="1"/>
             </a:ext>
           </a:extLst>
         </p:spPr>
@@ -27930,7 +27285,7 @@
           </a:ln>
           <a:extLst>
             <a:ext uri="{C572A759-6A51-4108-AA02-DFA0A04FC94B}">
-              <ma14:wrappingTextBoxFlag xmlns:ma14="http://schemas.microsoft.com/office/mac/drawingml/2011/main" xmlns:a14="http://schemas.microsoft.com/office/drawing/2010/main" xmlns:m="http://schemas.openxmlformats.org/officeDocument/2006/math" xmlns="" val="1"/>
+              <ma14:wrappingTextBoxFlag xmlns="" xmlns:m="http://schemas.openxmlformats.org/officeDocument/2006/math" xmlns:a14="http://schemas.microsoft.com/office/drawing/2010/main" xmlns:ma14="http://schemas.microsoft.com/office/mac/drawingml/2011/main" val="1"/>
             </a:ext>
           </a:extLst>
         </p:spPr>
@@ -27955,116 +27310,6 @@
             <a:r>
               <a:t>b</a:t>
             </a:r>
-          </a:p>
-        </p:txBody>
-      </p:sp>
-      <p:sp>
-        <p:nvSpPr>
-          <p:cNvPr id="639" name="dot product"/>
-          <p:cNvSpPr txBox="1"/>
-          <p:nvPr/>
-        </p:nvSpPr>
-        <p:spPr>
-          <a:xfrm>
-            <a:off x="3678732" y="9041520"/>
-            <a:ext cx="1557487" cy="457201"/>
-          </a:xfrm>
-          <a:prstGeom prst="rect">
-            <a:avLst/>
-          </a:prstGeom>
-          <a:ln w="12700">
-            <a:miter lim="400000"/>
-          </a:ln>
-          <a:extLst>
-            <a:ext uri="{C572A759-6A51-4108-AA02-DFA0A04FC94B}">
-              <ma14:wrappingTextBoxFlag xmlns:ma14="http://schemas.microsoft.com/office/mac/drawingml/2011/main" xmlns:a14="http://schemas.microsoft.com/office/drawing/2010/main" xmlns:m="http://schemas.openxmlformats.org/officeDocument/2006/math" xmlns="" val="1"/>
-            </a:ext>
-          </a:extLst>
-        </p:spPr>
-        <p:txBody>
-          <a:bodyPr wrap="none" lIns="50800" tIns="50800" rIns="50800" bIns="50800" anchor="ctr">
-            <a:spAutoFit/>
-          </a:bodyPr>
-          <a:lstStyle>
-            <a:lvl1pPr>
-              <a:defRPr>
-                <a:solidFill>
-                  <a:schemeClr val="accent5">
-                    <a:hueOff val="-82419"/>
-                    <a:satOff val="-9513"/>
-                    <a:lumOff val="-16343"/>
-                  </a:schemeClr>
-                </a:solidFill>
-              </a:defRPr>
-            </a:lvl1pPr>
-          </a:lstStyle>
-          <a:p>
-            <a:r>
-              <a:t>dot product</a:t>
-            </a:r>
-          </a:p>
-        </p:txBody>
-      </p:sp>
-      <p:sp>
-        <p:nvSpPr>
-          <p:cNvPr id="645" name="Connection Line"/>
-          <p:cNvSpPr/>
-          <p:nvPr/>
-        </p:nvSpPr>
-        <p:spPr>
-          <a:xfrm>
-            <a:off x="3184482" y="8911180"/>
-            <a:ext cx="474663" cy="405451"/>
-          </a:xfrm>
-          <a:custGeom>
-            <a:avLst/>
-            <a:gdLst/>
-            <a:ahLst/>
-            <a:cxnLst>
-              <a:cxn ang="0">
-                <a:pos x="wd2" y="hd2"/>
-              </a:cxn>
-              <a:cxn ang="5400000">
-                <a:pos x="wd2" y="hd2"/>
-              </a:cxn>
-              <a:cxn ang="10800000">
-                <a:pos x="wd2" y="hd2"/>
-              </a:cxn>
-              <a:cxn ang="16200000">
-                <a:pos x="wd2" y="hd2"/>
-              </a:cxn>
-            </a:cxnLst>
-            <a:rect l="0" t="0" r="r" b="b"/>
-            <a:pathLst>
-              <a:path w="21600" h="19667" extrusionOk="0">
-                <a:moveTo>
-                  <a:pt x="21600" y="19162"/>
-                </a:moveTo>
-                <a:cubicBezTo>
-                  <a:pt x="8363" y="21600"/>
-                  <a:pt x="1163" y="15213"/>
-                  <a:pt x="0" y="0"/>
-                </a:cubicBezTo>
-              </a:path>
-            </a:pathLst>
-          </a:custGeom>
-          <a:ln w="25400">
-            <a:solidFill>
-              <a:schemeClr val="accent5">
-                <a:hueOff val="-82419"/>
-                <a:satOff val="-9513"/>
-                <a:lumOff val="-16343"/>
-              </a:schemeClr>
-            </a:solidFill>
-            <a:miter lim="400000"/>
-            <a:tailEnd type="triangle"/>
-          </a:ln>
-        </p:spPr>
-        <p:txBody>
-          <a:bodyPr/>
-          <a:lstStyle/>
-          <a:p>
-            <a:endParaRPr/>
           </a:p>
         </p:txBody>
       </p:sp>
@@ -28177,7 +27422,7 @@
           </a:ln>
           <a:extLst>
             <a:ext uri="{C572A759-6A51-4108-AA02-DFA0A04FC94B}">
-              <ma14:wrappingTextBoxFlag xmlns:ma14="http://schemas.microsoft.com/office/mac/drawingml/2011/main" xmlns:a14="http://schemas.microsoft.com/office/drawing/2010/main" xmlns:m="http://schemas.openxmlformats.org/officeDocument/2006/math" xmlns="" val="1"/>
+              <ma14:wrappingTextBoxFlag xmlns="" xmlns:m="http://schemas.openxmlformats.org/officeDocument/2006/math" xmlns:a14="http://schemas.microsoft.com/office/drawing/2010/main" xmlns:ma14="http://schemas.microsoft.com/office/mac/drawingml/2011/main" val="1"/>
             </a:ext>
           </a:extLst>
         </p:spPr>
@@ -28200,8 +27445,8 @@
           </a:p>
         </p:txBody>
       </p:sp>
-      <mc:AlternateContent xmlns:mc="http://schemas.openxmlformats.org/markup-compatibility/2006">
-        <mc:Choice xmlns:a14="http://schemas.microsoft.com/office/drawing/2010/main" Requires="a14">
+      <mc:AlternateContent xmlns:mc="http://schemas.openxmlformats.org/markup-compatibility/2006" xmlns:a14="http://schemas.microsoft.com/office/drawing/2010/main">
+        <mc:Choice Requires="a14">
           <p:sp>
             <p:nvSpPr>
               <p:cNvPr id="644" name="Equation"/>
@@ -28252,7 +27497,7 @@
             </p:txBody>
           </p:sp>
         </mc:Choice>
-        <mc:Fallback>
+        <mc:Fallback xmlns="">
           <p:sp>
             <p:nvSpPr>
               <p:cNvPr id="644" name="Equation"/>
@@ -28377,7 +27622,7 @@
           </a:ln>
           <a:extLst>
             <a:ext uri="{C572A759-6A51-4108-AA02-DFA0A04FC94B}">
-              <ma14:wrappingTextBoxFlag xmlns:ma14="http://schemas.microsoft.com/office/mac/drawingml/2011/main" xmlns:a14="http://schemas.microsoft.com/office/drawing/2010/main" xmlns:m="http://schemas.openxmlformats.org/officeDocument/2006/math" xmlns="" val="1"/>
+              <ma14:wrappingTextBoxFlag xmlns="" xmlns:m="http://schemas.openxmlformats.org/officeDocument/2006/math" xmlns:a14="http://schemas.microsoft.com/office/drawing/2010/main" xmlns:ma14="http://schemas.microsoft.com/office/mac/drawingml/2011/main" val="1"/>
             </a:ext>
           </a:extLst>
         </p:spPr>
@@ -28422,7 +27667,7 @@
           </a:ln>
           <a:extLst>
             <a:ext uri="{C572A759-6A51-4108-AA02-DFA0A04FC94B}">
-              <ma14:wrappingTextBoxFlag xmlns:ma14="http://schemas.microsoft.com/office/mac/drawingml/2011/main" xmlns:a14="http://schemas.microsoft.com/office/drawing/2010/main" xmlns:m="http://schemas.openxmlformats.org/officeDocument/2006/math" xmlns="" val="1"/>
+              <ma14:wrappingTextBoxFlag xmlns="" xmlns:m="http://schemas.openxmlformats.org/officeDocument/2006/math" xmlns:a14="http://schemas.microsoft.com/office/drawing/2010/main" xmlns:ma14="http://schemas.microsoft.com/office/mac/drawingml/2011/main" val="1"/>
             </a:ext>
           </a:extLst>
         </p:spPr>
@@ -28509,7 +27754,7 @@
           </a:ln>
           <a:extLst>
             <a:ext uri="{C572A759-6A51-4108-AA02-DFA0A04FC94B}">
-              <ma14:wrappingTextBoxFlag xmlns:ma14="http://schemas.microsoft.com/office/mac/drawingml/2011/main" xmlns:a14="http://schemas.microsoft.com/office/drawing/2010/main" xmlns:m="http://schemas.openxmlformats.org/officeDocument/2006/math" xmlns="" val="1"/>
+              <ma14:wrappingTextBoxFlag xmlns="" xmlns:m="http://schemas.openxmlformats.org/officeDocument/2006/math" xmlns:a14="http://schemas.microsoft.com/office/drawing/2010/main" xmlns:ma14="http://schemas.microsoft.com/office/mac/drawingml/2011/main" val="1"/>
             </a:ext>
           </a:extLst>
         </p:spPr>
@@ -29931,7 +29176,7 @@
           </a:ln>
           <a:extLst>
             <a:ext uri="{C572A759-6A51-4108-AA02-DFA0A04FC94B}">
-              <ma14:wrappingTextBoxFlag xmlns:ma14="http://schemas.microsoft.com/office/mac/drawingml/2011/main" xmlns:a14="http://schemas.microsoft.com/office/drawing/2010/main" xmlns:m="http://schemas.openxmlformats.org/officeDocument/2006/math" xmlns="" val="1"/>
+              <ma14:wrappingTextBoxFlag xmlns="" xmlns:m="http://schemas.openxmlformats.org/officeDocument/2006/math" xmlns:a14="http://schemas.microsoft.com/office/drawing/2010/main" xmlns:ma14="http://schemas.microsoft.com/office/mac/drawingml/2011/main" val="1"/>
             </a:ext>
           </a:extLst>
         </p:spPr>
@@ -30042,7 +29287,7 @@
           </a:ln>
           <a:extLst>
             <a:ext uri="{C572A759-6A51-4108-AA02-DFA0A04FC94B}">
-              <ma14:wrappingTextBoxFlag xmlns:ma14="http://schemas.microsoft.com/office/mac/drawingml/2011/main" xmlns:a14="http://schemas.microsoft.com/office/drawing/2010/main" xmlns:m="http://schemas.openxmlformats.org/officeDocument/2006/math" xmlns="" val="1"/>
+              <ma14:wrappingTextBoxFlag xmlns="" xmlns:m="http://schemas.openxmlformats.org/officeDocument/2006/math" xmlns:a14="http://schemas.microsoft.com/office/drawing/2010/main" xmlns:ma14="http://schemas.microsoft.com/office/mac/drawingml/2011/main" val="1"/>
             </a:ext>
           </a:extLst>
         </p:spPr>
@@ -30087,7 +29332,7 @@
           </a:ln>
           <a:extLst>
             <a:ext uri="{C572A759-6A51-4108-AA02-DFA0A04FC94B}">
-              <ma14:wrappingTextBoxFlag xmlns:ma14="http://schemas.microsoft.com/office/mac/drawingml/2011/main" xmlns:a14="http://schemas.microsoft.com/office/drawing/2010/main" xmlns:m="http://schemas.openxmlformats.org/officeDocument/2006/math" xmlns="" val="1"/>
+              <ma14:wrappingTextBoxFlag xmlns="" xmlns:m="http://schemas.openxmlformats.org/officeDocument/2006/math" xmlns:a14="http://schemas.microsoft.com/office/drawing/2010/main" xmlns:ma14="http://schemas.microsoft.com/office/mac/drawingml/2011/main" val="1"/>
             </a:ext>
           </a:extLst>
         </p:spPr>
@@ -30174,7 +29419,7 @@
           </a:ln>
           <a:extLst>
             <a:ext uri="{C572A759-6A51-4108-AA02-DFA0A04FC94B}">
-              <ma14:wrappingTextBoxFlag xmlns:ma14="http://schemas.microsoft.com/office/mac/drawingml/2011/main" xmlns:a14="http://schemas.microsoft.com/office/drawing/2010/main" xmlns:m="http://schemas.openxmlformats.org/officeDocument/2006/math" xmlns="" val="1"/>
+              <ma14:wrappingTextBoxFlag xmlns="" xmlns:m="http://schemas.openxmlformats.org/officeDocument/2006/math" xmlns:a14="http://schemas.microsoft.com/office/drawing/2010/main" xmlns:ma14="http://schemas.microsoft.com/office/mac/drawingml/2011/main" val="1"/>
             </a:ext>
           </a:extLst>
         </p:spPr>
@@ -31596,7 +30841,7 @@
           </a:ln>
           <a:extLst>
             <a:ext uri="{C572A759-6A51-4108-AA02-DFA0A04FC94B}">
-              <ma14:wrappingTextBoxFlag xmlns:ma14="http://schemas.microsoft.com/office/mac/drawingml/2011/main" xmlns:a14="http://schemas.microsoft.com/office/drawing/2010/main" xmlns:m="http://schemas.openxmlformats.org/officeDocument/2006/math" xmlns="" val="1"/>
+              <ma14:wrappingTextBoxFlag xmlns="" xmlns:m="http://schemas.openxmlformats.org/officeDocument/2006/math" xmlns:a14="http://schemas.microsoft.com/office/drawing/2010/main" xmlns:ma14="http://schemas.microsoft.com/office/mac/drawingml/2011/main" val="1"/>
             </a:ext>
           </a:extLst>
         </p:spPr>
@@ -31649,7 +30894,7 @@
           </a:ln>
           <a:extLst>
             <a:ext uri="{C572A759-6A51-4108-AA02-DFA0A04FC94B}">
-              <ma14:wrappingTextBoxFlag xmlns:ma14="http://schemas.microsoft.com/office/mac/drawingml/2011/main" xmlns:a14="http://schemas.microsoft.com/office/drawing/2010/main" xmlns:m="http://schemas.openxmlformats.org/officeDocument/2006/math" xmlns="" val="1"/>
+              <ma14:wrappingTextBoxFlag xmlns="" xmlns:m="http://schemas.openxmlformats.org/officeDocument/2006/math" xmlns:a14="http://schemas.microsoft.com/office/drawing/2010/main" xmlns:ma14="http://schemas.microsoft.com/office/mac/drawingml/2011/main" val="1"/>
             </a:ext>
           </a:extLst>
         </p:spPr>
@@ -31964,7 +31209,7 @@
           </a:ln>
           <a:extLst>
             <a:ext uri="{C572A759-6A51-4108-AA02-DFA0A04FC94B}">
-              <ma14:wrappingTextBoxFlag xmlns:ma14="http://schemas.microsoft.com/office/mac/drawingml/2011/main" xmlns:a14="http://schemas.microsoft.com/office/drawing/2010/main" xmlns:m="http://schemas.openxmlformats.org/officeDocument/2006/math" xmlns="" val="1"/>
+              <ma14:wrappingTextBoxFlag xmlns="" xmlns:m="http://schemas.openxmlformats.org/officeDocument/2006/math" xmlns:a14="http://schemas.microsoft.com/office/drawing/2010/main" xmlns:ma14="http://schemas.microsoft.com/office/mac/drawingml/2011/main" val="1"/>
             </a:ext>
           </a:extLst>
         </p:spPr>
@@ -32051,7 +31296,7 @@
           </a:ln>
           <a:extLst>
             <a:ext uri="{C572A759-6A51-4108-AA02-DFA0A04FC94B}">
-              <ma14:wrappingTextBoxFlag xmlns:ma14="http://schemas.microsoft.com/office/mac/drawingml/2011/main" xmlns:a14="http://schemas.microsoft.com/office/drawing/2010/main" xmlns:m="http://schemas.openxmlformats.org/officeDocument/2006/math" xmlns="" val="1"/>
+              <ma14:wrappingTextBoxFlag xmlns="" xmlns:m="http://schemas.openxmlformats.org/officeDocument/2006/math" xmlns:a14="http://schemas.microsoft.com/office/drawing/2010/main" xmlns:ma14="http://schemas.microsoft.com/office/mac/drawingml/2011/main" val="1"/>
             </a:ext>
           </a:extLst>
         </p:spPr>
@@ -32161,7 +31406,7 @@
           </a:ln>
           <a:extLst>
             <a:ext uri="{C572A759-6A51-4108-AA02-DFA0A04FC94B}">
-              <ma14:wrappingTextBoxFlag xmlns:ma14="http://schemas.microsoft.com/office/mac/drawingml/2011/main" xmlns:a14="http://schemas.microsoft.com/office/drawing/2010/main" xmlns:m="http://schemas.openxmlformats.org/officeDocument/2006/math" xmlns="" val="1"/>
+              <ma14:wrappingTextBoxFlag xmlns="" xmlns:m="http://schemas.openxmlformats.org/officeDocument/2006/math" xmlns:a14="http://schemas.microsoft.com/office/drawing/2010/main" xmlns:ma14="http://schemas.microsoft.com/office/mac/drawingml/2011/main" val="1"/>
             </a:ext>
           </a:extLst>
         </p:spPr>
@@ -32210,7 +31455,7 @@
           </a:ln>
           <a:extLst>
             <a:ext uri="{C572A759-6A51-4108-AA02-DFA0A04FC94B}">
-              <ma14:wrappingTextBoxFlag xmlns:ma14="http://schemas.microsoft.com/office/mac/drawingml/2011/main" xmlns:a14="http://schemas.microsoft.com/office/drawing/2010/main" xmlns:m="http://schemas.openxmlformats.org/officeDocument/2006/math" xmlns="" val="1"/>
+              <ma14:wrappingTextBoxFlag xmlns="" xmlns:m="http://schemas.openxmlformats.org/officeDocument/2006/math" xmlns:a14="http://schemas.microsoft.com/office/drawing/2010/main" xmlns:ma14="http://schemas.microsoft.com/office/mac/drawingml/2011/main" val="1"/>
             </a:ext>
           </a:extLst>
         </p:spPr>
@@ -32311,7 +31556,7 @@
           </a:ln>
           <a:extLst>
             <a:ext uri="{C572A759-6A51-4108-AA02-DFA0A04FC94B}">
-              <ma14:wrappingTextBoxFlag xmlns:ma14="http://schemas.microsoft.com/office/mac/drawingml/2011/main" xmlns:a14="http://schemas.microsoft.com/office/drawing/2010/main" xmlns:m="http://schemas.openxmlformats.org/officeDocument/2006/math" xmlns="" val="1"/>
+              <ma14:wrappingTextBoxFlag xmlns="" xmlns:m="http://schemas.openxmlformats.org/officeDocument/2006/math" xmlns:a14="http://schemas.microsoft.com/office/drawing/2010/main" xmlns:ma14="http://schemas.microsoft.com/office/mac/drawingml/2011/main" val="1"/>
             </a:ext>
           </a:extLst>
         </p:spPr>
@@ -33733,7 +32978,7 @@
           </a:ln>
           <a:extLst>
             <a:ext uri="{C572A759-6A51-4108-AA02-DFA0A04FC94B}">
-              <ma14:wrappingTextBoxFlag xmlns:ma14="http://schemas.microsoft.com/office/mac/drawingml/2011/main" xmlns:a14="http://schemas.microsoft.com/office/drawing/2010/main" xmlns:m="http://schemas.openxmlformats.org/officeDocument/2006/math" xmlns="" val="1"/>
+              <ma14:wrappingTextBoxFlag xmlns="" xmlns:m="http://schemas.openxmlformats.org/officeDocument/2006/math" xmlns:a14="http://schemas.microsoft.com/office/drawing/2010/main" xmlns:ma14="http://schemas.microsoft.com/office/mac/drawingml/2011/main" val="1"/>
             </a:ext>
           </a:extLst>
         </p:spPr>
@@ -33786,7 +33031,7 @@
           </a:ln>
           <a:extLst>
             <a:ext uri="{C572A759-6A51-4108-AA02-DFA0A04FC94B}">
-              <ma14:wrappingTextBoxFlag xmlns:ma14="http://schemas.microsoft.com/office/mac/drawingml/2011/main" xmlns:a14="http://schemas.microsoft.com/office/drawing/2010/main" xmlns:m="http://schemas.openxmlformats.org/officeDocument/2006/math" xmlns="" val="1"/>
+              <ma14:wrappingTextBoxFlag xmlns="" xmlns:m="http://schemas.openxmlformats.org/officeDocument/2006/math" xmlns:a14="http://schemas.microsoft.com/office/drawing/2010/main" xmlns:ma14="http://schemas.microsoft.com/office/mac/drawingml/2011/main" val="1"/>
             </a:ext>
           </a:extLst>
         </p:spPr>
@@ -34101,7 +33346,7 @@
           </a:ln>
           <a:extLst>
             <a:ext uri="{C572A759-6A51-4108-AA02-DFA0A04FC94B}">
-              <ma14:wrappingTextBoxFlag xmlns:ma14="http://schemas.microsoft.com/office/mac/drawingml/2011/main" xmlns:a14="http://schemas.microsoft.com/office/drawing/2010/main" xmlns:m="http://schemas.openxmlformats.org/officeDocument/2006/math" xmlns="" val="1"/>
+              <ma14:wrappingTextBoxFlag xmlns="" xmlns:m="http://schemas.openxmlformats.org/officeDocument/2006/math" xmlns:a14="http://schemas.microsoft.com/office/drawing/2010/main" xmlns:ma14="http://schemas.microsoft.com/office/mac/drawingml/2011/main" val="1"/>
             </a:ext>
           </a:extLst>
         </p:spPr>
@@ -34228,7 +33473,7 @@
           </a:ln>
           <a:extLst>
             <a:ext uri="{C572A759-6A51-4108-AA02-DFA0A04FC94B}">
-              <ma14:wrappingTextBoxFlag xmlns:ma14="http://schemas.microsoft.com/office/mac/drawingml/2011/main" xmlns:a14="http://schemas.microsoft.com/office/drawing/2010/main" xmlns:m="http://schemas.openxmlformats.org/officeDocument/2006/math" xmlns="" val="1"/>
+              <ma14:wrappingTextBoxFlag xmlns="" xmlns:m="http://schemas.openxmlformats.org/officeDocument/2006/math" xmlns:a14="http://schemas.microsoft.com/office/drawing/2010/main" xmlns:ma14="http://schemas.microsoft.com/office/mac/drawingml/2011/main" val="1"/>
             </a:ext>
           </a:extLst>
         </p:spPr>
@@ -34526,7 +33771,7 @@
           </a:ln>
           <a:extLst>
             <a:ext uri="{C572A759-6A51-4108-AA02-DFA0A04FC94B}">
-              <ma14:wrappingTextBoxFlag xmlns:ma14="http://schemas.microsoft.com/office/mac/drawingml/2011/main" xmlns:a14="http://schemas.microsoft.com/office/drawing/2010/main" xmlns:m="http://schemas.openxmlformats.org/officeDocument/2006/math" xmlns="" val="1"/>
+              <ma14:wrappingTextBoxFlag xmlns="" xmlns:m="http://schemas.openxmlformats.org/officeDocument/2006/math" xmlns:a14="http://schemas.microsoft.com/office/drawing/2010/main" xmlns:ma14="http://schemas.microsoft.com/office/mac/drawingml/2011/main" val="1"/>
             </a:ext>
           </a:extLst>
         </p:spPr>
@@ -34571,7 +33816,7 @@
           </a:ln>
           <a:extLst>
             <a:ext uri="{C572A759-6A51-4108-AA02-DFA0A04FC94B}">
-              <ma14:wrappingTextBoxFlag xmlns:ma14="http://schemas.microsoft.com/office/mac/drawingml/2011/main" xmlns:a14="http://schemas.microsoft.com/office/drawing/2010/main" xmlns:m="http://schemas.openxmlformats.org/officeDocument/2006/math" xmlns="" val="1"/>
+              <ma14:wrappingTextBoxFlag xmlns="" xmlns:m="http://schemas.openxmlformats.org/officeDocument/2006/math" xmlns:a14="http://schemas.microsoft.com/office/drawing/2010/main" xmlns:ma14="http://schemas.microsoft.com/office/mac/drawingml/2011/main" val="1"/>
             </a:ext>
           </a:extLst>
         </p:spPr>
@@ -34658,7 +33903,7 @@
           </a:ln>
           <a:extLst>
             <a:ext uri="{C572A759-6A51-4108-AA02-DFA0A04FC94B}">
-              <ma14:wrappingTextBoxFlag xmlns:ma14="http://schemas.microsoft.com/office/mac/drawingml/2011/main" xmlns:a14="http://schemas.microsoft.com/office/drawing/2010/main" xmlns:m="http://schemas.openxmlformats.org/officeDocument/2006/math" xmlns="" val="1"/>
+              <ma14:wrappingTextBoxFlag xmlns="" xmlns:m="http://schemas.openxmlformats.org/officeDocument/2006/math" xmlns:a14="http://schemas.microsoft.com/office/drawing/2010/main" xmlns:ma14="http://schemas.microsoft.com/office/mac/drawingml/2011/main" val="1"/>
             </a:ext>
           </a:extLst>
         </p:spPr>
@@ -36691,7 +35936,7 @@
           </a:ln>
           <a:extLst>
             <a:ext uri="{C572A759-6A51-4108-AA02-DFA0A04FC94B}">
-              <ma14:wrappingTextBoxFlag xmlns:ma14="http://schemas.microsoft.com/office/mac/drawingml/2011/main" xmlns:a14="http://schemas.microsoft.com/office/drawing/2010/main" xmlns:m="http://schemas.openxmlformats.org/officeDocument/2006/math" xmlns="" val="1"/>
+              <ma14:wrappingTextBoxFlag xmlns="" xmlns:m="http://schemas.openxmlformats.org/officeDocument/2006/math" xmlns:a14="http://schemas.microsoft.com/office/drawing/2010/main" xmlns:ma14="http://schemas.microsoft.com/office/mac/drawingml/2011/main" val="1"/>
             </a:ext>
           </a:extLst>
         </p:spPr>
@@ -36738,7 +35983,7 @@
           </a:ln>
           <a:extLst>
             <a:ext uri="{C572A759-6A51-4108-AA02-DFA0A04FC94B}">
-              <ma14:wrappingTextBoxFlag xmlns:ma14="http://schemas.microsoft.com/office/mac/drawingml/2011/main" xmlns:a14="http://schemas.microsoft.com/office/drawing/2010/main" xmlns:m="http://schemas.openxmlformats.org/officeDocument/2006/math" xmlns="" val="1"/>
+              <ma14:wrappingTextBoxFlag xmlns="" xmlns:m="http://schemas.openxmlformats.org/officeDocument/2006/math" xmlns:a14="http://schemas.microsoft.com/office/drawing/2010/main" xmlns:ma14="http://schemas.microsoft.com/office/mac/drawingml/2011/main" val="1"/>
             </a:ext>
           </a:extLst>
         </p:spPr>
@@ -37007,7 +36252,7 @@
           </a:ln>
           <a:extLst>
             <a:ext uri="{C572A759-6A51-4108-AA02-DFA0A04FC94B}">
-              <ma14:wrappingTextBoxFlag xmlns:ma14="http://schemas.microsoft.com/office/mac/drawingml/2011/main" xmlns:a14="http://schemas.microsoft.com/office/drawing/2010/main" xmlns:m="http://schemas.openxmlformats.org/officeDocument/2006/math" xmlns="" val="1"/>
+              <ma14:wrappingTextBoxFlag xmlns="" xmlns:m="http://schemas.openxmlformats.org/officeDocument/2006/math" xmlns:a14="http://schemas.microsoft.com/office/drawing/2010/main" xmlns:ma14="http://schemas.microsoft.com/office/mac/drawingml/2011/main" val="1"/>
             </a:ext>
           </a:extLst>
         </p:spPr>
@@ -37310,7 +36555,7 @@
           </a:ln>
           <a:extLst>
             <a:ext uri="{C572A759-6A51-4108-AA02-DFA0A04FC94B}">
-              <ma14:wrappingTextBoxFlag xmlns:ma14="http://schemas.microsoft.com/office/mac/drawingml/2011/main" xmlns:a14="http://schemas.microsoft.com/office/drawing/2010/main" xmlns:m="http://schemas.openxmlformats.org/officeDocument/2006/math" xmlns="" val="1"/>
+              <ma14:wrappingTextBoxFlag xmlns="" xmlns:m="http://schemas.openxmlformats.org/officeDocument/2006/math" xmlns:a14="http://schemas.microsoft.com/office/drawing/2010/main" xmlns:ma14="http://schemas.microsoft.com/office/mac/drawingml/2011/main" val="1"/>
             </a:ext>
           </a:extLst>
         </p:spPr>
@@ -37355,7 +36600,7 @@
           </a:ln>
           <a:extLst>
             <a:ext uri="{C572A759-6A51-4108-AA02-DFA0A04FC94B}">
-              <ma14:wrappingTextBoxFlag xmlns:ma14="http://schemas.microsoft.com/office/mac/drawingml/2011/main" xmlns:a14="http://schemas.microsoft.com/office/drawing/2010/main" xmlns:m="http://schemas.openxmlformats.org/officeDocument/2006/math" xmlns="" val="1"/>
+              <ma14:wrappingTextBoxFlag xmlns="" xmlns:m="http://schemas.openxmlformats.org/officeDocument/2006/math" xmlns:a14="http://schemas.microsoft.com/office/drawing/2010/main" xmlns:ma14="http://schemas.microsoft.com/office/mac/drawingml/2011/main" val="1"/>
             </a:ext>
           </a:extLst>
         </p:spPr>
@@ -37442,7 +36687,7 @@
           </a:ln>
           <a:extLst>
             <a:ext uri="{C572A759-6A51-4108-AA02-DFA0A04FC94B}">
-              <ma14:wrappingTextBoxFlag xmlns:ma14="http://schemas.microsoft.com/office/mac/drawingml/2011/main" xmlns:a14="http://schemas.microsoft.com/office/drawing/2010/main" xmlns:m="http://schemas.openxmlformats.org/officeDocument/2006/math" xmlns="" val="1"/>
+              <ma14:wrappingTextBoxFlag xmlns="" xmlns:m="http://schemas.openxmlformats.org/officeDocument/2006/math" xmlns:a14="http://schemas.microsoft.com/office/drawing/2010/main" xmlns:ma14="http://schemas.microsoft.com/office/mac/drawingml/2011/main" val="1"/>
             </a:ext>
           </a:extLst>
         </p:spPr>
@@ -37882,7 +37127,7 @@
           </a:ln>
           <a:extLst>
             <a:ext uri="{C572A759-6A51-4108-AA02-DFA0A04FC94B}">
-              <ma14:wrappingTextBoxFlag xmlns:ma14="http://schemas.microsoft.com/office/mac/drawingml/2011/main" xmlns:a14="http://schemas.microsoft.com/office/drawing/2010/main" xmlns:m="http://schemas.openxmlformats.org/officeDocument/2006/math" xmlns="" val="1"/>
+              <ma14:wrappingTextBoxFlag xmlns="" xmlns:m="http://schemas.openxmlformats.org/officeDocument/2006/math" xmlns:a14="http://schemas.microsoft.com/office/drawing/2010/main" xmlns:ma14="http://schemas.microsoft.com/office/mac/drawingml/2011/main" val="1"/>
             </a:ext>
           </a:extLst>
         </p:spPr>
@@ -38004,7 +37249,7 @@
           </a:ln>
           <a:extLst>
             <a:ext uri="{C572A759-6A51-4108-AA02-DFA0A04FC94B}">
-              <ma14:wrappingTextBoxFlag xmlns:ma14="http://schemas.microsoft.com/office/mac/drawingml/2011/main" xmlns:a14="http://schemas.microsoft.com/office/drawing/2010/main" xmlns:m="http://schemas.openxmlformats.org/officeDocument/2006/math" xmlns="" val="1"/>
+              <ma14:wrappingTextBoxFlag xmlns="" xmlns:m="http://schemas.openxmlformats.org/officeDocument/2006/math" xmlns:a14="http://schemas.microsoft.com/office/drawing/2010/main" xmlns:ma14="http://schemas.microsoft.com/office/mac/drawingml/2011/main" val="1"/>
             </a:ext>
           </a:extLst>
         </p:spPr>
@@ -38049,7 +37294,7 @@
           </a:ln>
           <a:extLst>
             <a:ext uri="{C572A759-6A51-4108-AA02-DFA0A04FC94B}">
-              <ma14:wrappingTextBoxFlag xmlns:ma14="http://schemas.microsoft.com/office/mac/drawingml/2011/main" xmlns:a14="http://schemas.microsoft.com/office/drawing/2010/main" xmlns:m="http://schemas.openxmlformats.org/officeDocument/2006/math" xmlns="" val="1"/>
+              <ma14:wrappingTextBoxFlag xmlns="" xmlns:m="http://schemas.openxmlformats.org/officeDocument/2006/math" xmlns:a14="http://schemas.microsoft.com/office/drawing/2010/main" xmlns:ma14="http://schemas.microsoft.com/office/mac/drawingml/2011/main" val="1"/>
             </a:ext>
           </a:extLst>
         </p:spPr>
@@ -38136,7 +37381,7 @@
           </a:ln>
           <a:extLst>
             <a:ext uri="{C572A759-6A51-4108-AA02-DFA0A04FC94B}">
-              <ma14:wrappingTextBoxFlag xmlns:ma14="http://schemas.microsoft.com/office/mac/drawingml/2011/main" xmlns:a14="http://schemas.microsoft.com/office/drawing/2010/main" xmlns:m="http://schemas.openxmlformats.org/officeDocument/2006/math" xmlns="" val="1"/>
+              <ma14:wrappingTextBoxFlag xmlns="" xmlns:m="http://schemas.openxmlformats.org/officeDocument/2006/math" xmlns:a14="http://schemas.microsoft.com/office/drawing/2010/main" xmlns:ma14="http://schemas.microsoft.com/office/mac/drawingml/2011/main" val="1"/>
             </a:ext>
           </a:extLst>
         </p:spPr>
@@ -40169,7 +39414,7 @@
           </a:ln>
           <a:extLst>
             <a:ext uri="{C572A759-6A51-4108-AA02-DFA0A04FC94B}">
-              <ma14:wrappingTextBoxFlag xmlns:ma14="http://schemas.microsoft.com/office/mac/drawingml/2011/main" xmlns:a14="http://schemas.microsoft.com/office/drawing/2010/main" xmlns:m="http://schemas.openxmlformats.org/officeDocument/2006/math" xmlns="" val="1"/>
+              <ma14:wrappingTextBoxFlag xmlns="" xmlns:m="http://schemas.openxmlformats.org/officeDocument/2006/math" xmlns:a14="http://schemas.microsoft.com/office/drawing/2010/main" xmlns:ma14="http://schemas.microsoft.com/office/mac/drawingml/2011/main" val="1"/>
             </a:ext>
           </a:extLst>
         </p:spPr>
@@ -40216,7 +39461,7 @@
           </a:ln>
           <a:extLst>
             <a:ext uri="{C572A759-6A51-4108-AA02-DFA0A04FC94B}">
-              <ma14:wrappingTextBoxFlag xmlns:ma14="http://schemas.microsoft.com/office/mac/drawingml/2011/main" xmlns:a14="http://schemas.microsoft.com/office/drawing/2010/main" xmlns:m="http://schemas.openxmlformats.org/officeDocument/2006/math" xmlns="" val="1"/>
+              <ma14:wrappingTextBoxFlag xmlns="" xmlns:m="http://schemas.openxmlformats.org/officeDocument/2006/math" xmlns:a14="http://schemas.microsoft.com/office/drawing/2010/main" xmlns:ma14="http://schemas.microsoft.com/office/mac/drawingml/2011/main" val="1"/>
             </a:ext>
           </a:extLst>
         </p:spPr>
@@ -40371,7 +39616,7 @@
           </a:ln>
           <a:extLst>
             <a:ext uri="{C572A759-6A51-4108-AA02-DFA0A04FC94B}">
-              <ma14:wrappingTextBoxFlag xmlns:ma14="http://schemas.microsoft.com/office/mac/drawingml/2011/main" xmlns:a14="http://schemas.microsoft.com/office/drawing/2010/main" xmlns:m="http://schemas.openxmlformats.org/officeDocument/2006/math" xmlns="" val="1"/>
+              <ma14:wrappingTextBoxFlag xmlns="" xmlns:m="http://schemas.openxmlformats.org/officeDocument/2006/math" xmlns:a14="http://schemas.microsoft.com/office/drawing/2010/main" xmlns:ma14="http://schemas.microsoft.com/office/mac/drawingml/2011/main" val="1"/>
             </a:ext>
           </a:extLst>
         </p:spPr>
@@ -40524,7 +39769,7 @@
           </a:ln>
           <a:extLst>
             <a:ext uri="{C572A759-6A51-4108-AA02-DFA0A04FC94B}">
-              <ma14:wrappingTextBoxFlag xmlns:ma14="http://schemas.microsoft.com/office/mac/drawingml/2011/main" xmlns:a14="http://schemas.microsoft.com/office/drawing/2010/main" xmlns:m="http://schemas.openxmlformats.org/officeDocument/2006/math" xmlns="" val="1"/>
+              <ma14:wrappingTextBoxFlag xmlns="" xmlns:m="http://schemas.openxmlformats.org/officeDocument/2006/math" xmlns:a14="http://schemas.microsoft.com/office/drawing/2010/main" xmlns:ma14="http://schemas.microsoft.com/office/mac/drawingml/2011/main" val="1"/>
             </a:ext>
           </a:extLst>
         </p:spPr>
@@ -40677,7 +39922,7 @@
           </a:ln>
           <a:extLst>
             <a:ext uri="{C572A759-6A51-4108-AA02-DFA0A04FC94B}">
-              <ma14:wrappingTextBoxFlag xmlns:ma14="http://schemas.microsoft.com/office/mac/drawingml/2011/main" xmlns:a14="http://schemas.microsoft.com/office/drawing/2010/main" xmlns:m="http://schemas.openxmlformats.org/officeDocument/2006/math" xmlns="" val="1"/>
+              <ma14:wrappingTextBoxFlag xmlns="" xmlns:m="http://schemas.openxmlformats.org/officeDocument/2006/math" xmlns:a14="http://schemas.microsoft.com/office/drawing/2010/main" xmlns:ma14="http://schemas.microsoft.com/office/mac/drawingml/2011/main" val="1"/>
             </a:ext>
           </a:extLst>
         </p:spPr>
@@ -40963,7 +40208,7 @@
           </a:ln>
           <a:extLst>
             <a:ext uri="{C572A759-6A51-4108-AA02-DFA0A04FC94B}">
-              <ma14:wrappingTextBoxFlag xmlns:ma14="http://schemas.microsoft.com/office/mac/drawingml/2011/main" xmlns:a14="http://schemas.microsoft.com/office/drawing/2010/main" xmlns:m="http://schemas.openxmlformats.org/officeDocument/2006/math" xmlns="" val="1"/>
+              <ma14:wrappingTextBoxFlag xmlns="" xmlns:m="http://schemas.openxmlformats.org/officeDocument/2006/math" xmlns:a14="http://schemas.microsoft.com/office/drawing/2010/main" xmlns:ma14="http://schemas.microsoft.com/office/mac/drawingml/2011/main" val="1"/>
             </a:ext>
           </a:extLst>
         </p:spPr>
@@ -41008,7 +40253,7 @@
           </a:ln>
           <a:extLst>
             <a:ext uri="{C572A759-6A51-4108-AA02-DFA0A04FC94B}">
-              <ma14:wrappingTextBoxFlag xmlns:ma14="http://schemas.microsoft.com/office/mac/drawingml/2011/main" xmlns:a14="http://schemas.microsoft.com/office/drawing/2010/main" xmlns:m="http://schemas.openxmlformats.org/officeDocument/2006/math" xmlns="" val="1"/>
+              <ma14:wrappingTextBoxFlag xmlns="" xmlns:m="http://schemas.openxmlformats.org/officeDocument/2006/math" xmlns:a14="http://schemas.microsoft.com/office/drawing/2010/main" xmlns:ma14="http://schemas.microsoft.com/office/mac/drawingml/2011/main" val="1"/>
             </a:ext>
           </a:extLst>
         </p:spPr>
@@ -41095,7 +40340,7 @@
           </a:ln>
           <a:extLst>
             <a:ext uri="{C572A759-6A51-4108-AA02-DFA0A04FC94B}">
-              <ma14:wrappingTextBoxFlag xmlns:ma14="http://schemas.microsoft.com/office/mac/drawingml/2011/main" xmlns:a14="http://schemas.microsoft.com/office/drawing/2010/main" xmlns:m="http://schemas.openxmlformats.org/officeDocument/2006/math" xmlns="" val="1"/>
+              <ma14:wrappingTextBoxFlag xmlns="" xmlns:m="http://schemas.openxmlformats.org/officeDocument/2006/math" xmlns:a14="http://schemas.microsoft.com/office/drawing/2010/main" xmlns:ma14="http://schemas.microsoft.com/office/mac/drawingml/2011/main" val="1"/>
             </a:ext>
           </a:extLst>
         </p:spPr>
@@ -41862,7 +41107,7 @@
           </a:ln>
           <a:extLst>
             <a:ext uri="{C572A759-6A51-4108-AA02-DFA0A04FC94B}">
-              <ma14:wrappingTextBoxFlag xmlns:ma14="http://schemas.microsoft.com/office/mac/drawingml/2011/main" xmlns:a14="http://schemas.microsoft.com/office/drawing/2010/main" xmlns:m="http://schemas.openxmlformats.org/officeDocument/2006/math" xmlns="" val="1"/>
+              <ma14:wrappingTextBoxFlag xmlns="" xmlns:m="http://schemas.openxmlformats.org/officeDocument/2006/math" xmlns:a14="http://schemas.microsoft.com/office/drawing/2010/main" xmlns:ma14="http://schemas.microsoft.com/office/mac/drawingml/2011/main" val="1"/>
             </a:ext>
           </a:extLst>
         </p:spPr>
@@ -41984,7 +41229,7 @@
           </a:ln>
           <a:extLst>
             <a:ext uri="{C572A759-6A51-4108-AA02-DFA0A04FC94B}">
-              <ma14:wrappingTextBoxFlag xmlns:ma14="http://schemas.microsoft.com/office/mac/drawingml/2011/main" xmlns:a14="http://schemas.microsoft.com/office/drawing/2010/main" xmlns:m="http://schemas.openxmlformats.org/officeDocument/2006/math" xmlns="" val="1"/>
+              <ma14:wrappingTextBoxFlag xmlns="" xmlns:m="http://schemas.openxmlformats.org/officeDocument/2006/math" xmlns:a14="http://schemas.microsoft.com/office/drawing/2010/main" xmlns:ma14="http://schemas.microsoft.com/office/mac/drawingml/2011/main" val="1"/>
             </a:ext>
           </a:extLst>
         </p:spPr>
@@ -42029,7 +41274,7 @@
           </a:ln>
           <a:extLst>
             <a:ext uri="{C572A759-6A51-4108-AA02-DFA0A04FC94B}">
-              <ma14:wrappingTextBoxFlag xmlns:ma14="http://schemas.microsoft.com/office/mac/drawingml/2011/main" xmlns:a14="http://schemas.microsoft.com/office/drawing/2010/main" xmlns:m="http://schemas.openxmlformats.org/officeDocument/2006/math" xmlns="" val="1"/>
+              <ma14:wrappingTextBoxFlag xmlns="" xmlns:m="http://schemas.openxmlformats.org/officeDocument/2006/math" xmlns:a14="http://schemas.microsoft.com/office/drawing/2010/main" xmlns:ma14="http://schemas.microsoft.com/office/mac/drawingml/2011/main" val="1"/>
             </a:ext>
           </a:extLst>
         </p:spPr>
@@ -42116,7 +41361,7 @@
           </a:ln>
           <a:extLst>
             <a:ext uri="{C572A759-6A51-4108-AA02-DFA0A04FC94B}">
-              <ma14:wrappingTextBoxFlag xmlns:ma14="http://schemas.microsoft.com/office/mac/drawingml/2011/main" xmlns:a14="http://schemas.microsoft.com/office/drawing/2010/main" xmlns:m="http://schemas.openxmlformats.org/officeDocument/2006/math" xmlns="" val="1"/>
+              <ma14:wrappingTextBoxFlag xmlns="" xmlns:m="http://schemas.openxmlformats.org/officeDocument/2006/math" xmlns:a14="http://schemas.microsoft.com/office/drawing/2010/main" xmlns:ma14="http://schemas.microsoft.com/office/mac/drawingml/2011/main" val="1"/>
             </a:ext>
           </a:extLst>
         </p:spPr>
@@ -42891,7 +42136,7 @@
           </a:ln>
           <a:extLst>
             <a:ext uri="{C572A759-6A51-4108-AA02-DFA0A04FC94B}">
-              <ma14:wrappingTextBoxFlag xmlns:ma14="http://schemas.microsoft.com/office/mac/drawingml/2011/main" xmlns:a14="http://schemas.microsoft.com/office/drawing/2010/main" xmlns:m="http://schemas.openxmlformats.org/officeDocument/2006/math" xmlns="" val="1"/>
+              <ma14:wrappingTextBoxFlag xmlns="" xmlns:m="http://schemas.openxmlformats.org/officeDocument/2006/math" xmlns:a14="http://schemas.microsoft.com/office/drawing/2010/main" xmlns:ma14="http://schemas.microsoft.com/office/mac/drawingml/2011/main" val="1"/>
             </a:ext>
           </a:extLst>
         </p:spPr>
@@ -43677,7 +42922,7 @@
           </a:ln>
           <a:extLst>
             <a:ext uri="{C572A759-6A51-4108-AA02-DFA0A04FC94B}">
-              <ma14:wrappingTextBoxFlag xmlns:ma14="http://schemas.microsoft.com/office/mac/drawingml/2011/main" xmlns:a14="http://schemas.microsoft.com/office/drawing/2010/main" xmlns:m="http://schemas.openxmlformats.org/officeDocument/2006/math" xmlns="" val="1"/>
+              <ma14:wrappingTextBoxFlag xmlns="" xmlns:m="http://schemas.openxmlformats.org/officeDocument/2006/math" xmlns:a14="http://schemas.microsoft.com/office/drawing/2010/main" xmlns:ma14="http://schemas.microsoft.com/office/mac/drawingml/2011/main" val="1"/>
             </a:ext>
           </a:extLst>
         </p:spPr>
@@ -43722,7 +42967,7 @@
           </a:ln>
           <a:extLst>
             <a:ext uri="{C572A759-6A51-4108-AA02-DFA0A04FC94B}">
-              <ma14:wrappingTextBoxFlag xmlns:ma14="http://schemas.microsoft.com/office/mac/drawingml/2011/main" xmlns:a14="http://schemas.microsoft.com/office/drawing/2010/main" xmlns:m="http://schemas.openxmlformats.org/officeDocument/2006/math" xmlns="" val="1"/>
+              <ma14:wrappingTextBoxFlag xmlns="" xmlns:m="http://schemas.openxmlformats.org/officeDocument/2006/math" xmlns:a14="http://schemas.microsoft.com/office/drawing/2010/main" xmlns:ma14="http://schemas.microsoft.com/office/mac/drawingml/2011/main" val="1"/>
             </a:ext>
           </a:extLst>
         </p:spPr>
@@ -43809,7 +43054,7 @@
           </a:ln>
           <a:extLst>
             <a:ext uri="{C572A759-6A51-4108-AA02-DFA0A04FC94B}">
-              <ma14:wrappingTextBoxFlag xmlns:ma14="http://schemas.microsoft.com/office/mac/drawingml/2011/main" xmlns:a14="http://schemas.microsoft.com/office/drawing/2010/main" xmlns:m="http://schemas.openxmlformats.org/officeDocument/2006/math" xmlns="" val="1"/>
+              <ma14:wrappingTextBoxFlag xmlns="" xmlns:m="http://schemas.openxmlformats.org/officeDocument/2006/math" xmlns:a14="http://schemas.microsoft.com/office/drawing/2010/main" xmlns:ma14="http://schemas.microsoft.com/office/mac/drawingml/2011/main" val="1"/>
             </a:ext>
           </a:extLst>
         </p:spPr>
@@ -44584,7 +43829,7 @@
           </a:ln>
           <a:extLst>
             <a:ext uri="{C572A759-6A51-4108-AA02-DFA0A04FC94B}">
-              <ma14:wrappingTextBoxFlag xmlns:ma14="http://schemas.microsoft.com/office/mac/drawingml/2011/main" xmlns:a14="http://schemas.microsoft.com/office/drawing/2010/main" xmlns:m="http://schemas.openxmlformats.org/officeDocument/2006/math" xmlns="" val="1"/>
+              <ma14:wrappingTextBoxFlag xmlns="" xmlns:m="http://schemas.openxmlformats.org/officeDocument/2006/math" xmlns:a14="http://schemas.microsoft.com/office/drawing/2010/main" xmlns:ma14="http://schemas.microsoft.com/office/mac/drawingml/2011/main" val="1"/>
             </a:ext>
           </a:extLst>
         </p:spPr>
@@ -45900,7 +45145,7 @@
           </a:ln>
           <a:extLst>
             <a:ext uri="{C572A759-6A51-4108-AA02-DFA0A04FC94B}">
-              <ma14:wrappingTextBoxFlag xmlns:ma14="http://schemas.microsoft.com/office/mac/drawingml/2011/main" xmlns:a14="http://schemas.microsoft.com/office/drawing/2010/main" xmlns:m="http://schemas.openxmlformats.org/officeDocument/2006/math" xmlns="" val="1"/>
+              <ma14:wrappingTextBoxFlag xmlns="" xmlns:m="http://schemas.openxmlformats.org/officeDocument/2006/math" xmlns:a14="http://schemas.microsoft.com/office/drawing/2010/main" xmlns:ma14="http://schemas.microsoft.com/office/mac/drawingml/2011/main" val="1"/>
             </a:ext>
           </a:extLst>
         </p:spPr>
@@ -45947,7 +45192,7 @@
           </a:ln>
           <a:extLst>
             <a:ext uri="{C572A759-6A51-4108-AA02-DFA0A04FC94B}">
-              <ma14:wrappingTextBoxFlag xmlns:ma14="http://schemas.microsoft.com/office/mac/drawingml/2011/main" xmlns:a14="http://schemas.microsoft.com/office/drawing/2010/main" xmlns:m="http://schemas.openxmlformats.org/officeDocument/2006/math" xmlns="" val="1"/>
+              <ma14:wrappingTextBoxFlag xmlns="" xmlns:m="http://schemas.openxmlformats.org/officeDocument/2006/math" xmlns:a14="http://schemas.microsoft.com/office/drawing/2010/main" xmlns:ma14="http://schemas.microsoft.com/office/mac/drawingml/2011/main" val="1"/>
             </a:ext>
           </a:extLst>
         </p:spPr>
@@ -46058,7 +45303,7 @@
           </a:ln>
           <a:extLst>
             <a:ext uri="{C572A759-6A51-4108-AA02-DFA0A04FC94B}">
-              <ma14:wrappingTextBoxFlag xmlns:ma14="http://schemas.microsoft.com/office/mac/drawingml/2011/main" xmlns:a14="http://schemas.microsoft.com/office/drawing/2010/main" xmlns:m="http://schemas.openxmlformats.org/officeDocument/2006/math" xmlns="" val="1"/>
+              <ma14:wrappingTextBoxFlag xmlns="" xmlns:m="http://schemas.openxmlformats.org/officeDocument/2006/math" xmlns:a14="http://schemas.microsoft.com/office/drawing/2010/main" xmlns:ma14="http://schemas.microsoft.com/office/mac/drawingml/2011/main" val="1"/>
             </a:ext>
           </a:extLst>
         </p:spPr>
@@ -46103,7 +45348,7 @@
           </a:ln>
           <a:extLst>
             <a:ext uri="{C572A759-6A51-4108-AA02-DFA0A04FC94B}">
-              <ma14:wrappingTextBoxFlag xmlns:ma14="http://schemas.microsoft.com/office/mac/drawingml/2011/main" xmlns:a14="http://schemas.microsoft.com/office/drawing/2010/main" xmlns:m="http://schemas.openxmlformats.org/officeDocument/2006/math" xmlns="" val="1"/>
+              <ma14:wrappingTextBoxFlag xmlns="" xmlns:m="http://schemas.openxmlformats.org/officeDocument/2006/math" xmlns:a14="http://schemas.microsoft.com/office/drawing/2010/main" xmlns:ma14="http://schemas.microsoft.com/office/mac/drawingml/2011/main" val="1"/>
             </a:ext>
           </a:extLst>
         </p:spPr>
@@ -46190,7 +45435,7 @@
           </a:ln>
           <a:extLst>
             <a:ext uri="{C572A759-6A51-4108-AA02-DFA0A04FC94B}">
-              <ma14:wrappingTextBoxFlag xmlns:ma14="http://schemas.microsoft.com/office/mac/drawingml/2011/main" xmlns:a14="http://schemas.microsoft.com/office/drawing/2010/main" xmlns:m="http://schemas.openxmlformats.org/officeDocument/2006/math" xmlns="" val="1"/>
+              <ma14:wrappingTextBoxFlag xmlns="" xmlns:m="http://schemas.openxmlformats.org/officeDocument/2006/math" xmlns:a14="http://schemas.microsoft.com/office/drawing/2010/main" xmlns:ma14="http://schemas.microsoft.com/office/mac/drawingml/2011/main" val="1"/>
             </a:ext>
           </a:extLst>
         </p:spPr>
@@ -46965,7 +46210,7 @@
           </a:ln>
           <a:extLst>
             <a:ext uri="{C572A759-6A51-4108-AA02-DFA0A04FC94B}">
-              <ma14:wrappingTextBoxFlag xmlns:ma14="http://schemas.microsoft.com/office/mac/drawingml/2011/main" xmlns:a14="http://schemas.microsoft.com/office/drawing/2010/main" xmlns:m="http://schemas.openxmlformats.org/officeDocument/2006/math" xmlns="" val="1"/>
+              <ma14:wrappingTextBoxFlag xmlns="" xmlns:m="http://schemas.openxmlformats.org/officeDocument/2006/math" xmlns:a14="http://schemas.microsoft.com/office/drawing/2010/main" xmlns:ma14="http://schemas.microsoft.com/office/mac/drawingml/2011/main" val="1"/>
             </a:ext>
           </a:extLst>
         </p:spPr>
@@ -48294,7 +47539,7 @@
           </a:ln>
           <a:extLst>
             <a:ext uri="{C572A759-6A51-4108-AA02-DFA0A04FC94B}">
-              <ma14:wrappingTextBoxFlag xmlns:ma14="http://schemas.microsoft.com/office/mac/drawingml/2011/main" xmlns:a14="http://schemas.microsoft.com/office/drawing/2010/main" xmlns:m="http://schemas.openxmlformats.org/officeDocument/2006/math" xmlns="" val="1"/>
+              <ma14:wrappingTextBoxFlag xmlns="" xmlns:m="http://schemas.openxmlformats.org/officeDocument/2006/math" xmlns:a14="http://schemas.microsoft.com/office/drawing/2010/main" xmlns:ma14="http://schemas.microsoft.com/office/mac/drawingml/2011/main" val="1"/>
             </a:ext>
           </a:extLst>
         </p:spPr>
@@ -48341,7 +47586,7 @@
           </a:ln>
           <a:extLst>
             <a:ext uri="{C572A759-6A51-4108-AA02-DFA0A04FC94B}">
-              <ma14:wrappingTextBoxFlag xmlns:ma14="http://schemas.microsoft.com/office/mac/drawingml/2011/main" xmlns:a14="http://schemas.microsoft.com/office/drawing/2010/main" xmlns:m="http://schemas.openxmlformats.org/officeDocument/2006/math" xmlns="" val="1"/>
+              <ma14:wrappingTextBoxFlag xmlns="" xmlns:m="http://schemas.openxmlformats.org/officeDocument/2006/math" xmlns:a14="http://schemas.microsoft.com/office/drawing/2010/main" xmlns:ma14="http://schemas.microsoft.com/office/mac/drawingml/2011/main" val="1"/>
             </a:ext>
           </a:extLst>
         </p:spPr>
@@ -48441,7 +47686,7 @@
           </a:ln>
           <a:extLst>
             <a:ext uri="{C572A759-6A51-4108-AA02-DFA0A04FC94B}">
-              <ma14:wrappingTextBoxFlag xmlns:ma14="http://schemas.microsoft.com/office/mac/drawingml/2011/main" xmlns:a14="http://schemas.microsoft.com/office/drawing/2010/main" xmlns:m="http://schemas.openxmlformats.org/officeDocument/2006/math" xmlns="" val="1"/>
+              <ma14:wrappingTextBoxFlag xmlns="" xmlns:m="http://schemas.openxmlformats.org/officeDocument/2006/math" xmlns:a14="http://schemas.microsoft.com/office/drawing/2010/main" xmlns:ma14="http://schemas.microsoft.com/office/mac/drawingml/2011/main" val="1"/>
             </a:ext>
           </a:extLst>
         </p:spPr>
@@ -48495,7 +47740,7 @@
           </a:ln>
           <a:extLst>
             <a:ext uri="{C572A759-6A51-4108-AA02-DFA0A04FC94B}">
-              <ma14:wrappingTextBoxFlag xmlns:ma14="http://schemas.microsoft.com/office/mac/drawingml/2011/main" xmlns:a14="http://schemas.microsoft.com/office/drawing/2010/main" xmlns:m="http://schemas.openxmlformats.org/officeDocument/2006/math" xmlns="" val="1"/>
+              <ma14:wrappingTextBoxFlag xmlns="" xmlns:m="http://schemas.openxmlformats.org/officeDocument/2006/math" xmlns:a14="http://schemas.microsoft.com/office/drawing/2010/main" xmlns:ma14="http://schemas.microsoft.com/office/mac/drawingml/2011/main" val="1"/>
             </a:ext>
           </a:extLst>
         </p:spPr>
@@ -48542,7 +47787,7 @@
           </a:ln>
           <a:extLst>
             <a:ext uri="{C572A759-6A51-4108-AA02-DFA0A04FC94B}">
-              <ma14:wrappingTextBoxFlag xmlns:ma14="http://schemas.microsoft.com/office/mac/drawingml/2011/main" xmlns:a14="http://schemas.microsoft.com/office/drawing/2010/main" xmlns:m="http://schemas.openxmlformats.org/officeDocument/2006/math" xmlns="" val="1"/>
+              <ma14:wrappingTextBoxFlag xmlns="" xmlns:m="http://schemas.openxmlformats.org/officeDocument/2006/math" xmlns:a14="http://schemas.microsoft.com/office/drawing/2010/main" xmlns:ma14="http://schemas.microsoft.com/office/mac/drawingml/2011/main" val="1"/>
             </a:ext>
           </a:extLst>
         </p:spPr>
@@ -48586,7 +47831,7 @@
           </a:ln>
           <a:extLst>
             <a:ext uri="{C572A759-6A51-4108-AA02-DFA0A04FC94B}">
-              <ma14:wrappingTextBoxFlag xmlns:ma14="http://schemas.microsoft.com/office/mac/drawingml/2011/main" xmlns:a14="http://schemas.microsoft.com/office/drawing/2010/main" xmlns:m="http://schemas.openxmlformats.org/officeDocument/2006/math" xmlns="" val="1"/>
+              <ma14:wrappingTextBoxFlag xmlns="" xmlns:m="http://schemas.openxmlformats.org/officeDocument/2006/math" xmlns:a14="http://schemas.microsoft.com/office/drawing/2010/main" xmlns:ma14="http://schemas.microsoft.com/office/mac/drawingml/2011/main" val="1"/>
             </a:ext>
           </a:extLst>
         </p:spPr>
@@ -48633,7 +47878,7 @@
           </a:ln>
           <a:extLst>
             <a:ext uri="{C572A759-6A51-4108-AA02-DFA0A04FC94B}">
-              <ma14:wrappingTextBoxFlag xmlns:ma14="http://schemas.microsoft.com/office/mac/drawingml/2011/main" xmlns:a14="http://schemas.microsoft.com/office/drawing/2010/main" xmlns:m="http://schemas.openxmlformats.org/officeDocument/2006/math" xmlns="" val="1"/>
+              <ma14:wrappingTextBoxFlag xmlns="" xmlns:m="http://schemas.openxmlformats.org/officeDocument/2006/math" xmlns:a14="http://schemas.microsoft.com/office/drawing/2010/main" xmlns:ma14="http://schemas.microsoft.com/office/mac/drawingml/2011/main" val="1"/>
             </a:ext>
           </a:extLst>
         </p:spPr>
@@ -48680,7 +47925,7 @@
           </a:ln>
           <a:extLst>
             <a:ext uri="{C572A759-6A51-4108-AA02-DFA0A04FC94B}">
-              <ma14:wrappingTextBoxFlag xmlns:ma14="http://schemas.microsoft.com/office/mac/drawingml/2011/main" xmlns:a14="http://schemas.microsoft.com/office/drawing/2010/main" xmlns:m="http://schemas.openxmlformats.org/officeDocument/2006/math" xmlns="" val="1"/>
+              <ma14:wrappingTextBoxFlag xmlns="" xmlns:m="http://schemas.openxmlformats.org/officeDocument/2006/math" xmlns:a14="http://schemas.microsoft.com/office/drawing/2010/main" xmlns:ma14="http://schemas.microsoft.com/office/mac/drawingml/2011/main" val="1"/>
             </a:ext>
           </a:extLst>
         </p:spPr>
@@ -48727,7 +47972,7 @@
           </a:ln>
           <a:extLst>
             <a:ext uri="{C572A759-6A51-4108-AA02-DFA0A04FC94B}">
-              <ma14:wrappingTextBoxFlag xmlns:ma14="http://schemas.microsoft.com/office/mac/drawingml/2011/main" xmlns:a14="http://schemas.microsoft.com/office/drawing/2010/main" xmlns:m="http://schemas.openxmlformats.org/officeDocument/2006/math" xmlns="" val="1"/>
+              <ma14:wrappingTextBoxFlag xmlns="" xmlns:m="http://schemas.openxmlformats.org/officeDocument/2006/math" xmlns:a14="http://schemas.microsoft.com/office/drawing/2010/main" xmlns:ma14="http://schemas.microsoft.com/office/mac/drawingml/2011/main" val="1"/>
             </a:ext>
           </a:extLst>
         </p:spPr>
@@ -48770,7 +48015,7 @@
           </a:ln>
           <a:extLst>
             <a:ext uri="{C572A759-6A51-4108-AA02-DFA0A04FC94B}">
-              <ma14:wrappingTextBoxFlag xmlns:ma14="http://schemas.microsoft.com/office/mac/drawingml/2011/main" xmlns:a14="http://schemas.microsoft.com/office/drawing/2010/main" xmlns:m="http://schemas.openxmlformats.org/officeDocument/2006/math" xmlns="" val="1"/>
+              <ma14:wrappingTextBoxFlag xmlns="" xmlns:m="http://schemas.openxmlformats.org/officeDocument/2006/math" xmlns:a14="http://schemas.microsoft.com/office/drawing/2010/main" xmlns:ma14="http://schemas.microsoft.com/office/mac/drawingml/2011/main" val="1"/>
             </a:ext>
           </a:extLst>
         </p:spPr>

</xml_diff>